<commit_message>
Voltei hj, mas tô desmovitado, ajudaa..., adicionei algumas coisas
</commit_message>
<xml_diff>
--- a/Word/Figuras.pptx
+++ b/Word/Figuras.pptx
@@ -19,6 +19,8 @@
     <p:sldId id="267" r:id="rId13"/>
     <p:sldId id="268" r:id="rId14"/>
     <p:sldId id="269" r:id="rId15"/>
+    <p:sldId id="270" r:id="rId16"/>
+    <p:sldId id="271" r:id="rId17"/>
   </p:sldIdLst>
   <p:sldSz cx="12192000" cy="6858000"/>
   <p:notesSz cx="6858000" cy="9144000"/>
@@ -3585,7 +3587,6 @@
             <a:rPr lang="pt-BR" dirty="0"/>
             <a:t>Programa gravado no PRU</a:t>
           </a:r>
-          <a:endParaRPr lang="pt-BR" dirty="0"/>
         </a:p>
       </dgm:t>
     </dgm:pt>
@@ -3777,31 +3778,31 @@
     </dgm:pt>
   </dgm:ptLst>
   <dgm:cxnLst>
+    <dgm:cxn modelId="{24A84E59-B053-41B8-91A5-6321DBA57433}" srcId="{4E5B51C7-4E82-4227-94CA-4C9465B6A0C7}" destId="{4BB8A447-AE56-4DB0-AD36-6B4A817FD35F}" srcOrd="1" destOrd="0" parTransId="{C9159E45-A97D-4046-BA93-444B28F86DEB}" sibTransId="{FA23DD4A-F873-4EE0-9133-8F18DC372085}"/>
+    <dgm:cxn modelId="{1908E5FF-04C3-41AD-8993-FFAE86A9A622}" type="presOf" srcId="{BD552C7A-4DCD-466C-B4A3-39A26ED797D4}" destId="{2B672D3E-55C9-414C-962F-29B316B506EC}" srcOrd="0" destOrd="0" presId="urn:microsoft.com/office/officeart/2005/8/layout/hierarchy2"/>
+    <dgm:cxn modelId="{34598A15-B208-4EBA-8758-185C836FAA21}" type="presOf" srcId="{4E5B51C7-4E82-4227-94CA-4C9465B6A0C7}" destId="{8CA734CB-1A51-419D-BA7A-9759391D9CE7}" srcOrd="0" destOrd="0" presId="urn:microsoft.com/office/officeart/2005/8/layout/hierarchy2"/>
+    <dgm:cxn modelId="{CDD3B85F-F6BB-4075-9D49-DCEF7C9B2C6F}" type="presOf" srcId="{BDFC028E-76F4-45DF-8F9F-A6E7112BE61F}" destId="{85C23449-711F-4EA1-B568-85560934795E}" srcOrd="1" destOrd="0" presId="urn:microsoft.com/office/officeart/2005/8/layout/hierarchy2"/>
+    <dgm:cxn modelId="{2FF984ED-C739-4FFB-89C4-AAF308802C7E}" type="presOf" srcId="{C94E13B1-B67D-4403-BEF7-071FC408FFB6}" destId="{48921F91-4253-43A7-B3C1-15E627FEF3B8}" srcOrd="0" destOrd="0" presId="urn:microsoft.com/office/officeart/2005/8/layout/hierarchy2"/>
     <dgm:cxn modelId="{CB9ED07B-D3AB-41CA-89BC-E0D4C03F5D2B}" srcId="{4BB8A447-AE56-4DB0-AD36-6B4A817FD35F}" destId="{E81B1DE0-AF8A-46CA-BF62-F63E13445250}" srcOrd="0" destOrd="0" parTransId="{BDFC028E-76F4-45DF-8F9F-A6E7112BE61F}" sibTransId="{C18D73B4-D7FB-4D66-8C71-2F3B7BAEF4FF}"/>
+    <dgm:cxn modelId="{A3589242-CD26-4F33-BDA4-2E91E480CD6A}" srcId="{4E5B51C7-4E82-4227-94CA-4C9465B6A0C7}" destId="{069F50F2-2C2C-40DB-BA2C-AF3AB8CF62B7}" srcOrd="0" destOrd="0" parTransId="{3B1B270E-53C8-4EAB-8BA7-8BB08125C021}" sibTransId="{769F6DB4-4076-47B2-A534-E4C34C02A2D4}"/>
     <dgm:cxn modelId="{A4AD7B26-9CFF-472A-9B71-C8D21775C14C}" type="presOf" srcId="{9F9A8578-5814-44A1-BADC-50713A170D58}" destId="{EEDA36F7-F3A8-4DB5-B0D4-72387E2107A9}" srcOrd="0" destOrd="0" presId="urn:microsoft.com/office/officeart/2005/8/layout/hierarchy2"/>
+    <dgm:cxn modelId="{AD3E3DAC-9A82-42DB-9F08-7F02271A32F6}" type="presOf" srcId="{C1B82ADB-F388-4FC2-A6C1-E31AB2344D19}" destId="{4BB824B3-F876-48FD-867E-BE378EC34E9B}" srcOrd="0" destOrd="0" presId="urn:microsoft.com/office/officeart/2005/8/layout/hierarchy2"/>
+    <dgm:cxn modelId="{D5108FD9-1DF2-4A02-A968-64E0F15EF027}" type="presOf" srcId="{4BB8A447-AE56-4DB0-AD36-6B4A817FD35F}" destId="{86F719EF-2AEF-4FC5-B622-FC63166932D5}" srcOrd="0" destOrd="0" presId="urn:microsoft.com/office/officeart/2005/8/layout/hierarchy2"/>
+    <dgm:cxn modelId="{DB53AD53-DE11-410F-B0B7-0BCF62C597FE}" srcId="{9F9A8578-5814-44A1-BADC-50713A170D58}" destId="{FB7A58EC-B6EF-4721-B4C1-122BC16872CF}" srcOrd="0" destOrd="0" parTransId="{9A499732-51CE-465B-93C6-34F66EB311ED}" sibTransId="{341CE9F8-7D20-48DA-96D3-E4E1BAF75AFE}"/>
+    <dgm:cxn modelId="{924BA2C8-E349-4433-BBBC-B097FF8BFA1F}" type="presOf" srcId="{FB7A58EC-B6EF-4721-B4C1-122BC16872CF}" destId="{39C35FA1-151A-4B53-8673-B3B7BB949516}" srcOrd="0" destOrd="0" presId="urn:microsoft.com/office/officeart/2005/8/layout/hierarchy2"/>
+    <dgm:cxn modelId="{808DEC8B-00C2-474C-A56C-67E7E182BDCF}" srcId="{D75C67AB-C6D2-4094-BD99-FC975673C219}" destId="{9F9A8578-5814-44A1-BADC-50713A170D58}" srcOrd="0" destOrd="0" parTransId="{BD552C7A-4DCD-466C-B4A3-39A26ED797D4}" sibTransId="{36C0377C-2099-4569-A34F-33A3588BC7E2}"/>
+    <dgm:cxn modelId="{BFFDE167-CD32-4689-AFF5-B05095BAFA82}" type="presOf" srcId="{069F50F2-2C2C-40DB-BA2C-AF3AB8CF62B7}" destId="{E7B30EF2-FF0C-4AC8-9B81-8D7945CB89C1}" srcOrd="0" destOrd="0" presId="urn:microsoft.com/office/officeart/2005/8/layout/hierarchy2"/>
     <dgm:cxn modelId="{2B5B3BC6-B921-4D4B-AAC8-35F10932B894}" type="presOf" srcId="{9A499732-51CE-465B-93C6-34F66EB311ED}" destId="{5F373239-5950-4FE4-84A0-97710632A8E6}" srcOrd="1" destOrd="0" presId="urn:microsoft.com/office/officeart/2005/8/layout/hierarchy2"/>
-    <dgm:cxn modelId="{AD3E3DAC-9A82-42DB-9F08-7F02271A32F6}" type="presOf" srcId="{C1B82ADB-F388-4FC2-A6C1-E31AB2344D19}" destId="{4BB824B3-F876-48FD-867E-BE378EC34E9B}" srcOrd="0" destOrd="0" presId="urn:microsoft.com/office/officeart/2005/8/layout/hierarchy2"/>
-    <dgm:cxn modelId="{DE926503-BA8E-4F34-A34F-61015E0D688F}" type="presOf" srcId="{E81B1DE0-AF8A-46CA-BF62-F63E13445250}" destId="{145DA01D-2342-4B19-87B3-5582C66914E6}" srcOrd="0" destOrd="0" presId="urn:microsoft.com/office/officeart/2005/8/layout/hierarchy2"/>
-    <dgm:cxn modelId="{CDD3B85F-F6BB-4075-9D49-DCEF7C9B2C6F}" type="presOf" srcId="{BDFC028E-76F4-45DF-8F9F-A6E7112BE61F}" destId="{85C23449-711F-4EA1-B568-85560934795E}" srcOrd="1" destOrd="0" presId="urn:microsoft.com/office/officeart/2005/8/layout/hierarchy2"/>
-    <dgm:cxn modelId="{808DEC8B-00C2-474C-A56C-67E7E182BDCF}" srcId="{D75C67AB-C6D2-4094-BD99-FC975673C219}" destId="{9F9A8578-5814-44A1-BADC-50713A170D58}" srcOrd="0" destOrd="0" parTransId="{BD552C7A-4DCD-466C-B4A3-39A26ED797D4}" sibTransId="{36C0377C-2099-4569-A34F-33A3588BC7E2}"/>
-    <dgm:cxn modelId="{A804989C-4538-4DEC-A17D-890923B74F50}" type="presOf" srcId="{709567D6-8902-4324-B6CC-CE4F5F741718}" destId="{40259D9A-A030-40FC-86D2-36EF50C1CFC4}" srcOrd="0" destOrd="0" presId="urn:microsoft.com/office/officeart/2005/8/layout/hierarchy2"/>
-    <dgm:cxn modelId="{A31F3A18-8FC6-4432-91C3-837D6851CBB6}" type="presOf" srcId="{9A499732-51CE-465B-93C6-34F66EB311ED}" destId="{28C1422A-FF4E-470A-8078-E51AEF5D0147}" srcOrd="0" destOrd="0" presId="urn:microsoft.com/office/officeart/2005/8/layout/hierarchy2"/>
-    <dgm:cxn modelId="{BFFDE167-CD32-4689-AFF5-B05095BAFA82}" type="presOf" srcId="{069F50F2-2C2C-40DB-BA2C-AF3AB8CF62B7}" destId="{E7B30EF2-FF0C-4AC8-9B81-8D7945CB89C1}" srcOrd="0" destOrd="0" presId="urn:microsoft.com/office/officeart/2005/8/layout/hierarchy2"/>
-    <dgm:cxn modelId="{34598A15-B208-4EBA-8758-185C836FAA21}" type="presOf" srcId="{4E5B51C7-4E82-4227-94CA-4C9465B6A0C7}" destId="{8CA734CB-1A51-419D-BA7A-9759391D9CE7}" srcOrd="0" destOrd="0" presId="urn:microsoft.com/office/officeart/2005/8/layout/hierarchy2"/>
-    <dgm:cxn modelId="{1908E5FF-04C3-41AD-8993-FFAE86A9A622}" type="presOf" srcId="{BD552C7A-4DCD-466C-B4A3-39A26ED797D4}" destId="{2B672D3E-55C9-414C-962F-29B316B506EC}" srcOrd="0" destOrd="0" presId="urn:microsoft.com/office/officeart/2005/8/layout/hierarchy2"/>
-    <dgm:cxn modelId="{24A84E59-B053-41B8-91A5-6321DBA57433}" srcId="{4E5B51C7-4E82-4227-94CA-4C9465B6A0C7}" destId="{4BB8A447-AE56-4DB0-AD36-6B4A817FD35F}" srcOrd="1" destOrd="0" parTransId="{C9159E45-A97D-4046-BA93-444B28F86DEB}" sibTransId="{FA23DD4A-F873-4EE0-9133-8F18DC372085}"/>
-    <dgm:cxn modelId="{507B6285-4B72-458C-8C6A-230BC7750159}" srcId="{069F50F2-2C2C-40DB-BA2C-AF3AB8CF62B7}" destId="{D75C67AB-C6D2-4094-BD99-FC975673C219}" srcOrd="0" destOrd="0" parTransId="{C1B82ADB-F388-4FC2-A6C1-E31AB2344D19}" sibTransId="{0F8C69C1-1E3A-4A6B-9C71-9E87F53F6DCA}"/>
+    <dgm:cxn modelId="{83B2759C-B50E-4B47-8E7C-E5A7D276E5C5}" srcId="{E81B1DE0-AF8A-46CA-BF62-F63E13445250}" destId="{C94E13B1-B67D-4403-BEF7-071FC408FFB6}" srcOrd="0" destOrd="0" parTransId="{709567D6-8902-4324-B6CC-CE4F5F741718}" sibTransId="{DB646B38-C52E-4FE9-BA61-37A4D04BE43F}"/>
     <dgm:cxn modelId="{3C3B4F58-19BB-4F67-A967-DE3A03189A09}" type="presOf" srcId="{BD552C7A-4DCD-466C-B4A3-39A26ED797D4}" destId="{3C2BD199-154C-4E61-96AC-4A0CD47BED63}" srcOrd="1" destOrd="0" presId="urn:microsoft.com/office/officeart/2005/8/layout/hierarchy2"/>
     <dgm:cxn modelId="{01CB7C97-12BC-4591-AE2B-38601143D7EA}" type="presOf" srcId="{BDFC028E-76F4-45DF-8F9F-A6E7112BE61F}" destId="{2B854A36-655B-4619-9566-22D01E467744}" srcOrd="0" destOrd="0" presId="urn:microsoft.com/office/officeart/2005/8/layout/hierarchy2"/>
-    <dgm:cxn modelId="{924BA2C8-E349-4433-BBBC-B097FF8BFA1F}" type="presOf" srcId="{FB7A58EC-B6EF-4721-B4C1-122BC16872CF}" destId="{39C35FA1-151A-4B53-8673-B3B7BB949516}" srcOrd="0" destOrd="0" presId="urn:microsoft.com/office/officeart/2005/8/layout/hierarchy2"/>
-    <dgm:cxn modelId="{2FF984ED-C739-4FFB-89C4-AAF308802C7E}" type="presOf" srcId="{C94E13B1-B67D-4403-BEF7-071FC408FFB6}" destId="{48921F91-4253-43A7-B3C1-15E627FEF3B8}" srcOrd="0" destOrd="0" presId="urn:microsoft.com/office/officeart/2005/8/layout/hierarchy2"/>
-    <dgm:cxn modelId="{DB53AD53-DE11-410F-B0B7-0BCF62C597FE}" srcId="{9F9A8578-5814-44A1-BADC-50713A170D58}" destId="{FB7A58EC-B6EF-4721-B4C1-122BC16872CF}" srcOrd="0" destOrd="0" parTransId="{9A499732-51CE-465B-93C6-34F66EB311ED}" sibTransId="{341CE9F8-7D20-48DA-96D3-E4E1BAF75AFE}"/>
     <dgm:cxn modelId="{8DE73072-3EC5-4897-A3B4-A0F7D718B1EB}" type="presOf" srcId="{D75C67AB-C6D2-4094-BD99-FC975673C219}" destId="{418BCB23-9AB7-4054-AC65-446B17CEAF35}" srcOrd="0" destOrd="0" presId="urn:microsoft.com/office/officeart/2005/8/layout/hierarchy2"/>
+    <dgm:cxn modelId="{A804989C-4538-4DEC-A17D-890923B74F50}" type="presOf" srcId="{709567D6-8902-4324-B6CC-CE4F5F741718}" destId="{40259D9A-A030-40FC-86D2-36EF50C1CFC4}" srcOrd="0" destOrd="0" presId="urn:microsoft.com/office/officeart/2005/8/layout/hierarchy2"/>
     <dgm:cxn modelId="{BE0BAB68-F363-43A5-8EC8-E8050FB8B0EF}" type="presOf" srcId="{C1B82ADB-F388-4FC2-A6C1-E31AB2344D19}" destId="{D7AFCA2C-D2AE-4F91-914B-BB8F3F20A3B4}" srcOrd="1" destOrd="0" presId="urn:microsoft.com/office/officeart/2005/8/layout/hierarchy2"/>
+    <dgm:cxn modelId="{DE926503-BA8E-4F34-A34F-61015E0D688F}" type="presOf" srcId="{E81B1DE0-AF8A-46CA-BF62-F63E13445250}" destId="{145DA01D-2342-4B19-87B3-5582C66914E6}" srcOrd="0" destOrd="0" presId="urn:microsoft.com/office/officeart/2005/8/layout/hierarchy2"/>
+    <dgm:cxn modelId="{507B6285-4B72-458C-8C6A-230BC7750159}" srcId="{069F50F2-2C2C-40DB-BA2C-AF3AB8CF62B7}" destId="{D75C67AB-C6D2-4094-BD99-FC975673C219}" srcOrd="0" destOrd="0" parTransId="{C1B82ADB-F388-4FC2-A6C1-E31AB2344D19}" sibTransId="{0F8C69C1-1E3A-4A6B-9C71-9E87F53F6DCA}"/>
     <dgm:cxn modelId="{EB22F097-E0FE-4F89-BF9A-0CB2B6FA4AAC}" type="presOf" srcId="{709567D6-8902-4324-B6CC-CE4F5F741718}" destId="{A1CE4CFB-978D-47A5-841C-95DC421C1430}" srcOrd="1" destOrd="0" presId="urn:microsoft.com/office/officeart/2005/8/layout/hierarchy2"/>
-    <dgm:cxn modelId="{A3589242-CD26-4F33-BDA4-2E91E480CD6A}" srcId="{4E5B51C7-4E82-4227-94CA-4C9465B6A0C7}" destId="{069F50F2-2C2C-40DB-BA2C-AF3AB8CF62B7}" srcOrd="0" destOrd="0" parTransId="{3B1B270E-53C8-4EAB-8BA7-8BB08125C021}" sibTransId="{769F6DB4-4076-47B2-A534-E4C34C02A2D4}"/>
-    <dgm:cxn modelId="{D5108FD9-1DF2-4A02-A968-64E0F15EF027}" type="presOf" srcId="{4BB8A447-AE56-4DB0-AD36-6B4A817FD35F}" destId="{86F719EF-2AEF-4FC5-B622-FC63166932D5}" srcOrd="0" destOrd="0" presId="urn:microsoft.com/office/officeart/2005/8/layout/hierarchy2"/>
-    <dgm:cxn modelId="{83B2759C-B50E-4B47-8E7C-E5A7D276E5C5}" srcId="{E81B1DE0-AF8A-46CA-BF62-F63E13445250}" destId="{C94E13B1-B67D-4403-BEF7-071FC408FFB6}" srcOrd="0" destOrd="0" parTransId="{709567D6-8902-4324-B6CC-CE4F5F741718}" sibTransId="{DB646B38-C52E-4FE9-BA61-37A4D04BE43F}"/>
+    <dgm:cxn modelId="{A31F3A18-8FC6-4432-91C3-837D6851CBB6}" type="presOf" srcId="{9A499732-51CE-465B-93C6-34F66EB311ED}" destId="{28C1422A-FF4E-470A-8078-E51AEF5D0147}" srcOrd="0" destOrd="0" presId="urn:microsoft.com/office/officeart/2005/8/layout/hierarchy2"/>
     <dgm:cxn modelId="{73AC41BC-F179-48A5-BA96-D741334A1A1C}" type="presParOf" srcId="{8CA734CB-1A51-419D-BA7A-9759391D9CE7}" destId="{69C85873-3CB5-4CFD-B00E-A77EED0D8844}" srcOrd="0" destOrd="0" presId="urn:microsoft.com/office/officeart/2005/8/layout/hierarchy2"/>
     <dgm:cxn modelId="{E6C5A500-1758-48C0-AEFB-E3EC99288035}" type="presParOf" srcId="{69C85873-3CB5-4CFD-B00E-A77EED0D8844}" destId="{E7B30EF2-FF0C-4AC8-9B81-8D7945CB89C1}" srcOrd="0" destOrd="0" presId="urn:microsoft.com/office/officeart/2005/8/layout/hierarchy2"/>
     <dgm:cxn modelId="{449530E3-2AAA-480D-AC59-E4F6875D5BF8}" type="presParOf" srcId="{69C85873-3CB5-4CFD-B00E-A77EED0D8844}" destId="{F039778B-903C-4FA3-B71D-88D1FEA24FE9}" srcOrd="1" destOrd="0" presId="urn:microsoft.com/office/officeart/2005/8/layout/hierarchy2"/>
@@ -5500,7 +5501,6 @@
             <a:rPr lang="pt-BR" sz="1800" kern="1200" dirty="0"/>
             <a:t>Programa gravado no PRU</a:t>
           </a:r>
-          <a:endParaRPr lang="pt-BR" sz="1800" kern="1200" dirty="0"/>
         </a:p>
       </dsp:txBody>
       <dsp:txXfrm>
@@ -9940,7 +9940,7 @@
           <a:p>
             <a:fld id="{54B95968-CED5-447B-ADA8-EFE194C8B328}" type="datetimeFigureOut">
               <a:rPr lang="pt-BR" smtClean="0"/>
-              <a:t>10/11/2016</a:t>
+              <a:t>12/11/2016</a:t>
             </a:fld>
             <a:endParaRPr lang="pt-BR"/>
           </a:p>
@@ -10108,7 +10108,7 @@
           <a:p>
             <a:fld id="{54B95968-CED5-447B-ADA8-EFE194C8B328}" type="datetimeFigureOut">
               <a:rPr lang="pt-BR" smtClean="0"/>
-              <a:t>10/11/2016</a:t>
+              <a:t>12/11/2016</a:t>
             </a:fld>
             <a:endParaRPr lang="pt-BR"/>
           </a:p>
@@ -10286,7 +10286,7 @@
           <a:p>
             <a:fld id="{54B95968-CED5-447B-ADA8-EFE194C8B328}" type="datetimeFigureOut">
               <a:rPr lang="pt-BR" smtClean="0"/>
-              <a:t>10/11/2016</a:t>
+              <a:t>12/11/2016</a:t>
             </a:fld>
             <a:endParaRPr lang="pt-BR"/>
           </a:p>
@@ -10454,7 +10454,7 @@
           <a:p>
             <a:fld id="{54B95968-CED5-447B-ADA8-EFE194C8B328}" type="datetimeFigureOut">
               <a:rPr lang="pt-BR" smtClean="0"/>
-              <a:t>10/11/2016</a:t>
+              <a:t>12/11/2016</a:t>
             </a:fld>
             <a:endParaRPr lang="pt-BR"/>
           </a:p>
@@ -10699,7 +10699,7 @@
           <a:p>
             <a:fld id="{54B95968-CED5-447B-ADA8-EFE194C8B328}" type="datetimeFigureOut">
               <a:rPr lang="pt-BR" smtClean="0"/>
-              <a:t>10/11/2016</a:t>
+              <a:t>12/11/2016</a:t>
             </a:fld>
             <a:endParaRPr lang="pt-BR"/>
           </a:p>
@@ -10928,7 +10928,7 @@
           <a:p>
             <a:fld id="{54B95968-CED5-447B-ADA8-EFE194C8B328}" type="datetimeFigureOut">
               <a:rPr lang="pt-BR" smtClean="0"/>
-              <a:t>10/11/2016</a:t>
+              <a:t>12/11/2016</a:t>
             </a:fld>
             <a:endParaRPr lang="pt-BR"/>
           </a:p>
@@ -11292,7 +11292,7 @@
           <a:p>
             <a:fld id="{54B95968-CED5-447B-ADA8-EFE194C8B328}" type="datetimeFigureOut">
               <a:rPr lang="pt-BR" smtClean="0"/>
-              <a:t>10/11/2016</a:t>
+              <a:t>12/11/2016</a:t>
             </a:fld>
             <a:endParaRPr lang="pt-BR"/>
           </a:p>
@@ -11409,7 +11409,7 @@
           <a:p>
             <a:fld id="{54B95968-CED5-447B-ADA8-EFE194C8B328}" type="datetimeFigureOut">
               <a:rPr lang="pt-BR" smtClean="0"/>
-              <a:t>10/11/2016</a:t>
+              <a:t>12/11/2016</a:t>
             </a:fld>
             <a:endParaRPr lang="pt-BR"/>
           </a:p>
@@ -11504,7 +11504,7 @@
           <a:p>
             <a:fld id="{54B95968-CED5-447B-ADA8-EFE194C8B328}" type="datetimeFigureOut">
               <a:rPr lang="pt-BR" smtClean="0"/>
-              <a:t>10/11/2016</a:t>
+              <a:t>12/11/2016</a:t>
             </a:fld>
             <a:endParaRPr lang="pt-BR"/>
           </a:p>
@@ -11779,7 +11779,7 @@
           <a:p>
             <a:fld id="{54B95968-CED5-447B-ADA8-EFE194C8B328}" type="datetimeFigureOut">
               <a:rPr lang="pt-BR" smtClean="0"/>
-              <a:t>10/11/2016</a:t>
+              <a:t>12/11/2016</a:t>
             </a:fld>
             <a:endParaRPr lang="pt-BR"/>
           </a:p>
@@ -12031,7 +12031,7 @@
           <a:p>
             <a:fld id="{54B95968-CED5-447B-ADA8-EFE194C8B328}" type="datetimeFigureOut">
               <a:rPr lang="pt-BR" smtClean="0"/>
-              <a:t>10/11/2016</a:t>
+              <a:t>12/11/2016</a:t>
             </a:fld>
             <a:endParaRPr lang="pt-BR"/>
           </a:p>
@@ -12242,7 +12242,7 @@
           <a:p>
             <a:fld id="{54B95968-CED5-447B-ADA8-EFE194C8B328}" type="datetimeFigureOut">
               <a:rPr lang="pt-BR" smtClean="0"/>
-              <a:t>10/11/2016</a:t>
+              <a:t>12/11/2016</a:t>
             </a:fld>
             <a:endParaRPr lang="pt-BR"/>
           </a:p>
@@ -13622,8 +13622,8 @@
           </a:extLst>
         </p:spPr>
       </p:pic>
-      <mc:AlternateContent xmlns:mc="http://schemas.openxmlformats.org/markup-compatibility/2006">
-        <mc:Choice xmlns:a14="http://schemas.microsoft.com/office/drawing/2010/main" Requires="a14">
+      <mc:AlternateContent xmlns:mc="http://schemas.openxmlformats.org/markup-compatibility/2006" xmlns:a14="http://schemas.microsoft.com/office/drawing/2010/main">
+        <mc:Choice Requires="a14">
           <p:sp>
             <p:nvSpPr>
               <p:cNvPr id="7" name="CaixaDeTexto 6"/>
@@ -13646,6 +13646,7 @@
               </a:bodyPr>
               <a:lstStyle/>
               <a:p>
+                <a:pPr/>
                 <a14:m>
                   <m:oMathPara xmlns:m="http://schemas.openxmlformats.org/officeDocument/2006/math">
                     <m:oMathParaPr>
@@ -13698,7 +13699,7 @@
             </p:txBody>
           </p:sp>
         </mc:Choice>
-        <mc:Fallback>
+        <mc:Fallback xmlns="">
           <p:sp>
             <p:nvSpPr>
               <p:cNvPr id="7" name="CaixaDeTexto 6"/>
@@ -13737,8 +13738,8 @@
           </p:sp>
         </mc:Fallback>
       </mc:AlternateContent>
-      <mc:AlternateContent xmlns:mc="http://schemas.openxmlformats.org/markup-compatibility/2006">
-        <mc:Choice xmlns:a14="http://schemas.microsoft.com/office/drawing/2010/main" Requires="a14">
+      <mc:AlternateContent xmlns:mc="http://schemas.openxmlformats.org/markup-compatibility/2006" xmlns:a14="http://schemas.microsoft.com/office/drawing/2010/main">
+        <mc:Choice Requires="a14">
           <p:sp>
             <p:nvSpPr>
               <p:cNvPr id="10" name="CaixaDeTexto 9"/>
@@ -13761,6 +13762,7 @@
               </a:bodyPr>
               <a:lstStyle/>
               <a:p>
+                <a:pPr/>
                 <a14:m>
                   <m:oMathPara xmlns:m="http://schemas.openxmlformats.org/officeDocument/2006/math">
                     <m:oMathParaPr>
@@ -13813,7 +13815,7 @@
             </p:txBody>
           </p:sp>
         </mc:Choice>
-        <mc:Fallback>
+        <mc:Fallback xmlns="">
           <p:sp>
             <p:nvSpPr>
               <p:cNvPr id="10" name="CaixaDeTexto 9"/>
@@ -14390,7 +14392,7 @@
         </p:nvSpPr>
         <p:spPr>
           <a:xfrm>
-            <a:off x="2195860" y="1841145"/>
+            <a:off x="2202969" y="1821214"/>
             <a:ext cx="952735" cy="907367"/>
           </a:xfrm>
           <a:prstGeom prst="pentagon">
@@ -14430,7 +14432,7 @@
         </p:nvSpPr>
         <p:spPr>
           <a:xfrm>
-            <a:off x="2226752" y="2846573"/>
+            <a:off x="2231440" y="2798516"/>
             <a:ext cx="890953" cy="890953"/>
           </a:xfrm>
           <a:prstGeom prst="roundRect">
@@ -14872,8 +14874,8 @@
           </a:p>
         </p:txBody>
       </p:sp>
-      <mc:AlternateContent xmlns:mc="http://schemas.openxmlformats.org/markup-compatibility/2006">
-        <mc:Choice xmlns:a14="http://schemas.microsoft.com/office/drawing/2010/main" Requires="a14">
+      <mc:AlternateContent xmlns:mc="http://schemas.openxmlformats.org/markup-compatibility/2006" xmlns:a14="http://schemas.microsoft.com/office/drawing/2010/main">
+        <mc:Choice Requires="a14">
           <p:sp>
             <p:nvSpPr>
               <p:cNvPr id="55" name="CaixaDeTexto 54"/>
@@ -14896,6 +14898,7 @@
               </a:bodyPr>
               <a:lstStyle/>
               <a:p>
+                <a:pPr/>
                 <a14:m>
                   <m:oMathPara xmlns:m="http://schemas.openxmlformats.org/officeDocument/2006/math">
                     <m:oMathParaPr>
@@ -14948,7 +14951,7 @@
             </p:txBody>
           </p:sp>
         </mc:Choice>
-        <mc:Fallback>
+        <mc:Fallback xmlns="">
           <p:sp>
             <p:nvSpPr>
               <p:cNvPr id="55" name="CaixaDeTexto 54"/>
@@ -15019,6 +15022,1163 @@
       </p:grpSpPr>
       <p:grpSp>
         <p:nvGrpSpPr>
+          <p:cNvPr id="2" name="Agrupar 1"/>
+          <p:cNvGrpSpPr/>
+          <p:nvPr/>
+        </p:nvGrpSpPr>
+        <p:grpSpPr>
+          <a:xfrm>
+            <a:off x="109342" y="151117"/>
+            <a:ext cx="7742362" cy="5642593"/>
+            <a:chOff x="137477" y="263658"/>
+            <a:chExt cx="7742362" cy="5642593"/>
+          </a:xfrm>
+        </p:grpSpPr>
+        <p:grpSp>
+          <p:nvGrpSpPr>
+            <p:cNvPr id="11" name="Agrupar 10"/>
+            <p:cNvGrpSpPr/>
+            <p:nvPr/>
+          </p:nvGrpSpPr>
+          <p:grpSpPr>
+            <a:xfrm>
+              <a:off x="388792" y="3545060"/>
+              <a:ext cx="1491175" cy="1308295"/>
+              <a:chOff x="2145323" y="1322363"/>
+              <a:chExt cx="1491175" cy="1308295"/>
+            </a:xfrm>
+          </p:grpSpPr>
+          <p:sp>
+            <p:nvSpPr>
+              <p:cNvPr id="10" name="Retângulo 9"/>
+              <p:cNvSpPr/>
+              <p:nvPr/>
+            </p:nvSpPr>
+            <p:spPr>
+              <a:xfrm>
+                <a:off x="2145323" y="1322363"/>
+                <a:ext cx="1491175" cy="1308295"/>
+              </a:xfrm>
+              <a:prstGeom prst="rect">
+                <a:avLst/>
+              </a:prstGeom>
+            </p:spPr>
+            <p:style>
+              <a:lnRef idx="2">
+                <a:schemeClr val="dk1">
+                  <a:shade val="50000"/>
+                </a:schemeClr>
+              </a:lnRef>
+              <a:fillRef idx="1">
+                <a:schemeClr val="dk1"/>
+              </a:fillRef>
+              <a:effectRef idx="0">
+                <a:schemeClr val="dk1"/>
+              </a:effectRef>
+              <a:fontRef idx="minor">
+                <a:schemeClr val="lt1"/>
+              </a:fontRef>
+            </p:style>
+            <p:txBody>
+              <a:bodyPr rtlCol="0" anchor="ctr"/>
+              <a:lstStyle/>
+              <a:p>
+                <a:pPr algn="ctr"/>
+                <a:endParaRPr lang="pt-BR"/>
+              </a:p>
+            </p:txBody>
+          </p:sp>
+          <p:sp>
+            <p:nvSpPr>
+              <p:cNvPr id="9" name="Retângulo 8"/>
+              <p:cNvSpPr/>
+              <p:nvPr/>
+            </p:nvSpPr>
+            <p:spPr>
+              <a:xfrm>
+                <a:off x="2335237" y="1322363"/>
+                <a:ext cx="1111348" cy="1111348"/>
+              </a:xfrm>
+              <a:prstGeom prst="rect">
+                <a:avLst/>
+              </a:prstGeom>
+            </p:spPr>
+            <p:style>
+              <a:lnRef idx="2">
+                <a:schemeClr val="accent3">
+                  <a:shade val="50000"/>
+                </a:schemeClr>
+              </a:lnRef>
+              <a:fillRef idx="1">
+                <a:schemeClr val="accent3"/>
+              </a:fillRef>
+              <a:effectRef idx="0">
+                <a:schemeClr val="accent3"/>
+              </a:effectRef>
+              <a:fontRef idx="minor">
+                <a:schemeClr val="lt1"/>
+              </a:fontRef>
+            </p:style>
+            <p:txBody>
+              <a:bodyPr rtlCol="0" anchor="ctr"/>
+              <a:lstStyle/>
+              <a:p>
+                <a:pPr algn="ctr"/>
+                <a:endParaRPr lang="pt-BR"/>
+              </a:p>
+            </p:txBody>
+          </p:sp>
+        </p:grpSp>
+        <p:grpSp>
+          <p:nvGrpSpPr>
+            <p:cNvPr id="12" name="Agrupar 11"/>
+            <p:cNvGrpSpPr/>
+            <p:nvPr/>
+          </p:nvGrpSpPr>
+          <p:grpSpPr>
+            <a:xfrm>
+              <a:off x="2299654" y="3545060"/>
+              <a:ext cx="1491175" cy="1308295"/>
+              <a:chOff x="2145323" y="1322363"/>
+              <a:chExt cx="1491175" cy="1308295"/>
+            </a:xfrm>
+          </p:grpSpPr>
+          <p:sp>
+            <p:nvSpPr>
+              <p:cNvPr id="13" name="Retângulo 12"/>
+              <p:cNvSpPr/>
+              <p:nvPr/>
+            </p:nvSpPr>
+            <p:spPr>
+              <a:xfrm>
+                <a:off x="2145323" y="1322363"/>
+                <a:ext cx="1491175" cy="1308295"/>
+              </a:xfrm>
+              <a:prstGeom prst="rect">
+                <a:avLst/>
+              </a:prstGeom>
+            </p:spPr>
+            <p:style>
+              <a:lnRef idx="2">
+                <a:schemeClr val="dk1">
+                  <a:shade val="50000"/>
+                </a:schemeClr>
+              </a:lnRef>
+              <a:fillRef idx="1">
+                <a:schemeClr val="dk1"/>
+              </a:fillRef>
+              <a:effectRef idx="0">
+                <a:schemeClr val="dk1"/>
+              </a:effectRef>
+              <a:fontRef idx="minor">
+                <a:schemeClr val="lt1"/>
+              </a:fontRef>
+            </p:style>
+            <p:txBody>
+              <a:bodyPr rtlCol="0" anchor="ctr"/>
+              <a:lstStyle/>
+              <a:p>
+                <a:pPr algn="ctr"/>
+                <a:endParaRPr lang="pt-BR"/>
+              </a:p>
+            </p:txBody>
+          </p:sp>
+          <p:sp>
+            <p:nvSpPr>
+              <p:cNvPr id="14" name="Retângulo 13"/>
+              <p:cNvSpPr/>
+              <p:nvPr/>
+            </p:nvSpPr>
+            <p:spPr>
+              <a:xfrm>
+                <a:off x="2335237" y="1322363"/>
+                <a:ext cx="1111348" cy="1111348"/>
+              </a:xfrm>
+              <a:prstGeom prst="rect">
+                <a:avLst/>
+              </a:prstGeom>
+            </p:spPr>
+            <p:style>
+              <a:lnRef idx="2">
+                <a:schemeClr val="accent3">
+                  <a:shade val="50000"/>
+                </a:schemeClr>
+              </a:lnRef>
+              <a:fillRef idx="1">
+                <a:schemeClr val="accent3"/>
+              </a:fillRef>
+              <a:effectRef idx="0">
+                <a:schemeClr val="accent3"/>
+              </a:effectRef>
+              <a:fontRef idx="minor">
+                <a:schemeClr val="lt1"/>
+              </a:fontRef>
+            </p:style>
+            <p:txBody>
+              <a:bodyPr rtlCol="0" anchor="ctr"/>
+              <a:lstStyle/>
+              <a:p>
+                <a:pPr algn="ctr"/>
+                <a:endParaRPr lang="pt-BR"/>
+              </a:p>
+            </p:txBody>
+          </p:sp>
+        </p:grpSp>
+        <p:grpSp>
+          <p:nvGrpSpPr>
+            <p:cNvPr id="15" name="Agrupar 14"/>
+            <p:cNvGrpSpPr/>
+            <p:nvPr/>
+          </p:nvGrpSpPr>
+          <p:grpSpPr>
+            <a:xfrm>
+              <a:off x="4210516" y="3545060"/>
+              <a:ext cx="1491175" cy="1308295"/>
+              <a:chOff x="2145323" y="1322363"/>
+              <a:chExt cx="1491175" cy="1308295"/>
+            </a:xfrm>
+          </p:grpSpPr>
+          <p:sp>
+            <p:nvSpPr>
+              <p:cNvPr id="16" name="Retângulo 15"/>
+              <p:cNvSpPr/>
+              <p:nvPr/>
+            </p:nvSpPr>
+            <p:spPr>
+              <a:xfrm>
+                <a:off x="2145323" y="1322363"/>
+                <a:ext cx="1491175" cy="1308295"/>
+              </a:xfrm>
+              <a:prstGeom prst="rect">
+                <a:avLst/>
+              </a:prstGeom>
+            </p:spPr>
+            <p:style>
+              <a:lnRef idx="2">
+                <a:schemeClr val="dk1">
+                  <a:shade val="50000"/>
+                </a:schemeClr>
+              </a:lnRef>
+              <a:fillRef idx="1">
+                <a:schemeClr val="dk1"/>
+              </a:fillRef>
+              <a:effectRef idx="0">
+                <a:schemeClr val="dk1"/>
+              </a:effectRef>
+              <a:fontRef idx="minor">
+                <a:schemeClr val="lt1"/>
+              </a:fontRef>
+            </p:style>
+            <p:txBody>
+              <a:bodyPr rtlCol="0" anchor="ctr"/>
+              <a:lstStyle/>
+              <a:p>
+                <a:pPr algn="ctr"/>
+                <a:endParaRPr lang="pt-BR"/>
+              </a:p>
+            </p:txBody>
+          </p:sp>
+          <p:sp>
+            <p:nvSpPr>
+              <p:cNvPr id="17" name="Retângulo 16"/>
+              <p:cNvSpPr/>
+              <p:nvPr/>
+            </p:nvSpPr>
+            <p:spPr>
+              <a:xfrm>
+                <a:off x="2335237" y="1322363"/>
+                <a:ext cx="1111348" cy="1111348"/>
+              </a:xfrm>
+              <a:prstGeom prst="rect">
+                <a:avLst/>
+              </a:prstGeom>
+            </p:spPr>
+            <p:style>
+              <a:lnRef idx="2">
+                <a:schemeClr val="accent3">
+                  <a:shade val="50000"/>
+                </a:schemeClr>
+              </a:lnRef>
+              <a:fillRef idx="1">
+                <a:schemeClr val="accent3"/>
+              </a:fillRef>
+              <a:effectRef idx="0">
+                <a:schemeClr val="accent3"/>
+              </a:effectRef>
+              <a:fontRef idx="minor">
+                <a:schemeClr val="lt1"/>
+              </a:fontRef>
+            </p:style>
+            <p:txBody>
+              <a:bodyPr rtlCol="0" anchor="ctr"/>
+              <a:lstStyle/>
+              <a:p>
+                <a:pPr algn="ctr"/>
+                <a:endParaRPr lang="pt-BR"/>
+              </a:p>
+            </p:txBody>
+          </p:sp>
+        </p:grpSp>
+        <p:grpSp>
+          <p:nvGrpSpPr>
+            <p:cNvPr id="18" name="Agrupar 17"/>
+            <p:cNvGrpSpPr/>
+            <p:nvPr/>
+          </p:nvGrpSpPr>
+          <p:grpSpPr>
+            <a:xfrm>
+              <a:off x="6121378" y="3545059"/>
+              <a:ext cx="1491175" cy="1308295"/>
+              <a:chOff x="2145323" y="1322363"/>
+              <a:chExt cx="1491175" cy="1308295"/>
+            </a:xfrm>
+          </p:grpSpPr>
+          <p:sp>
+            <p:nvSpPr>
+              <p:cNvPr id="19" name="Retângulo 18"/>
+              <p:cNvSpPr/>
+              <p:nvPr/>
+            </p:nvSpPr>
+            <p:spPr>
+              <a:xfrm>
+                <a:off x="2145323" y="1322363"/>
+                <a:ext cx="1491175" cy="1308295"/>
+              </a:xfrm>
+              <a:prstGeom prst="rect">
+                <a:avLst/>
+              </a:prstGeom>
+            </p:spPr>
+            <p:style>
+              <a:lnRef idx="2">
+                <a:schemeClr val="dk1">
+                  <a:shade val="50000"/>
+                </a:schemeClr>
+              </a:lnRef>
+              <a:fillRef idx="1">
+                <a:schemeClr val="dk1"/>
+              </a:fillRef>
+              <a:effectRef idx="0">
+                <a:schemeClr val="dk1"/>
+              </a:effectRef>
+              <a:fontRef idx="minor">
+                <a:schemeClr val="lt1"/>
+              </a:fontRef>
+            </p:style>
+            <p:txBody>
+              <a:bodyPr rtlCol="0" anchor="ctr"/>
+              <a:lstStyle/>
+              <a:p>
+                <a:pPr algn="ctr"/>
+                <a:endParaRPr lang="pt-BR"/>
+              </a:p>
+            </p:txBody>
+          </p:sp>
+          <p:sp>
+            <p:nvSpPr>
+              <p:cNvPr id="20" name="Retângulo 19"/>
+              <p:cNvSpPr/>
+              <p:nvPr/>
+            </p:nvSpPr>
+            <p:spPr>
+              <a:xfrm>
+                <a:off x="2335237" y="1322363"/>
+                <a:ext cx="1111348" cy="1111348"/>
+              </a:xfrm>
+              <a:prstGeom prst="rect">
+                <a:avLst/>
+              </a:prstGeom>
+            </p:spPr>
+            <p:style>
+              <a:lnRef idx="2">
+                <a:schemeClr val="accent3">
+                  <a:shade val="50000"/>
+                </a:schemeClr>
+              </a:lnRef>
+              <a:fillRef idx="1">
+                <a:schemeClr val="accent3"/>
+              </a:fillRef>
+              <a:effectRef idx="0">
+                <a:schemeClr val="accent3"/>
+              </a:effectRef>
+              <a:fontRef idx="minor">
+                <a:schemeClr val="lt1"/>
+              </a:fontRef>
+            </p:style>
+            <p:txBody>
+              <a:bodyPr rtlCol="0" anchor="ctr"/>
+              <a:lstStyle/>
+              <a:p>
+                <a:pPr algn="ctr"/>
+                <a:endParaRPr lang="pt-BR"/>
+              </a:p>
+            </p:txBody>
+          </p:sp>
+        </p:grpSp>
+        <p:sp>
+          <p:nvSpPr>
+            <p:cNvPr id="42" name="CaixaDeTexto 41"/>
+            <p:cNvSpPr txBox="1"/>
+            <p:nvPr/>
+          </p:nvSpPr>
+          <p:spPr>
+            <a:xfrm>
+              <a:off x="2040353" y="4952143"/>
+              <a:ext cx="2009776" cy="954107"/>
+            </a:xfrm>
+            <a:prstGeom prst="rect">
+              <a:avLst/>
+            </a:prstGeom>
+            <a:noFill/>
+          </p:spPr>
+          <p:txBody>
+            <a:bodyPr wrap="square" rtlCol="0">
+              <a:spAutoFit/>
+            </a:bodyPr>
+            <a:lstStyle/>
+            <a:p>
+              <a:pPr algn="ctr"/>
+              <a:r>
+                <a:rPr lang="pt-BR" sz="2800" dirty="0">
+                  <a:solidFill>
+                    <a:srgbClr val="FF0000"/>
+                  </a:solidFill>
+                </a:rPr>
+                <a:t>Estágio 2:</a:t>
+              </a:r>
+            </a:p>
+            <a:p>
+              <a:pPr algn="ctr"/>
+              <a:r>
+                <a:rPr lang="pt-BR" sz="2800" dirty="0">
+                  <a:solidFill>
+                    <a:srgbClr val="FF0000"/>
+                  </a:solidFill>
+                </a:rPr>
+                <a:t>Decodificar  </a:t>
+              </a:r>
+            </a:p>
+          </p:txBody>
+        </p:sp>
+        <p:sp>
+          <p:nvSpPr>
+            <p:cNvPr id="43" name="CaixaDeTexto 42"/>
+            <p:cNvSpPr txBox="1"/>
+            <p:nvPr/>
+          </p:nvSpPr>
+          <p:spPr>
+            <a:xfrm>
+              <a:off x="137477" y="4952144"/>
+              <a:ext cx="2009776" cy="954107"/>
+            </a:xfrm>
+            <a:prstGeom prst="rect">
+              <a:avLst/>
+            </a:prstGeom>
+            <a:noFill/>
+          </p:spPr>
+          <p:txBody>
+            <a:bodyPr wrap="square" rtlCol="0">
+              <a:spAutoFit/>
+            </a:bodyPr>
+            <a:lstStyle/>
+            <a:p>
+              <a:pPr algn="ctr"/>
+              <a:r>
+                <a:rPr lang="pt-BR" sz="2800" dirty="0">
+                  <a:solidFill>
+                    <a:srgbClr val="FF0000"/>
+                  </a:solidFill>
+                </a:rPr>
+                <a:t>Estágio 1:</a:t>
+              </a:r>
+            </a:p>
+            <a:p>
+              <a:pPr algn="ctr"/>
+              <a:r>
+                <a:rPr lang="pt-BR" sz="2800" dirty="0">
+                  <a:solidFill>
+                    <a:srgbClr val="FF0000"/>
+                  </a:solidFill>
+                </a:rPr>
+                <a:t>Adicionar  </a:t>
+              </a:r>
+            </a:p>
+          </p:txBody>
+        </p:sp>
+        <p:sp>
+          <p:nvSpPr>
+            <p:cNvPr id="44" name="CaixaDeTexto 43"/>
+            <p:cNvSpPr txBox="1"/>
+            <p:nvPr/>
+          </p:nvSpPr>
+          <p:spPr>
+            <a:xfrm>
+              <a:off x="3967187" y="4952143"/>
+              <a:ext cx="2009776" cy="954107"/>
+            </a:xfrm>
+            <a:prstGeom prst="rect">
+              <a:avLst/>
+            </a:prstGeom>
+            <a:noFill/>
+          </p:spPr>
+          <p:txBody>
+            <a:bodyPr wrap="square" rtlCol="0">
+              <a:spAutoFit/>
+            </a:bodyPr>
+            <a:lstStyle/>
+            <a:p>
+              <a:pPr algn="ctr"/>
+              <a:r>
+                <a:rPr lang="pt-BR" sz="2800" dirty="0">
+                  <a:solidFill>
+                    <a:srgbClr val="FF0000"/>
+                  </a:solidFill>
+                </a:rPr>
+                <a:t>Estágio 3:</a:t>
+              </a:r>
+            </a:p>
+            <a:p>
+              <a:pPr algn="ctr"/>
+              <a:r>
+                <a:rPr lang="pt-BR" sz="2800" dirty="0">
+                  <a:solidFill>
+                    <a:srgbClr val="FF0000"/>
+                  </a:solidFill>
+                </a:rPr>
+                <a:t>Operar  </a:t>
+              </a:r>
+            </a:p>
+          </p:txBody>
+        </p:sp>
+        <p:sp>
+          <p:nvSpPr>
+            <p:cNvPr id="45" name="CaixaDeTexto 44"/>
+            <p:cNvSpPr txBox="1"/>
+            <p:nvPr/>
+          </p:nvSpPr>
+          <p:spPr>
+            <a:xfrm>
+              <a:off x="5870063" y="4952144"/>
+              <a:ext cx="2009776" cy="954107"/>
+            </a:xfrm>
+            <a:prstGeom prst="rect">
+              <a:avLst/>
+            </a:prstGeom>
+            <a:noFill/>
+          </p:spPr>
+          <p:txBody>
+            <a:bodyPr wrap="square" rtlCol="0">
+              <a:spAutoFit/>
+            </a:bodyPr>
+            <a:lstStyle/>
+            <a:p>
+              <a:pPr algn="ctr"/>
+              <a:r>
+                <a:rPr lang="pt-BR" sz="2800" dirty="0">
+                  <a:solidFill>
+                    <a:srgbClr val="FF0000"/>
+                  </a:solidFill>
+                </a:rPr>
+                <a:t>Estágio 4:</a:t>
+              </a:r>
+            </a:p>
+            <a:p>
+              <a:pPr algn="ctr"/>
+              <a:r>
+                <a:rPr lang="pt-BR" sz="2800" dirty="0">
+                  <a:solidFill>
+                    <a:srgbClr val="FF0000"/>
+                  </a:solidFill>
+                </a:rPr>
+                <a:t>Retirar</a:t>
+              </a:r>
+            </a:p>
+          </p:txBody>
+        </p:sp>
+        <p:sp>
+          <p:nvSpPr>
+            <p:cNvPr id="30" name="Elipse 29"/>
+            <p:cNvSpPr/>
+            <p:nvPr/>
+          </p:nvSpPr>
+          <p:spPr>
+            <a:xfrm>
+              <a:off x="663944" y="3209780"/>
+              <a:ext cx="886265" cy="886265"/>
+            </a:xfrm>
+            <a:prstGeom prst="ellipse">
+              <a:avLst/>
+            </a:prstGeom>
+          </p:spPr>
+          <p:style>
+            <a:lnRef idx="2">
+              <a:schemeClr val="accent5">
+                <a:shade val="50000"/>
+              </a:schemeClr>
+            </a:lnRef>
+            <a:fillRef idx="1">
+              <a:schemeClr val="accent5"/>
+            </a:fillRef>
+            <a:effectRef idx="0">
+              <a:schemeClr val="accent5"/>
+            </a:effectRef>
+            <a:fontRef idx="minor">
+              <a:schemeClr val="lt1"/>
+            </a:fontRef>
+          </p:style>
+          <p:txBody>
+            <a:bodyPr rtlCol="0" anchor="ctr"/>
+            <a:lstStyle/>
+            <a:p>
+              <a:pPr algn="ctr"/>
+              <a:endParaRPr lang="pt-BR"/>
+            </a:p>
+          </p:txBody>
+        </p:sp>
+        <p:sp>
+          <p:nvSpPr>
+            <p:cNvPr id="32" name="Pentágono 31"/>
+            <p:cNvSpPr/>
+            <p:nvPr/>
+          </p:nvSpPr>
+          <p:spPr>
+            <a:xfrm>
+              <a:off x="2551899" y="3164263"/>
+              <a:ext cx="952735" cy="907367"/>
+            </a:xfrm>
+            <a:prstGeom prst="pentagon">
+              <a:avLst/>
+            </a:prstGeom>
+          </p:spPr>
+          <p:style>
+            <a:lnRef idx="2">
+              <a:schemeClr val="accent2">
+                <a:shade val="50000"/>
+              </a:schemeClr>
+            </a:lnRef>
+            <a:fillRef idx="1">
+              <a:schemeClr val="accent2"/>
+            </a:fillRef>
+            <a:effectRef idx="0">
+              <a:schemeClr val="accent2"/>
+            </a:effectRef>
+            <a:fontRef idx="minor">
+              <a:schemeClr val="lt1"/>
+            </a:fontRef>
+          </p:style>
+          <p:txBody>
+            <a:bodyPr rtlCol="0" anchor="ctr"/>
+            <a:lstStyle/>
+            <a:p>
+              <a:pPr algn="ctr"/>
+              <a:endParaRPr lang="pt-BR"/>
+            </a:p>
+          </p:txBody>
+        </p:sp>
+        <p:sp>
+          <p:nvSpPr>
+            <p:cNvPr id="34" name="Retângulo: Cantos Arredondados 33"/>
+            <p:cNvSpPr/>
+            <p:nvPr/>
+          </p:nvSpPr>
+          <p:spPr>
+            <a:xfrm>
+              <a:off x="4524543" y="3209780"/>
+              <a:ext cx="890953" cy="890953"/>
+            </a:xfrm>
+            <a:prstGeom prst="roundRect">
+              <a:avLst/>
+            </a:prstGeom>
+          </p:spPr>
+          <p:style>
+            <a:lnRef idx="2">
+              <a:schemeClr val="accent4">
+                <a:shade val="50000"/>
+              </a:schemeClr>
+            </a:lnRef>
+            <a:fillRef idx="1">
+              <a:schemeClr val="accent4"/>
+            </a:fillRef>
+            <a:effectRef idx="0">
+              <a:schemeClr val="accent4"/>
+            </a:effectRef>
+            <a:fontRef idx="minor">
+              <a:schemeClr val="lt1"/>
+            </a:fontRef>
+          </p:style>
+          <p:txBody>
+            <a:bodyPr rtlCol="0" anchor="ctr"/>
+            <a:lstStyle/>
+            <a:p>
+              <a:pPr algn="ctr"/>
+              <a:endParaRPr lang="pt-BR"/>
+            </a:p>
+          </p:txBody>
+        </p:sp>
+        <p:sp>
+          <p:nvSpPr>
+            <p:cNvPr id="35" name="Estrela: 5 Pontas 34"/>
+            <p:cNvSpPr/>
+            <p:nvPr/>
+          </p:nvSpPr>
+          <p:spPr>
+            <a:xfrm>
+              <a:off x="6340393" y="3018487"/>
+              <a:ext cx="1053143" cy="1053143"/>
+            </a:xfrm>
+            <a:prstGeom prst="star5">
+              <a:avLst/>
+            </a:prstGeom>
+          </p:spPr>
+          <p:style>
+            <a:lnRef idx="2">
+              <a:schemeClr val="accent6">
+                <a:shade val="50000"/>
+              </a:schemeClr>
+            </a:lnRef>
+            <a:fillRef idx="1">
+              <a:schemeClr val="accent6"/>
+            </a:fillRef>
+            <a:effectRef idx="0">
+              <a:schemeClr val="accent6"/>
+            </a:effectRef>
+            <a:fontRef idx="minor">
+              <a:schemeClr val="lt1"/>
+            </a:fontRef>
+          </p:style>
+          <p:txBody>
+            <a:bodyPr rtlCol="0" anchor="ctr"/>
+            <a:lstStyle/>
+            <a:p>
+              <a:pPr algn="ctr"/>
+              <a:endParaRPr lang="pt-BR"/>
+            </a:p>
+          </p:txBody>
+        </p:sp>
+        <mc:AlternateContent xmlns:mc="http://schemas.openxmlformats.org/markup-compatibility/2006">
+          <mc:Choice xmlns:a14="http://schemas.microsoft.com/office/drawing/2010/main" Requires="a14">
+            <p:sp>
+              <p:nvSpPr>
+                <p:cNvPr id="37" name="CaixaDeTexto 36"/>
+                <p:cNvSpPr txBox="1"/>
+                <p:nvPr/>
+              </p:nvSpPr>
+              <p:spPr>
+                <a:xfrm>
+                  <a:off x="3205628" y="2024793"/>
+                  <a:ext cx="2009776" cy="830997"/>
+                </a:xfrm>
+                <a:prstGeom prst="rect">
+                  <a:avLst/>
+                </a:prstGeom>
+                <a:noFill/>
+              </p:spPr>
+              <p:txBody>
+                <a:bodyPr wrap="square" rtlCol="0">
+                  <a:spAutoFit/>
+                </a:bodyPr>
+                <a:lstStyle/>
+                <a:p>
+                  <a:pPr/>
+                  <a14:m>
+                    <m:oMathPara xmlns:m="http://schemas.openxmlformats.org/officeDocument/2006/math">
+                      <m:oMathParaPr>
+                        <m:jc m:val="centerGroup"/>
+                      </m:oMathParaPr>
+                      <m:oMath xmlns:m="http://schemas.openxmlformats.org/officeDocument/2006/math">
+                        <m:sSub>
+                          <m:sSubPr>
+                            <m:ctrlPr>
+                              <a:rPr lang="pt-BR" sz="4800" b="0" i="1" smtClean="0">
+                                <a:solidFill>
+                                  <a:srgbClr val="FF0000"/>
+                                </a:solidFill>
+                                <a:latin typeface="Cambria Math" panose="02040503050406030204" pitchFamily="18" charset="0"/>
+                              </a:rPr>
+                            </m:ctrlPr>
+                          </m:sSubPr>
+                          <m:e>
+                            <m:r>
+                              <a:rPr lang="pt-BR" sz="4800" b="0" i="1" smtClean="0">
+                                <a:solidFill>
+                                  <a:srgbClr val="FF0000"/>
+                                </a:solidFill>
+                                <a:latin typeface="Cambria Math" panose="02040503050406030204" pitchFamily="18" charset="0"/>
+                              </a:rPr>
+                              <m:t>𝑡</m:t>
+                            </m:r>
+                          </m:e>
+                          <m:sub>
+                            <m:r>
+                              <a:rPr lang="pt-BR" sz="4800" b="0" i="1" smtClean="0">
+                                <a:solidFill>
+                                  <a:srgbClr val="FF0000"/>
+                                </a:solidFill>
+                                <a:latin typeface="Cambria Math" panose="02040503050406030204" pitchFamily="18" charset="0"/>
+                              </a:rPr>
+                              <m:t>3</m:t>
+                            </m:r>
+                          </m:sub>
+                        </m:sSub>
+                      </m:oMath>
+                    </m:oMathPara>
+                  </a14:m>
+                  <a:endParaRPr lang="pt-BR" dirty="0">
+                    <a:solidFill>
+                      <a:srgbClr val="FF0000"/>
+                    </a:solidFill>
+                  </a:endParaRPr>
+                </a:p>
+              </p:txBody>
+            </p:sp>
+          </mc:Choice>
+          <mc:Fallback>
+            <p:sp>
+              <p:nvSpPr>
+                <p:cNvPr id="37" name="CaixaDeTexto 36"/>
+                <p:cNvSpPr txBox="1">
+                  <a:spLocks noRot="1" noChangeAspect="1" noMove="1" noResize="1" noEditPoints="1" noAdjustHandles="1" noChangeArrowheads="1" noChangeShapeType="1" noTextEdit="1"/>
+                </p:cNvSpPr>
+                <p:nvPr/>
+              </p:nvSpPr>
+              <p:spPr>
+                <a:xfrm>
+                  <a:off x="3205628" y="2024793"/>
+                  <a:ext cx="2009776" cy="830997"/>
+                </a:xfrm>
+                <a:prstGeom prst="rect">
+                  <a:avLst/>
+                </a:prstGeom>
+                <a:blipFill>
+                  <a:blip r:embed="rId2"/>
+                  <a:stretch>
+                    <a:fillRect/>
+                  </a:stretch>
+                </a:blipFill>
+              </p:spPr>
+              <p:txBody>
+                <a:bodyPr/>
+                <a:lstStyle/>
+                <a:p>
+                  <a:r>
+                    <a:rPr lang="pt-BR">
+                      <a:noFill/>
+                    </a:rPr>
+                    <a:t> </a:t>
+                  </a:r>
+                </a:p>
+              </p:txBody>
+            </p:sp>
+          </mc:Fallback>
+        </mc:AlternateContent>
+        <p:sp>
+          <p:nvSpPr>
+            <p:cNvPr id="23" name="Pentágono 22"/>
+            <p:cNvSpPr/>
+            <p:nvPr/>
+          </p:nvSpPr>
+          <p:spPr>
+            <a:xfrm>
+              <a:off x="612842" y="2256896"/>
+              <a:ext cx="952735" cy="907367"/>
+            </a:xfrm>
+            <a:prstGeom prst="pentagon">
+              <a:avLst/>
+            </a:prstGeom>
+          </p:spPr>
+          <p:style>
+            <a:lnRef idx="2">
+              <a:schemeClr val="accent2">
+                <a:shade val="50000"/>
+              </a:schemeClr>
+            </a:lnRef>
+            <a:fillRef idx="1">
+              <a:schemeClr val="accent2"/>
+            </a:fillRef>
+            <a:effectRef idx="0">
+              <a:schemeClr val="accent2"/>
+            </a:effectRef>
+            <a:fontRef idx="minor">
+              <a:schemeClr val="lt1"/>
+            </a:fontRef>
+          </p:style>
+          <p:txBody>
+            <a:bodyPr rtlCol="0" anchor="ctr"/>
+            <a:lstStyle/>
+            <a:p>
+              <a:pPr algn="ctr"/>
+              <a:endParaRPr lang="pt-BR"/>
+            </a:p>
+          </p:txBody>
+        </p:sp>
+        <p:sp>
+          <p:nvSpPr>
+            <p:cNvPr id="24" name="Retângulo: Cantos Arredondados 23"/>
+            <p:cNvSpPr/>
+            <p:nvPr/>
+          </p:nvSpPr>
+          <p:spPr>
+            <a:xfrm>
+              <a:off x="612842" y="1267154"/>
+              <a:ext cx="890953" cy="890953"/>
+            </a:xfrm>
+            <a:prstGeom prst="roundRect">
+              <a:avLst/>
+            </a:prstGeom>
+          </p:spPr>
+          <p:style>
+            <a:lnRef idx="2">
+              <a:schemeClr val="accent4">
+                <a:shade val="50000"/>
+              </a:schemeClr>
+            </a:lnRef>
+            <a:fillRef idx="1">
+              <a:schemeClr val="accent4"/>
+            </a:fillRef>
+            <a:effectRef idx="0">
+              <a:schemeClr val="accent4"/>
+            </a:effectRef>
+            <a:fontRef idx="minor">
+              <a:schemeClr val="lt1"/>
+            </a:fontRef>
+          </p:style>
+          <p:txBody>
+            <a:bodyPr rtlCol="0" anchor="ctr"/>
+            <a:lstStyle/>
+            <a:p>
+              <a:pPr algn="ctr"/>
+              <a:endParaRPr lang="pt-BR"/>
+            </a:p>
+          </p:txBody>
+        </p:sp>
+        <p:sp>
+          <p:nvSpPr>
+            <p:cNvPr id="25" name="Elipse 24"/>
+            <p:cNvSpPr/>
+            <p:nvPr/>
+          </p:nvSpPr>
+          <p:spPr>
+            <a:xfrm>
+              <a:off x="617530" y="263658"/>
+              <a:ext cx="886265" cy="886265"/>
+            </a:xfrm>
+            <a:prstGeom prst="ellipse">
+              <a:avLst/>
+            </a:prstGeom>
+          </p:spPr>
+          <p:style>
+            <a:lnRef idx="2">
+              <a:schemeClr val="accent5">
+                <a:shade val="50000"/>
+              </a:schemeClr>
+            </a:lnRef>
+            <a:fillRef idx="1">
+              <a:schemeClr val="accent5"/>
+            </a:fillRef>
+            <a:effectRef idx="0">
+              <a:schemeClr val="accent5"/>
+            </a:effectRef>
+            <a:fontRef idx="minor">
+              <a:schemeClr val="lt1"/>
+            </a:fontRef>
+          </p:style>
+          <p:txBody>
+            <a:bodyPr rtlCol="0" anchor="ctr"/>
+            <a:lstStyle/>
+            <a:p>
+              <a:pPr algn="ctr"/>
+              <a:endParaRPr lang="pt-BR"/>
+            </a:p>
+          </p:txBody>
+        </p:sp>
+      </p:grpSp>
+      <p:cxnSp>
+        <p:nvCxnSpPr>
+          <p:cNvPr id="4" name="Conector de Seta Reta 3"/>
+          <p:cNvCxnSpPr/>
+          <p:nvPr/>
+        </p:nvCxnSpPr>
+        <p:spPr>
+          <a:xfrm flipV="1">
+            <a:off x="160511" y="6041374"/>
+            <a:ext cx="8305041" cy="14068"/>
+          </a:xfrm>
+          <a:prstGeom prst="straightConnector1">
+            <a:avLst/>
+          </a:prstGeom>
+          <a:ln>
+            <a:tailEnd type="triangle"/>
+          </a:ln>
+        </p:spPr>
+        <p:style>
+          <a:lnRef idx="1">
+            <a:schemeClr val="accent1"/>
+          </a:lnRef>
+          <a:fillRef idx="0">
+            <a:schemeClr val="accent1"/>
+          </a:fillRef>
+          <a:effectRef idx="0">
+            <a:schemeClr val="accent1"/>
+          </a:effectRef>
+          <a:fontRef idx="minor">
+            <a:schemeClr val="tx1"/>
+          </a:fontRef>
+        </p:style>
+      </p:cxnSp>
+      <p:sp>
+        <p:nvSpPr>
+          <p:cNvPr id="6" name="Arco 5"/>
+          <p:cNvSpPr/>
+          <p:nvPr/>
+        </p:nvSpPr>
+        <p:spPr>
+          <a:xfrm>
+            <a:off x="1304661" y="2734835"/>
+            <a:ext cx="1682919" cy="1006157"/>
+          </a:xfrm>
+          <a:prstGeom prst="arc">
+            <a:avLst>
+              <a:gd name="adj1" fmla="val 11093677"/>
+              <a:gd name="adj2" fmla="val 20802779"/>
+            </a:avLst>
+          </a:prstGeom>
+        </p:spPr>
+        <p:style>
+          <a:lnRef idx="1">
+            <a:schemeClr val="accent1"/>
+          </a:lnRef>
+          <a:fillRef idx="0">
+            <a:schemeClr val="accent1"/>
+          </a:fillRef>
+          <a:effectRef idx="0">
+            <a:schemeClr val="accent1"/>
+          </a:effectRef>
+          <a:fontRef idx="minor">
+            <a:schemeClr val="tx1"/>
+          </a:fontRef>
+        </p:style>
+        <p:txBody>
+          <a:bodyPr rtlCol="0" anchor="ctr"/>
+          <a:lstStyle/>
+          <a:p>
+            <a:pPr algn="ctr"/>
+            <a:endParaRPr lang="pt-BR"/>
+          </a:p>
+        </p:txBody>
+      </p:sp>
+      <p:sp>
+        <p:nvSpPr>
+          <p:cNvPr id="31" name="Arco 30"/>
+          <p:cNvSpPr/>
+          <p:nvPr/>
+        </p:nvSpPr>
+        <p:spPr>
+          <a:xfrm>
+            <a:off x="3244134" y="2681775"/>
+            <a:ext cx="1682919" cy="1006157"/>
+          </a:xfrm>
+          <a:prstGeom prst="arc">
+            <a:avLst>
+              <a:gd name="adj1" fmla="val 11093677"/>
+              <a:gd name="adj2" fmla="val 21110599"/>
+            </a:avLst>
+          </a:prstGeom>
+        </p:spPr>
+        <p:style>
+          <a:lnRef idx="1">
+            <a:schemeClr val="accent1"/>
+          </a:lnRef>
+          <a:fillRef idx="0">
+            <a:schemeClr val="accent1"/>
+          </a:fillRef>
+          <a:effectRef idx="0">
+            <a:schemeClr val="accent1"/>
+          </a:effectRef>
+          <a:fontRef idx="minor">
+            <a:schemeClr val="tx1"/>
+          </a:fontRef>
+        </p:style>
+        <p:txBody>
+          <a:bodyPr rtlCol="0" anchor="ctr"/>
+          <a:lstStyle/>
+          <a:p>
+            <a:pPr algn="ctr"/>
+            <a:endParaRPr lang="pt-BR"/>
+          </a:p>
+        </p:txBody>
+      </p:sp>
+      <p:sp>
+        <p:nvSpPr>
+          <p:cNvPr id="33" name="Arco 32"/>
+          <p:cNvSpPr/>
+          <p:nvPr/>
+        </p:nvSpPr>
+        <p:spPr>
+          <a:xfrm>
+            <a:off x="5010546" y="2602789"/>
+            <a:ext cx="1682919" cy="1006157"/>
+          </a:xfrm>
+          <a:prstGeom prst="arc">
+            <a:avLst>
+              <a:gd name="adj1" fmla="val 11093677"/>
+              <a:gd name="adj2" fmla="val 21110599"/>
+            </a:avLst>
+          </a:prstGeom>
+        </p:spPr>
+        <p:style>
+          <a:lnRef idx="1">
+            <a:schemeClr val="accent1"/>
+          </a:lnRef>
+          <a:fillRef idx="0">
+            <a:schemeClr val="accent1"/>
+          </a:fillRef>
+          <a:effectRef idx="0">
+            <a:schemeClr val="accent1"/>
+          </a:effectRef>
+          <a:fontRef idx="minor">
+            <a:schemeClr val="tx1"/>
+          </a:fontRef>
+        </p:style>
+        <p:txBody>
+          <a:bodyPr rtlCol="0" anchor="ctr"/>
+          <a:lstStyle/>
+          <a:p>
+            <a:pPr algn="ctr"/>
+            <a:endParaRPr lang="pt-BR"/>
+          </a:p>
+        </p:txBody>
+      </p:sp>
+    </p:spTree>
+    <p:extLst>
+      <p:ext uri="{BB962C8B-B14F-4D97-AF65-F5344CB8AC3E}">
+        <p14:creationId xmlns:p14="http://schemas.microsoft.com/office/powerpoint/2010/main" val="1156631376"/>
+      </p:ext>
+    </p:extLst>
+  </p:cSld>
+  <p:clrMapOvr>
+    <a:masterClrMapping/>
+  </p:clrMapOvr>
+</p:sld>
+</file>
+
+<file path=ppt/slides/slide15.xml><?xml version="1.0" encoding="utf-8"?>
+<p:sld xmlns:a="http://schemas.openxmlformats.org/drawingml/2006/main" xmlns:r="http://schemas.openxmlformats.org/officeDocument/2006/relationships" xmlns:p="http://schemas.openxmlformats.org/presentationml/2006/main">
+  <p:cSld>
+    <p:spTree>
+      <p:nvGrpSpPr>
+        <p:cNvPr id="1" name=""/>
+        <p:cNvGrpSpPr/>
+        <p:nvPr/>
+      </p:nvGrpSpPr>
+      <p:grpSpPr>
+        <a:xfrm>
+          <a:off x="0" y="0"/>
+          <a:ext cx="0" cy="0"/>
+          <a:chOff x="0" y="0"/>
+          <a:chExt cx="0" cy="0"/>
+        </a:xfrm>
+      </p:grpSpPr>
+      <p:grpSp>
+        <p:nvGrpSpPr>
           <p:cNvPr id="11" name="Agrupar 10"/>
           <p:cNvGrpSpPr/>
           <p:nvPr/>
@@ -15026,7 +16186,7 @@
         <p:grpSpPr>
           <a:xfrm>
             <a:off x="1978442" y="4318783"/>
-            <a:ext cx="1491175" cy="1308295"/>
+            <a:ext cx="4088529" cy="1308295"/>
             <a:chOff x="2145323" y="1322363"/>
             <a:chExt cx="1491175" cy="1308295"/>
           </a:xfrm>
@@ -15079,293 +16239,8 @@
           </p:nvSpPr>
           <p:spPr>
             <a:xfrm>
-              <a:off x="2335237" y="1322363"/>
-              <a:ext cx="1111348" cy="1111348"/>
-            </a:xfrm>
-            <a:prstGeom prst="rect">
-              <a:avLst/>
-            </a:prstGeom>
-          </p:spPr>
-          <p:style>
-            <a:lnRef idx="2">
-              <a:schemeClr val="accent3">
-                <a:shade val="50000"/>
-              </a:schemeClr>
-            </a:lnRef>
-            <a:fillRef idx="1">
-              <a:schemeClr val="accent3"/>
-            </a:fillRef>
-            <a:effectRef idx="0">
-              <a:schemeClr val="accent3"/>
-            </a:effectRef>
-            <a:fontRef idx="minor">
-              <a:schemeClr val="lt1"/>
-            </a:fontRef>
-          </p:style>
-          <p:txBody>
-            <a:bodyPr rtlCol="0" anchor="ctr"/>
-            <a:lstStyle/>
-            <a:p>
-              <a:pPr algn="ctr"/>
-              <a:endParaRPr lang="pt-BR"/>
-            </a:p>
-          </p:txBody>
-        </p:sp>
-      </p:grpSp>
-      <p:grpSp>
-        <p:nvGrpSpPr>
-          <p:cNvPr id="12" name="Agrupar 11"/>
-          <p:cNvGrpSpPr/>
-          <p:nvPr/>
-        </p:nvGrpSpPr>
-        <p:grpSpPr>
-          <a:xfrm>
-            <a:off x="3889304" y="4318783"/>
-            <a:ext cx="1491175" cy="1308295"/>
-            <a:chOff x="2145323" y="1322363"/>
-            <a:chExt cx="1491175" cy="1308295"/>
-          </a:xfrm>
-        </p:grpSpPr>
-        <p:sp>
-          <p:nvSpPr>
-            <p:cNvPr id="13" name="Retângulo 12"/>
-            <p:cNvSpPr/>
-            <p:nvPr/>
-          </p:nvSpPr>
-          <p:spPr>
-            <a:xfrm>
-              <a:off x="2145323" y="1322363"/>
-              <a:ext cx="1491175" cy="1308295"/>
-            </a:xfrm>
-            <a:prstGeom prst="rect">
-              <a:avLst/>
-            </a:prstGeom>
-          </p:spPr>
-          <p:style>
-            <a:lnRef idx="2">
-              <a:schemeClr val="dk1">
-                <a:shade val="50000"/>
-              </a:schemeClr>
-            </a:lnRef>
-            <a:fillRef idx="1">
-              <a:schemeClr val="dk1"/>
-            </a:fillRef>
-            <a:effectRef idx="0">
-              <a:schemeClr val="dk1"/>
-            </a:effectRef>
-            <a:fontRef idx="minor">
-              <a:schemeClr val="lt1"/>
-            </a:fontRef>
-          </p:style>
-          <p:txBody>
-            <a:bodyPr rtlCol="0" anchor="ctr"/>
-            <a:lstStyle/>
-            <a:p>
-              <a:pPr algn="ctr"/>
-              <a:endParaRPr lang="pt-BR"/>
-            </a:p>
-          </p:txBody>
-        </p:sp>
-        <p:sp>
-          <p:nvSpPr>
-            <p:cNvPr id="14" name="Retângulo 13"/>
-            <p:cNvSpPr/>
-            <p:nvPr/>
-          </p:nvSpPr>
-          <p:spPr>
-            <a:xfrm>
-              <a:off x="2335237" y="1322363"/>
-              <a:ext cx="1111348" cy="1111348"/>
-            </a:xfrm>
-            <a:prstGeom prst="rect">
-              <a:avLst/>
-            </a:prstGeom>
-          </p:spPr>
-          <p:style>
-            <a:lnRef idx="2">
-              <a:schemeClr val="accent3">
-                <a:shade val="50000"/>
-              </a:schemeClr>
-            </a:lnRef>
-            <a:fillRef idx="1">
-              <a:schemeClr val="accent3"/>
-            </a:fillRef>
-            <a:effectRef idx="0">
-              <a:schemeClr val="accent3"/>
-            </a:effectRef>
-            <a:fontRef idx="minor">
-              <a:schemeClr val="lt1"/>
-            </a:fontRef>
-          </p:style>
-          <p:txBody>
-            <a:bodyPr rtlCol="0" anchor="ctr"/>
-            <a:lstStyle/>
-            <a:p>
-              <a:pPr algn="ctr"/>
-              <a:endParaRPr lang="pt-BR"/>
-            </a:p>
-          </p:txBody>
-        </p:sp>
-      </p:grpSp>
-      <p:grpSp>
-        <p:nvGrpSpPr>
-          <p:cNvPr id="15" name="Agrupar 14"/>
-          <p:cNvGrpSpPr/>
-          <p:nvPr/>
-        </p:nvGrpSpPr>
-        <p:grpSpPr>
-          <a:xfrm>
-            <a:off x="5800166" y="4318783"/>
-            <a:ext cx="1491175" cy="1308295"/>
-            <a:chOff x="2145323" y="1322363"/>
-            <a:chExt cx="1491175" cy="1308295"/>
-          </a:xfrm>
-        </p:grpSpPr>
-        <p:sp>
-          <p:nvSpPr>
-            <p:cNvPr id="16" name="Retângulo 15"/>
-            <p:cNvSpPr/>
-            <p:nvPr/>
-          </p:nvSpPr>
-          <p:spPr>
-            <a:xfrm>
-              <a:off x="2145323" y="1322363"/>
-              <a:ext cx="1491175" cy="1308295"/>
-            </a:xfrm>
-            <a:prstGeom prst="rect">
-              <a:avLst/>
-            </a:prstGeom>
-          </p:spPr>
-          <p:style>
-            <a:lnRef idx="2">
-              <a:schemeClr val="dk1">
-                <a:shade val="50000"/>
-              </a:schemeClr>
-            </a:lnRef>
-            <a:fillRef idx="1">
-              <a:schemeClr val="dk1"/>
-            </a:fillRef>
-            <a:effectRef idx="0">
-              <a:schemeClr val="dk1"/>
-            </a:effectRef>
-            <a:fontRef idx="minor">
-              <a:schemeClr val="lt1"/>
-            </a:fontRef>
-          </p:style>
-          <p:txBody>
-            <a:bodyPr rtlCol="0" anchor="ctr"/>
-            <a:lstStyle/>
-            <a:p>
-              <a:pPr algn="ctr"/>
-              <a:endParaRPr lang="pt-BR"/>
-            </a:p>
-          </p:txBody>
-        </p:sp>
-        <p:sp>
-          <p:nvSpPr>
-            <p:cNvPr id="17" name="Retângulo 16"/>
-            <p:cNvSpPr/>
-            <p:nvPr/>
-          </p:nvSpPr>
-          <p:spPr>
-            <a:xfrm>
-              <a:off x="2335237" y="1322363"/>
-              <a:ext cx="1111348" cy="1111348"/>
-            </a:xfrm>
-            <a:prstGeom prst="rect">
-              <a:avLst/>
-            </a:prstGeom>
-          </p:spPr>
-          <p:style>
-            <a:lnRef idx="2">
-              <a:schemeClr val="accent3">
-                <a:shade val="50000"/>
-              </a:schemeClr>
-            </a:lnRef>
-            <a:fillRef idx="1">
-              <a:schemeClr val="accent3"/>
-            </a:fillRef>
-            <a:effectRef idx="0">
-              <a:schemeClr val="accent3"/>
-            </a:effectRef>
-            <a:fontRef idx="minor">
-              <a:schemeClr val="lt1"/>
-            </a:fontRef>
-          </p:style>
-          <p:txBody>
-            <a:bodyPr rtlCol="0" anchor="ctr"/>
-            <a:lstStyle/>
-            <a:p>
-              <a:pPr algn="ctr"/>
-              <a:endParaRPr lang="pt-BR"/>
-            </a:p>
-          </p:txBody>
-        </p:sp>
-      </p:grpSp>
-      <p:grpSp>
-        <p:nvGrpSpPr>
-          <p:cNvPr id="18" name="Agrupar 17"/>
-          <p:cNvGrpSpPr/>
-          <p:nvPr/>
-        </p:nvGrpSpPr>
-        <p:grpSpPr>
-          <a:xfrm>
-            <a:off x="7711028" y="4318782"/>
-            <a:ext cx="1491175" cy="1308295"/>
-            <a:chOff x="2145323" y="1322363"/>
-            <a:chExt cx="1491175" cy="1308295"/>
-          </a:xfrm>
-        </p:grpSpPr>
-        <p:sp>
-          <p:nvSpPr>
-            <p:cNvPr id="19" name="Retângulo 18"/>
-            <p:cNvSpPr/>
-            <p:nvPr/>
-          </p:nvSpPr>
-          <p:spPr>
-            <a:xfrm>
-              <a:off x="2145323" y="1322363"/>
-              <a:ext cx="1491175" cy="1308295"/>
-            </a:xfrm>
-            <a:prstGeom prst="rect">
-              <a:avLst/>
-            </a:prstGeom>
-          </p:spPr>
-          <p:style>
-            <a:lnRef idx="2">
-              <a:schemeClr val="dk1">
-                <a:shade val="50000"/>
-              </a:schemeClr>
-            </a:lnRef>
-            <a:fillRef idx="1">
-              <a:schemeClr val="dk1"/>
-            </a:fillRef>
-            <a:effectRef idx="0">
-              <a:schemeClr val="dk1"/>
-            </a:effectRef>
-            <a:fontRef idx="minor">
-              <a:schemeClr val="lt1"/>
-            </a:fontRef>
-          </p:style>
-          <p:txBody>
-            <a:bodyPr rtlCol="0" anchor="ctr"/>
-            <a:lstStyle/>
-            <a:p>
-              <a:pPr algn="ctr"/>
-              <a:endParaRPr lang="pt-BR"/>
-            </a:p>
-          </p:txBody>
-        </p:sp>
-        <p:sp>
-          <p:nvSpPr>
-            <p:cNvPr id="20" name="Retângulo 19"/>
-            <p:cNvSpPr/>
-            <p:nvPr/>
-          </p:nvSpPr>
-          <p:spPr>
-            <a:xfrm>
-              <a:off x="2335237" y="1322363"/>
-              <a:ext cx="1111348" cy="1111348"/>
+              <a:off x="2245677" y="1322363"/>
+              <a:ext cx="1290242" cy="1111348"/>
             </a:xfrm>
             <a:prstGeom prst="rect">
               <a:avLst/>
@@ -15399,14 +16274,14 @@
       </p:grpSp>
       <p:sp>
         <p:nvSpPr>
-          <p:cNvPr id="42" name="CaixaDeTexto 41"/>
+          <p:cNvPr id="43" name="CaixaDeTexto 42"/>
           <p:cNvSpPr txBox="1"/>
           <p:nvPr/>
         </p:nvSpPr>
         <p:spPr>
           <a:xfrm>
-            <a:off x="3630003" y="5725866"/>
-            <a:ext cx="2009776" cy="954107"/>
+            <a:off x="-1013509" y="5700748"/>
+            <a:ext cx="7475076" cy="523220"/>
           </a:xfrm>
           <a:prstGeom prst="rect">
             <a:avLst/>
@@ -15426,153 +16301,7 @@
                   <a:srgbClr val="FF0000"/>
                 </a:solidFill>
               </a:rPr>
-              <a:t>Estágio 2:</a:t>
-            </a:r>
-          </a:p>
-          <a:p>
-            <a:pPr algn="ctr"/>
-            <a:r>
-              <a:rPr lang="pt-BR" sz="2800" dirty="0">
-                <a:solidFill>
-                  <a:srgbClr val="FF0000"/>
-                </a:solidFill>
-              </a:rPr>
-              <a:t>Decodificar  </a:t>
-            </a:r>
-          </a:p>
-        </p:txBody>
-      </p:sp>
-      <p:sp>
-        <p:nvSpPr>
-          <p:cNvPr id="43" name="CaixaDeTexto 42"/>
-          <p:cNvSpPr txBox="1"/>
-          <p:nvPr/>
-        </p:nvSpPr>
-        <p:spPr>
-          <a:xfrm>
-            <a:off x="1727127" y="5725867"/>
-            <a:ext cx="2009776" cy="954107"/>
-          </a:xfrm>
-          <a:prstGeom prst="rect">
-            <a:avLst/>
-          </a:prstGeom>
-          <a:noFill/>
-        </p:spPr>
-        <p:txBody>
-          <a:bodyPr wrap="square" rtlCol="0">
-            <a:spAutoFit/>
-          </a:bodyPr>
-          <a:lstStyle/>
-          <a:p>
-            <a:pPr algn="ctr"/>
-            <a:r>
-              <a:rPr lang="pt-BR" sz="2800" dirty="0">
-                <a:solidFill>
-                  <a:srgbClr val="FF0000"/>
-                </a:solidFill>
-              </a:rPr>
-              <a:t>Estágio 1:</a:t>
-            </a:r>
-          </a:p>
-          <a:p>
-            <a:pPr algn="ctr"/>
-            <a:r>
-              <a:rPr lang="pt-BR" sz="2800" dirty="0">
-                <a:solidFill>
-                  <a:srgbClr val="FF0000"/>
-                </a:solidFill>
-              </a:rPr>
-              <a:t>Adicionar  </a:t>
-            </a:r>
-          </a:p>
-        </p:txBody>
-      </p:sp>
-      <p:sp>
-        <p:nvSpPr>
-          <p:cNvPr id="44" name="CaixaDeTexto 43"/>
-          <p:cNvSpPr txBox="1"/>
-          <p:nvPr/>
-        </p:nvSpPr>
-        <p:spPr>
-          <a:xfrm>
-            <a:off x="5556837" y="5725866"/>
-            <a:ext cx="2009776" cy="954107"/>
-          </a:xfrm>
-          <a:prstGeom prst="rect">
-            <a:avLst/>
-          </a:prstGeom>
-          <a:noFill/>
-        </p:spPr>
-        <p:txBody>
-          <a:bodyPr wrap="square" rtlCol="0">
-            <a:spAutoFit/>
-          </a:bodyPr>
-          <a:lstStyle/>
-          <a:p>
-            <a:pPr algn="ctr"/>
-            <a:r>
-              <a:rPr lang="pt-BR" sz="2800" dirty="0">
-                <a:solidFill>
-                  <a:srgbClr val="FF0000"/>
-                </a:solidFill>
-              </a:rPr>
-              <a:t>Estágio 3:</a:t>
-            </a:r>
-          </a:p>
-          <a:p>
-            <a:pPr algn="ctr"/>
-            <a:r>
-              <a:rPr lang="pt-BR" sz="2800" dirty="0">
-                <a:solidFill>
-                  <a:srgbClr val="FF0000"/>
-                </a:solidFill>
-              </a:rPr>
-              <a:t>Operar  </a:t>
-            </a:r>
-          </a:p>
-        </p:txBody>
-      </p:sp>
-      <p:sp>
-        <p:nvSpPr>
-          <p:cNvPr id="45" name="CaixaDeTexto 44"/>
-          <p:cNvSpPr txBox="1"/>
-          <p:nvPr/>
-        </p:nvSpPr>
-        <p:spPr>
-          <a:xfrm>
-            <a:off x="7459713" y="5725867"/>
-            <a:ext cx="2009776" cy="954107"/>
-          </a:xfrm>
-          <a:prstGeom prst="rect">
-            <a:avLst/>
-          </a:prstGeom>
-          <a:noFill/>
-        </p:spPr>
-        <p:txBody>
-          <a:bodyPr wrap="square" rtlCol="0">
-            <a:spAutoFit/>
-          </a:bodyPr>
-          <a:lstStyle/>
-          <a:p>
-            <a:pPr algn="ctr"/>
-            <a:r>
-              <a:rPr lang="pt-BR" sz="2800" dirty="0">
-                <a:solidFill>
-                  <a:srgbClr val="FF0000"/>
-                </a:solidFill>
-              </a:rPr>
-              <a:t>Estágio 4:</a:t>
-            </a:r>
-          </a:p>
-          <a:p>
-            <a:pPr algn="ctr"/>
-            <a:r>
-              <a:rPr lang="pt-BR" sz="2800" dirty="0">
-                <a:solidFill>
-                  <a:srgbClr val="FF0000"/>
-                </a:solidFill>
-              </a:rPr>
-              <a:t>Retirar</a:t>
+              <a:t>Estágio único  </a:t>
             </a:r>
           </a:p>
         </p:txBody>
@@ -15585,7 +16314,7 @@
         </p:nvSpPr>
         <p:spPr>
           <a:xfrm>
-            <a:off x="2253594" y="3983503"/>
+            <a:off x="3579264" y="3923661"/>
             <a:ext cx="886265" cy="886265"/>
           </a:xfrm>
           <a:prstGeom prst="ellipse">
@@ -15619,14 +16348,14 @@
       </p:sp>
       <p:sp>
         <p:nvSpPr>
-          <p:cNvPr id="32" name="Pentágono 31"/>
+          <p:cNvPr id="23" name="Pentágono 22"/>
           <p:cNvSpPr/>
           <p:nvPr/>
         </p:nvSpPr>
         <p:spPr>
           <a:xfrm>
-            <a:off x="4141549" y="3937986"/>
-            <a:ext cx="952735" cy="907367"/>
+            <a:off x="3197565" y="1738433"/>
+            <a:ext cx="1649660" cy="866253"/>
           </a:xfrm>
           <a:prstGeom prst="pentagon">
             <a:avLst/>
@@ -15659,14 +16388,14 @@
       </p:sp>
       <p:sp>
         <p:nvSpPr>
-          <p:cNvPr id="34" name="Retângulo: Cantos Arredondados 33"/>
+          <p:cNvPr id="24" name="Retângulo: Cantos Arredondados 23"/>
           <p:cNvSpPr/>
           <p:nvPr/>
         </p:nvSpPr>
         <p:spPr>
-          <a:xfrm>
-            <a:off x="6114193" y="3983503"/>
-            <a:ext cx="890953" cy="890953"/>
+          <a:xfrm rot="5400000">
+            <a:off x="3576919" y="2169583"/>
+            <a:ext cx="890953" cy="2121374"/>
           </a:xfrm>
           <a:prstGeom prst="roundRect">
             <a:avLst/>
@@ -15699,30 +16428,30 @@
       </p:sp>
       <p:sp>
         <p:nvSpPr>
-          <p:cNvPr id="35" name="Estrela: 5 Pontas 34"/>
+          <p:cNvPr id="25" name="Elipse 24"/>
           <p:cNvSpPr/>
           <p:nvPr/>
         </p:nvSpPr>
         <p:spPr>
           <a:xfrm>
-            <a:off x="7930043" y="3792210"/>
-            <a:ext cx="1053143" cy="1053143"/>
+            <a:off x="3579264" y="683765"/>
+            <a:ext cx="886265" cy="886265"/>
           </a:xfrm>
-          <a:prstGeom prst="star5">
+          <a:prstGeom prst="ellipse">
             <a:avLst/>
           </a:prstGeom>
         </p:spPr>
         <p:style>
           <a:lnRef idx="2">
-            <a:schemeClr val="accent6">
+            <a:schemeClr val="accent5">
               <a:shade val="50000"/>
             </a:schemeClr>
           </a:lnRef>
           <a:fillRef idx="1">
-            <a:schemeClr val="accent6"/>
+            <a:schemeClr val="accent5"/>
           </a:fillRef>
           <a:effectRef idx="0">
-            <a:schemeClr val="accent6"/>
+            <a:schemeClr val="accent5"/>
           </a:effectRef>
           <a:fontRef idx="minor">
             <a:schemeClr val="lt1"/>
@@ -15737,125 +16466,630 @@
           </a:p>
         </p:txBody>
       </p:sp>
-      <mc:AlternateContent xmlns:mc="http://schemas.openxmlformats.org/markup-compatibility/2006">
-        <mc:Choice xmlns:a14="http://schemas.microsoft.com/office/drawing/2010/main" Requires="a14">
-          <p:sp>
-            <p:nvSpPr>
-              <p:cNvPr id="37" name="CaixaDeTexto 36"/>
-              <p:cNvSpPr txBox="1"/>
-              <p:nvPr/>
-            </p:nvSpPr>
-            <p:spPr>
-              <a:xfrm>
-                <a:off x="4795278" y="2798516"/>
-                <a:ext cx="2009776" cy="830997"/>
-              </a:xfrm>
-              <a:prstGeom prst="rect">
-                <a:avLst/>
-              </a:prstGeom>
-              <a:noFill/>
-            </p:spPr>
-            <p:txBody>
-              <a:bodyPr wrap="square" rtlCol="0">
-                <a:spAutoFit/>
-              </a:bodyPr>
-              <a:lstStyle/>
-              <a:p>
-                <a14:m>
-                  <m:oMathPara xmlns:m="http://schemas.openxmlformats.org/officeDocument/2006/math">
-                    <m:oMathParaPr>
-                      <m:jc m:val="centerGroup"/>
-                    </m:oMathParaPr>
-                    <m:oMath xmlns:m="http://schemas.openxmlformats.org/officeDocument/2006/math">
-                      <m:sSub>
-                        <m:sSubPr>
-                          <m:ctrlPr>
-                            <a:rPr lang="pt-BR" sz="4800" b="0" i="1" smtClean="0">
-                              <a:solidFill>
-                                <a:srgbClr val="FF0000"/>
-                              </a:solidFill>
-                              <a:latin typeface="Cambria Math" panose="02040503050406030204" pitchFamily="18" charset="0"/>
-                            </a:rPr>
-                          </m:ctrlPr>
-                        </m:sSubPr>
-                        <m:e>
-                          <m:r>
-                            <a:rPr lang="pt-BR" sz="4800" b="0" i="1" smtClean="0">
-                              <a:solidFill>
-                                <a:srgbClr val="FF0000"/>
-                              </a:solidFill>
-                              <a:latin typeface="Cambria Math" panose="02040503050406030204" pitchFamily="18" charset="0"/>
-                            </a:rPr>
-                            <m:t>𝑡</m:t>
-                          </m:r>
-                        </m:e>
-                        <m:sub>
-                          <m:r>
-                            <a:rPr lang="pt-BR" sz="4800" b="0" i="1" smtClean="0">
-                              <a:solidFill>
-                                <a:srgbClr val="FF0000"/>
-                              </a:solidFill>
-                              <a:latin typeface="Cambria Math" panose="02040503050406030204" pitchFamily="18" charset="0"/>
-                            </a:rPr>
-                            <m:t>3</m:t>
-                          </m:r>
-                        </m:sub>
-                      </m:sSub>
-                    </m:oMath>
-                  </m:oMathPara>
-                </a14:m>
-                <a:endParaRPr lang="pt-BR" dirty="0">
-                  <a:solidFill>
-                    <a:srgbClr val="FF0000"/>
-                  </a:solidFill>
-                </a:endParaRPr>
-              </a:p>
-            </p:txBody>
-          </p:sp>
-        </mc:Choice>
-        <mc:Fallback>
-          <p:sp>
-            <p:nvSpPr>
-              <p:cNvPr id="37" name="CaixaDeTexto 36"/>
-              <p:cNvSpPr txBox="1">
-                <a:spLocks noRot="1" noChangeAspect="1" noMove="1" noResize="1" noEditPoints="1" noAdjustHandles="1" noChangeArrowheads="1" noChangeShapeType="1" noTextEdit="1"/>
-              </p:cNvSpPr>
-              <p:nvPr/>
-            </p:nvSpPr>
-            <p:spPr>
-              <a:xfrm>
-                <a:off x="4795278" y="2798516"/>
-                <a:ext cx="2009776" cy="830997"/>
-              </a:xfrm>
-              <a:prstGeom prst="rect">
-                <a:avLst/>
-              </a:prstGeom>
-              <a:blipFill>
-                <a:blip r:embed="rId2"/>
-                <a:stretch>
-                  <a:fillRect/>
-                </a:stretch>
-              </a:blipFill>
-            </p:spPr>
-            <p:txBody>
-              <a:bodyPr/>
-              <a:lstStyle/>
-              <a:p>
-                <a:r>
-                  <a:rPr lang="pt-BR">
-                    <a:noFill/>
-                  </a:rPr>
-                  <a:t> </a:t>
-                </a:r>
-              </a:p>
-            </p:txBody>
-          </p:sp>
-        </mc:Fallback>
-      </mc:AlternateContent>
+      <p:sp>
+        <p:nvSpPr>
+          <p:cNvPr id="26" name="CaixaDeTexto 25"/>
+          <p:cNvSpPr txBox="1"/>
+          <p:nvPr/>
+        </p:nvSpPr>
+        <p:spPr>
+          <a:xfrm>
+            <a:off x="5935782" y="1927268"/>
+            <a:ext cx="2990503" cy="1384995"/>
+          </a:xfrm>
+          <a:prstGeom prst="rect">
+            <a:avLst/>
+          </a:prstGeom>
+          <a:noFill/>
+        </p:spPr>
+        <p:txBody>
+          <a:bodyPr wrap="square" rtlCol="0">
+            <a:spAutoFit/>
+          </a:bodyPr>
+          <a:lstStyle/>
+          <a:p>
+            <a:r>
+              <a:rPr lang="pt-BR" sz="2800" dirty="0">
+                <a:solidFill>
+                  <a:srgbClr val="FF0000"/>
+                </a:solidFill>
+              </a:rPr>
+              <a:t>Algumas instruções são maiores e desproporcionais</a:t>
+            </a:r>
+            <a:endParaRPr lang="pt-BR" dirty="0">
+              <a:solidFill>
+                <a:srgbClr val="FF0000"/>
+              </a:solidFill>
+            </a:endParaRPr>
+          </a:p>
+        </p:txBody>
+      </p:sp>
+      <p:cxnSp>
+        <p:nvCxnSpPr>
+          <p:cNvPr id="27" name="Conector de Seta Reta 26"/>
+          <p:cNvCxnSpPr>
+            <a:cxnSpLocks/>
+          </p:cNvCxnSpPr>
+          <p:nvPr/>
+        </p:nvCxnSpPr>
+        <p:spPr>
+          <a:xfrm flipH="1" flipV="1">
+            <a:off x="5136269" y="1179083"/>
+            <a:ext cx="799514" cy="1009795"/>
+          </a:xfrm>
+          <a:prstGeom prst="straightConnector1">
+            <a:avLst/>
+          </a:prstGeom>
+          <a:ln>
+            <a:solidFill>
+              <a:srgbClr val="FF0000"/>
+            </a:solidFill>
+            <a:tailEnd type="triangle"/>
+          </a:ln>
+        </p:spPr>
+        <p:style>
+          <a:lnRef idx="1">
+            <a:schemeClr val="accent1"/>
+          </a:lnRef>
+          <a:fillRef idx="0">
+            <a:schemeClr val="accent1"/>
+          </a:fillRef>
+          <a:effectRef idx="0">
+            <a:schemeClr val="accent1"/>
+          </a:effectRef>
+          <a:fontRef idx="minor">
+            <a:schemeClr val="tx1"/>
+          </a:fontRef>
+        </p:style>
+      </p:cxnSp>
+      <p:cxnSp>
+        <p:nvCxnSpPr>
+          <p:cNvPr id="28" name="Conector de Seta Reta 27"/>
+          <p:cNvCxnSpPr>
+            <a:cxnSpLocks/>
+          </p:cNvCxnSpPr>
+          <p:nvPr/>
+        </p:nvCxnSpPr>
+        <p:spPr>
+          <a:xfrm flipH="1">
+            <a:off x="5136269" y="2188878"/>
+            <a:ext cx="799514" cy="98061"/>
+          </a:xfrm>
+          <a:prstGeom prst="straightConnector1">
+            <a:avLst/>
+          </a:prstGeom>
+          <a:ln>
+            <a:solidFill>
+              <a:srgbClr val="FF0000"/>
+            </a:solidFill>
+            <a:tailEnd type="triangle"/>
+          </a:ln>
+        </p:spPr>
+        <p:style>
+          <a:lnRef idx="1">
+            <a:schemeClr val="accent1"/>
+          </a:lnRef>
+          <a:fillRef idx="0">
+            <a:schemeClr val="accent1"/>
+          </a:fillRef>
+          <a:effectRef idx="0">
+            <a:schemeClr val="accent1"/>
+          </a:effectRef>
+          <a:fontRef idx="minor">
+            <a:schemeClr val="tx1"/>
+          </a:fontRef>
+        </p:style>
+      </p:cxnSp>
+      <p:cxnSp>
+        <p:nvCxnSpPr>
+          <p:cNvPr id="29" name="Conector de Seta Reta 28"/>
+          <p:cNvCxnSpPr>
+            <a:cxnSpLocks/>
+          </p:cNvCxnSpPr>
+          <p:nvPr/>
+        </p:nvCxnSpPr>
+        <p:spPr>
+          <a:xfrm flipH="1">
+            <a:off x="5173369" y="2162986"/>
+            <a:ext cx="762001" cy="1098224"/>
+          </a:xfrm>
+          <a:prstGeom prst="straightConnector1">
+            <a:avLst/>
+          </a:prstGeom>
+          <a:ln>
+            <a:solidFill>
+              <a:srgbClr val="FF0000"/>
+            </a:solidFill>
+            <a:tailEnd type="triangle"/>
+          </a:ln>
+        </p:spPr>
+        <p:style>
+          <a:lnRef idx="1">
+            <a:schemeClr val="accent1"/>
+          </a:lnRef>
+          <a:fillRef idx="0">
+            <a:schemeClr val="accent1"/>
+          </a:fillRef>
+          <a:effectRef idx="0">
+            <a:schemeClr val="accent1"/>
+          </a:effectRef>
+          <a:fontRef idx="minor">
+            <a:schemeClr val="tx1"/>
+          </a:fontRef>
+        </p:style>
+      </p:cxnSp>
+      <p:cxnSp>
+        <p:nvCxnSpPr>
+          <p:cNvPr id="31" name="Conector de Seta Reta 30"/>
+          <p:cNvCxnSpPr>
+            <a:cxnSpLocks/>
+          </p:cNvCxnSpPr>
+          <p:nvPr/>
+        </p:nvCxnSpPr>
+        <p:spPr>
+          <a:xfrm flipH="1">
+            <a:off x="5204259" y="2188878"/>
+            <a:ext cx="731524" cy="2056235"/>
+          </a:xfrm>
+          <a:prstGeom prst="straightConnector1">
+            <a:avLst/>
+          </a:prstGeom>
+          <a:ln>
+            <a:solidFill>
+              <a:srgbClr val="FF0000"/>
+            </a:solidFill>
+            <a:tailEnd type="triangle"/>
+          </a:ln>
+        </p:spPr>
+        <p:style>
+          <a:lnRef idx="1">
+            <a:schemeClr val="accent1"/>
+          </a:lnRef>
+          <a:fillRef idx="0">
+            <a:schemeClr val="accent1"/>
+          </a:fillRef>
+          <a:effectRef idx="0">
+            <a:schemeClr val="accent1"/>
+          </a:effectRef>
+          <a:fontRef idx="minor">
+            <a:schemeClr val="tx1"/>
+          </a:fontRef>
+        </p:style>
+      </p:cxnSp>
     </p:spTree>
     <p:extLst>
       <p:ext uri="{BB962C8B-B14F-4D97-AF65-F5344CB8AC3E}">
-        <p14:creationId xmlns:p14="http://schemas.microsoft.com/office/powerpoint/2010/main" val="1156631376"/>
+        <p14:creationId xmlns:p14="http://schemas.microsoft.com/office/powerpoint/2010/main" val="436585178"/>
+      </p:ext>
+    </p:extLst>
+  </p:cSld>
+  <p:clrMapOvr>
+    <a:masterClrMapping/>
+  </p:clrMapOvr>
+</p:sld>
+</file>
+
+<file path=ppt/slides/slide16.xml><?xml version="1.0" encoding="utf-8"?>
+<p:sld xmlns:a="http://schemas.openxmlformats.org/drawingml/2006/main" xmlns:r="http://schemas.openxmlformats.org/officeDocument/2006/relationships" xmlns:p="http://schemas.openxmlformats.org/presentationml/2006/main">
+  <p:cSld>
+    <p:spTree>
+      <p:nvGrpSpPr>
+        <p:cNvPr id="1" name=""/>
+        <p:cNvGrpSpPr/>
+        <p:nvPr/>
+      </p:nvGrpSpPr>
+      <p:grpSpPr>
+        <a:xfrm>
+          <a:off x="0" y="0"/>
+          <a:ext cx="0" cy="0"/>
+          <a:chOff x="0" y="0"/>
+          <a:chExt cx="0" cy="0"/>
+        </a:xfrm>
+      </p:grpSpPr>
+      <p:pic>
+        <p:nvPicPr>
+          <p:cNvPr id="31" name="Imagem 30"/>
+          <p:cNvPicPr>
+            <a:picLocks noChangeAspect="1"/>
+          </p:cNvPicPr>
+          <p:nvPr/>
+        </p:nvPicPr>
+        <p:blipFill>
+          <a:blip r:embed="rId2"/>
+          <a:stretch>
+            <a:fillRect/>
+          </a:stretch>
+        </p:blipFill>
+        <p:spPr>
+          <a:xfrm>
+            <a:off x="6107661" y="2946857"/>
+            <a:ext cx="4325320" cy="3240000"/>
+          </a:xfrm>
+          <a:prstGeom prst="rect">
+            <a:avLst/>
+          </a:prstGeom>
+        </p:spPr>
+      </p:pic>
+      <p:sp>
+        <p:nvSpPr>
+          <p:cNvPr id="14" name="CaixaDeTexto 13"/>
+          <p:cNvSpPr txBox="1"/>
+          <p:nvPr/>
+        </p:nvSpPr>
+        <p:spPr>
+          <a:xfrm>
+            <a:off x="2685143" y="3143156"/>
+            <a:ext cx="986971" cy="369332"/>
+          </a:xfrm>
+          <a:prstGeom prst="rect">
+            <a:avLst/>
+          </a:prstGeom>
+          <a:noFill/>
+        </p:spPr>
+        <p:txBody>
+          <a:bodyPr wrap="square" rtlCol="0">
+            <a:spAutoFit/>
+          </a:bodyPr>
+          <a:lstStyle/>
+          <a:p>
+            <a:endParaRPr lang="pt-BR" dirty="0"/>
+          </a:p>
+        </p:txBody>
+      </p:sp>
+      <p:pic>
+        <p:nvPicPr>
+          <p:cNvPr id="8" name="Imagem 7"/>
+          <p:cNvPicPr>
+            <a:picLocks noChangeAspect="1"/>
+          </p:cNvPicPr>
+          <p:nvPr/>
+        </p:nvPicPr>
+        <p:blipFill>
+          <a:blip r:embed="rId3"/>
+          <a:stretch>
+            <a:fillRect/>
+          </a:stretch>
+        </p:blipFill>
+        <p:spPr>
+          <a:xfrm>
+            <a:off x="1828798" y="3010818"/>
+            <a:ext cx="4194459" cy="3240000"/>
+          </a:xfrm>
+          <a:prstGeom prst="rect">
+            <a:avLst/>
+          </a:prstGeom>
+        </p:spPr>
+      </p:pic>
+      <p:cxnSp>
+        <p:nvCxnSpPr>
+          <p:cNvPr id="13" name="Conector reto 12"/>
+          <p:cNvCxnSpPr>
+            <a:cxnSpLocks/>
+          </p:cNvCxnSpPr>
+          <p:nvPr/>
+        </p:nvCxnSpPr>
+        <p:spPr>
+          <a:xfrm>
+            <a:off x="6023257" y="2957082"/>
+            <a:ext cx="0" cy="3107662"/>
+          </a:xfrm>
+          <a:prstGeom prst="line">
+            <a:avLst/>
+          </a:prstGeom>
+        </p:spPr>
+        <p:style>
+          <a:lnRef idx="1">
+            <a:schemeClr val="accent1"/>
+          </a:lnRef>
+          <a:fillRef idx="0">
+            <a:schemeClr val="accent1"/>
+          </a:fillRef>
+          <a:effectRef idx="0">
+            <a:schemeClr val="accent1"/>
+          </a:effectRef>
+          <a:fontRef idx="minor">
+            <a:schemeClr val="tx1"/>
+          </a:fontRef>
+        </p:style>
+      </p:cxnSp>
+      <p:sp>
+        <p:nvSpPr>
+          <p:cNvPr id="15" name="CaixaDeTexto 14"/>
+          <p:cNvSpPr txBox="1"/>
+          <p:nvPr/>
+        </p:nvSpPr>
+        <p:spPr>
+          <a:xfrm>
+            <a:off x="7238927" y="3496233"/>
+            <a:ext cx="2361544" cy="369332"/>
+          </a:xfrm>
+          <a:prstGeom prst="rect">
+            <a:avLst/>
+          </a:prstGeom>
+          <a:noFill/>
+        </p:spPr>
+        <p:txBody>
+          <a:bodyPr wrap="none" rtlCol="0">
+            <a:spAutoFit/>
+          </a:bodyPr>
+          <a:lstStyle/>
+          <a:p>
+            <a:r>
+              <a:rPr lang="pt-BR" dirty="0">
+                <a:solidFill>
+                  <a:srgbClr val="FF0000"/>
+                </a:solidFill>
+              </a:rPr>
+              <a:t>3 ciclos de </a:t>
+            </a:r>
+            <a:r>
+              <a:rPr lang="pt-BR" i="1" dirty="0" err="1">
+                <a:solidFill>
+                  <a:srgbClr val="FF0000"/>
+                </a:solidFill>
+              </a:rPr>
+              <a:t>clock</a:t>
+            </a:r>
+            <a:r>
+              <a:rPr lang="pt-BR" dirty="0">
+                <a:solidFill>
+                  <a:srgbClr val="FF0000"/>
+                </a:solidFill>
+              </a:rPr>
+              <a:t> depois</a:t>
+            </a:r>
+          </a:p>
+        </p:txBody>
+      </p:sp>
+      <p:pic>
+        <p:nvPicPr>
+          <p:cNvPr id="16" name="Imagem 15"/>
+          <p:cNvPicPr>
+            <a:picLocks noChangeAspect="1"/>
+          </p:cNvPicPr>
+          <p:nvPr/>
+        </p:nvPicPr>
+        <p:blipFill>
+          <a:blip r:embed="rId4"/>
+          <a:stretch>
+            <a:fillRect/>
+          </a:stretch>
+        </p:blipFill>
+        <p:spPr>
+          <a:xfrm>
+            <a:off x="4361418" y="362097"/>
+            <a:ext cx="3298358" cy="2286862"/>
+          </a:xfrm>
+          <a:prstGeom prst="rect">
+            <a:avLst/>
+          </a:prstGeom>
+        </p:spPr>
+      </p:pic>
+      <p:sp>
+        <p:nvSpPr>
+          <p:cNvPr id="20" name="CaixaDeTexto 19"/>
+          <p:cNvSpPr txBox="1"/>
+          <p:nvPr/>
+        </p:nvSpPr>
+        <p:spPr>
+          <a:xfrm>
+            <a:off x="1744394" y="0"/>
+            <a:ext cx="1237957" cy="369332"/>
+          </a:xfrm>
+          <a:prstGeom prst="rect">
+            <a:avLst/>
+          </a:prstGeom>
+          <a:noFill/>
+        </p:spPr>
+        <p:txBody>
+          <a:bodyPr wrap="square" rtlCol="0">
+            <a:spAutoFit/>
+          </a:bodyPr>
+          <a:lstStyle/>
+          <a:p>
+            <a:endParaRPr lang="pt-BR" dirty="0">
+              <a:solidFill>
+                <a:srgbClr val="FF0000"/>
+              </a:solidFill>
+            </a:endParaRPr>
+          </a:p>
+        </p:txBody>
+      </p:sp>
+      <p:sp>
+        <p:nvSpPr>
+          <p:cNvPr id="21" name="Retângulo 20"/>
+          <p:cNvSpPr/>
+          <p:nvPr/>
+        </p:nvSpPr>
+        <p:spPr>
+          <a:xfrm>
+            <a:off x="2808186" y="1504004"/>
+            <a:ext cx="881973" cy="584775"/>
+          </a:xfrm>
+          <a:prstGeom prst="rect">
+            <a:avLst/>
+          </a:prstGeom>
+        </p:spPr>
+        <p:txBody>
+          <a:bodyPr wrap="none">
+            <a:spAutoFit/>
+          </a:bodyPr>
+          <a:lstStyle/>
+          <a:p>
+            <a:r>
+              <a:rPr lang="pt-BR" sz="3200" dirty="0">
+                <a:solidFill>
+                  <a:srgbClr val="FF0000"/>
+                </a:solidFill>
+              </a:rPr>
+              <a:t>PRU</a:t>
+            </a:r>
+          </a:p>
+        </p:txBody>
+      </p:sp>
+      <p:sp>
+        <p:nvSpPr>
+          <p:cNvPr id="26" name="Retângulo 25"/>
+          <p:cNvSpPr/>
+          <p:nvPr/>
+        </p:nvSpPr>
+        <p:spPr>
+          <a:xfrm>
+            <a:off x="365327" y="4408193"/>
+            <a:ext cx="1379067" cy="923330"/>
+          </a:xfrm>
+          <a:prstGeom prst="rect">
+            <a:avLst/>
+          </a:prstGeom>
+        </p:spPr>
+        <p:txBody>
+          <a:bodyPr wrap="square">
+            <a:spAutoFit/>
+          </a:bodyPr>
+          <a:lstStyle/>
+          <a:p>
+            <a:pPr algn="r"/>
+            <a:r>
+              <a:rPr lang="pt-BR" dirty="0">
+                <a:solidFill>
+                  <a:srgbClr val="FF0000"/>
+                </a:solidFill>
+              </a:rPr>
+              <a:t>Processador com pipeline</a:t>
+            </a:r>
+          </a:p>
+        </p:txBody>
+      </p:sp>
+      <p:sp>
+        <p:nvSpPr>
+          <p:cNvPr id="27" name="Retângulo 26"/>
+          <p:cNvSpPr/>
+          <p:nvPr/>
+        </p:nvSpPr>
+        <p:spPr>
+          <a:xfrm>
+            <a:off x="365327" y="237000"/>
+            <a:ext cx="10162788" cy="2534009"/>
+          </a:xfrm>
+          <a:prstGeom prst="rect">
+            <a:avLst/>
+          </a:prstGeom>
+          <a:noFill/>
+          <a:ln>
+            <a:solidFill>
+              <a:schemeClr val="accent1"/>
+            </a:solidFill>
+          </a:ln>
+        </p:spPr>
+        <p:style>
+          <a:lnRef idx="2">
+            <a:schemeClr val="accent1">
+              <a:shade val="50000"/>
+            </a:schemeClr>
+          </a:lnRef>
+          <a:fillRef idx="1">
+            <a:schemeClr val="accent1"/>
+          </a:fillRef>
+          <a:effectRef idx="0">
+            <a:schemeClr val="accent1"/>
+          </a:effectRef>
+          <a:fontRef idx="minor">
+            <a:schemeClr val="lt1"/>
+          </a:fontRef>
+        </p:style>
+        <p:txBody>
+          <a:bodyPr rtlCol="0" anchor="ctr"/>
+          <a:lstStyle/>
+          <a:p>
+            <a:pPr algn="ctr"/>
+            <a:endParaRPr lang="pt-BR"/>
+          </a:p>
+        </p:txBody>
+      </p:sp>
+      <p:sp>
+        <p:nvSpPr>
+          <p:cNvPr id="28" name="Retângulo 27"/>
+          <p:cNvSpPr/>
+          <p:nvPr/>
+        </p:nvSpPr>
+        <p:spPr>
+          <a:xfrm>
+            <a:off x="365327" y="2771009"/>
+            <a:ext cx="10162788" cy="3479809"/>
+          </a:xfrm>
+          <a:prstGeom prst="rect">
+            <a:avLst/>
+          </a:prstGeom>
+          <a:noFill/>
+          <a:ln>
+            <a:solidFill>
+              <a:schemeClr val="accent1"/>
+            </a:solidFill>
+          </a:ln>
+        </p:spPr>
+        <p:style>
+          <a:lnRef idx="2">
+            <a:schemeClr val="accent1">
+              <a:shade val="50000"/>
+            </a:schemeClr>
+          </a:lnRef>
+          <a:fillRef idx="1">
+            <a:schemeClr val="accent1"/>
+          </a:fillRef>
+          <a:effectRef idx="0">
+            <a:schemeClr val="accent1"/>
+          </a:effectRef>
+          <a:fontRef idx="minor">
+            <a:schemeClr val="lt1"/>
+          </a:fontRef>
+        </p:style>
+        <p:txBody>
+          <a:bodyPr rtlCol="0" anchor="ctr"/>
+          <a:lstStyle/>
+          <a:p>
+            <a:pPr algn="ctr"/>
+            <a:endParaRPr lang="pt-BR"/>
+          </a:p>
+        </p:txBody>
+      </p:sp>
+      <p:sp>
+        <p:nvSpPr>
+          <p:cNvPr id="29" name="CaixaDeTexto 28"/>
+          <p:cNvSpPr txBox="1"/>
+          <p:nvPr/>
+        </p:nvSpPr>
+        <p:spPr>
+          <a:xfrm>
+            <a:off x="3501389" y="2106084"/>
+            <a:ext cx="7475076" cy="461665"/>
+          </a:xfrm>
+          <a:prstGeom prst="rect">
+            <a:avLst/>
+          </a:prstGeom>
+          <a:noFill/>
+        </p:spPr>
+        <p:txBody>
+          <a:bodyPr wrap="square" rtlCol="0">
+            <a:spAutoFit/>
+          </a:bodyPr>
+          <a:lstStyle/>
+          <a:p>
+            <a:pPr algn="ctr"/>
+            <a:r>
+              <a:rPr lang="pt-BR" sz="2400" dirty="0">
+                <a:solidFill>
+                  <a:srgbClr val="FF0000"/>
+                </a:solidFill>
+              </a:rPr>
+              <a:t>Estágio único  </a:t>
+            </a:r>
+          </a:p>
+        </p:txBody>
+      </p:sp>
+    </p:spTree>
+    <p:extLst>
+      <p:ext uri="{BB962C8B-B14F-4D97-AF65-F5344CB8AC3E}">
+        <p14:creationId xmlns:p14="http://schemas.microsoft.com/office/powerpoint/2010/main" val="1412487863"/>
       </p:ext>
     </p:extLst>
   </p:cSld>

</xml_diff>

<commit_message>
Adicionado o exemplo das entradas exclusivas do PRU como entrada paralela
</commit_message>
<xml_diff>
--- a/Word/Figuras.pptx
+++ b/Word/Figuras.pptx
@@ -24,6 +24,7 @@
     <p:sldId id="272" r:id="rId18"/>
     <p:sldId id="273" r:id="rId19"/>
     <p:sldId id="274" r:id="rId20"/>
+    <p:sldId id="275" r:id="rId21"/>
   </p:sldIdLst>
   <p:sldSz cx="12192000" cy="6858000"/>
   <p:notesSz cx="6858000" cy="9144000"/>
@@ -9943,7 +9944,7 @@
           <a:p>
             <a:fld id="{54B95968-CED5-447B-ADA8-EFE194C8B328}" type="datetimeFigureOut">
               <a:rPr lang="pt-BR" smtClean="0"/>
-              <a:t>17/11/2016</a:t>
+              <a:t>21/11/2016</a:t>
             </a:fld>
             <a:endParaRPr lang="pt-BR"/>
           </a:p>
@@ -10111,7 +10112,7 @@
           <a:p>
             <a:fld id="{54B95968-CED5-447B-ADA8-EFE194C8B328}" type="datetimeFigureOut">
               <a:rPr lang="pt-BR" smtClean="0"/>
-              <a:t>17/11/2016</a:t>
+              <a:t>21/11/2016</a:t>
             </a:fld>
             <a:endParaRPr lang="pt-BR"/>
           </a:p>
@@ -10289,7 +10290,7 @@
           <a:p>
             <a:fld id="{54B95968-CED5-447B-ADA8-EFE194C8B328}" type="datetimeFigureOut">
               <a:rPr lang="pt-BR" smtClean="0"/>
-              <a:t>17/11/2016</a:t>
+              <a:t>21/11/2016</a:t>
             </a:fld>
             <a:endParaRPr lang="pt-BR"/>
           </a:p>
@@ -10457,7 +10458,7 @@
           <a:p>
             <a:fld id="{54B95968-CED5-447B-ADA8-EFE194C8B328}" type="datetimeFigureOut">
               <a:rPr lang="pt-BR" smtClean="0"/>
-              <a:t>17/11/2016</a:t>
+              <a:t>21/11/2016</a:t>
             </a:fld>
             <a:endParaRPr lang="pt-BR"/>
           </a:p>
@@ -10702,7 +10703,7 @@
           <a:p>
             <a:fld id="{54B95968-CED5-447B-ADA8-EFE194C8B328}" type="datetimeFigureOut">
               <a:rPr lang="pt-BR" smtClean="0"/>
-              <a:t>17/11/2016</a:t>
+              <a:t>21/11/2016</a:t>
             </a:fld>
             <a:endParaRPr lang="pt-BR"/>
           </a:p>
@@ -10931,7 +10932,7 @@
           <a:p>
             <a:fld id="{54B95968-CED5-447B-ADA8-EFE194C8B328}" type="datetimeFigureOut">
               <a:rPr lang="pt-BR" smtClean="0"/>
-              <a:t>17/11/2016</a:t>
+              <a:t>21/11/2016</a:t>
             </a:fld>
             <a:endParaRPr lang="pt-BR"/>
           </a:p>
@@ -11295,7 +11296,7 @@
           <a:p>
             <a:fld id="{54B95968-CED5-447B-ADA8-EFE194C8B328}" type="datetimeFigureOut">
               <a:rPr lang="pt-BR" smtClean="0"/>
-              <a:t>17/11/2016</a:t>
+              <a:t>21/11/2016</a:t>
             </a:fld>
             <a:endParaRPr lang="pt-BR"/>
           </a:p>
@@ -11412,7 +11413,7 @@
           <a:p>
             <a:fld id="{54B95968-CED5-447B-ADA8-EFE194C8B328}" type="datetimeFigureOut">
               <a:rPr lang="pt-BR" smtClean="0"/>
-              <a:t>17/11/2016</a:t>
+              <a:t>21/11/2016</a:t>
             </a:fld>
             <a:endParaRPr lang="pt-BR"/>
           </a:p>
@@ -11507,7 +11508,7 @@
           <a:p>
             <a:fld id="{54B95968-CED5-447B-ADA8-EFE194C8B328}" type="datetimeFigureOut">
               <a:rPr lang="pt-BR" smtClean="0"/>
-              <a:t>17/11/2016</a:t>
+              <a:t>21/11/2016</a:t>
             </a:fld>
             <a:endParaRPr lang="pt-BR"/>
           </a:p>
@@ -11782,7 +11783,7 @@
           <a:p>
             <a:fld id="{54B95968-CED5-447B-ADA8-EFE194C8B328}" type="datetimeFigureOut">
               <a:rPr lang="pt-BR" smtClean="0"/>
-              <a:t>17/11/2016</a:t>
+              <a:t>21/11/2016</a:t>
             </a:fld>
             <a:endParaRPr lang="pt-BR"/>
           </a:p>
@@ -12034,7 +12035,7 @@
           <a:p>
             <a:fld id="{54B95968-CED5-447B-ADA8-EFE194C8B328}" type="datetimeFigureOut">
               <a:rPr lang="pt-BR" smtClean="0"/>
-              <a:t>17/11/2016</a:t>
+              <a:t>21/11/2016</a:t>
             </a:fld>
             <a:endParaRPr lang="pt-BR"/>
           </a:p>
@@ -12245,7 +12246,7 @@
           <a:p>
             <a:fld id="{54B95968-CED5-447B-ADA8-EFE194C8B328}" type="datetimeFigureOut">
               <a:rPr lang="pt-BR" smtClean="0"/>
-              <a:t>17/11/2016</a:t>
+              <a:t>21/11/2016</a:t>
             </a:fld>
             <a:endParaRPr lang="pt-BR"/>
           </a:p>
@@ -17345,6 +17346,397 @@
           <a:chExt cx="0" cy="0"/>
         </a:xfrm>
       </p:grpSpPr>
+      <p:grpSp>
+        <p:nvGrpSpPr>
+          <p:cNvPr id="26" name="Agrupar 25"/>
+          <p:cNvGrpSpPr/>
+          <p:nvPr/>
+        </p:nvGrpSpPr>
+        <p:grpSpPr>
+          <a:xfrm>
+            <a:off x="4991100" y="2243137"/>
+            <a:ext cx="6051215" cy="2371725"/>
+            <a:chOff x="4991100" y="2243137"/>
+            <a:chExt cx="6051215" cy="2371725"/>
+          </a:xfrm>
+        </p:grpSpPr>
+        <p:grpSp>
+          <p:nvGrpSpPr>
+            <p:cNvPr id="24" name="Agrupar 23"/>
+            <p:cNvGrpSpPr/>
+            <p:nvPr/>
+          </p:nvGrpSpPr>
+          <p:grpSpPr>
+            <a:xfrm>
+              <a:off x="4991100" y="2243137"/>
+              <a:ext cx="2900363" cy="2371725"/>
+              <a:chOff x="4991100" y="2243137"/>
+              <a:chExt cx="2900363" cy="2371725"/>
+            </a:xfrm>
+          </p:grpSpPr>
+          <p:pic>
+            <p:nvPicPr>
+              <p:cNvPr id="4" name="Imagem 3"/>
+              <p:cNvPicPr>
+                <a:picLocks noChangeAspect="1"/>
+              </p:cNvPicPr>
+              <p:nvPr/>
+            </p:nvPicPr>
+            <p:blipFill>
+              <a:blip r:embed="rId2"/>
+              <a:stretch>
+                <a:fillRect/>
+              </a:stretch>
+            </p:blipFill>
+            <p:spPr>
+              <a:xfrm>
+                <a:off x="4991100" y="2243137"/>
+                <a:ext cx="2209800" cy="2371725"/>
+              </a:xfrm>
+              <a:prstGeom prst="rect">
+                <a:avLst/>
+              </a:prstGeom>
+            </p:spPr>
+          </p:pic>
+          <p:cxnSp>
+            <p:nvCxnSpPr>
+              <p:cNvPr id="7" name="Conector de Seta Reta 6"/>
+              <p:cNvCxnSpPr>
+                <a:cxnSpLocks/>
+              </p:cNvCxnSpPr>
+              <p:nvPr/>
+            </p:nvCxnSpPr>
+            <p:spPr>
+              <a:xfrm flipH="1" flipV="1">
+                <a:off x="6804459" y="2897326"/>
+                <a:ext cx="1087004" cy="531673"/>
+              </a:xfrm>
+              <a:prstGeom prst="straightConnector1">
+                <a:avLst/>
+              </a:prstGeom>
+              <a:ln>
+                <a:solidFill>
+                  <a:srgbClr val="FF0000"/>
+                </a:solidFill>
+                <a:tailEnd type="triangle"/>
+              </a:ln>
+            </p:spPr>
+            <p:style>
+              <a:lnRef idx="1">
+                <a:schemeClr val="accent1"/>
+              </a:lnRef>
+              <a:fillRef idx="0">
+                <a:schemeClr val="accent1"/>
+              </a:fillRef>
+              <a:effectRef idx="0">
+                <a:schemeClr val="accent1"/>
+              </a:effectRef>
+              <a:fontRef idx="minor">
+                <a:schemeClr val="tx1"/>
+              </a:fontRef>
+            </p:style>
+          </p:cxnSp>
+          <p:cxnSp>
+            <p:nvCxnSpPr>
+              <p:cNvPr id="10" name="Conector de Seta Reta 9"/>
+              <p:cNvCxnSpPr>
+                <a:cxnSpLocks/>
+              </p:cNvCxnSpPr>
+              <p:nvPr/>
+            </p:nvCxnSpPr>
+            <p:spPr>
+              <a:xfrm flipH="1" flipV="1">
+                <a:off x="6799697" y="3054490"/>
+                <a:ext cx="1091766" cy="374509"/>
+              </a:xfrm>
+              <a:prstGeom prst="straightConnector1">
+                <a:avLst/>
+              </a:prstGeom>
+              <a:ln>
+                <a:solidFill>
+                  <a:srgbClr val="FF0000"/>
+                </a:solidFill>
+                <a:tailEnd type="triangle"/>
+              </a:ln>
+            </p:spPr>
+            <p:style>
+              <a:lnRef idx="1">
+                <a:schemeClr val="accent1"/>
+              </a:lnRef>
+              <a:fillRef idx="0">
+                <a:schemeClr val="accent1"/>
+              </a:fillRef>
+              <a:effectRef idx="0">
+                <a:schemeClr val="accent1"/>
+              </a:effectRef>
+              <a:fontRef idx="minor">
+                <a:schemeClr val="tx1"/>
+              </a:fontRef>
+            </p:style>
+          </p:cxnSp>
+          <p:cxnSp>
+            <p:nvCxnSpPr>
+              <p:cNvPr id="12" name="Conector de Seta Reta 11"/>
+              <p:cNvCxnSpPr>
+                <a:cxnSpLocks/>
+              </p:cNvCxnSpPr>
+              <p:nvPr/>
+            </p:nvCxnSpPr>
+            <p:spPr>
+              <a:xfrm flipH="1" flipV="1">
+                <a:off x="6799697" y="3211655"/>
+                <a:ext cx="1091766" cy="217344"/>
+              </a:xfrm>
+              <a:prstGeom prst="straightConnector1">
+                <a:avLst/>
+              </a:prstGeom>
+              <a:ln>
+                <a:solidFill>
+                  <a:srgbClr val="FF0000"/>
+                </a:solidFill>
+                <a:tailEnd type="triangle"/>
+              </a:ln>
+            </p:spPr>
+            <p:style>
+              <a:lnRef idx="1">
+                <a:schemeClr val="accent1"/>
+              </a:lnRef>
+              <a:fillRef idx="0">
+                <a:schemeClr val="accent1"/>
+              </a:fillRef>
+              <a:effectRef idx="0">
+                <a:schemeClr val="accent1"/>
+              </a:effectRef>
+              <a:fontRef idx="minor">
+                <a:schemeClr val="tx1"/>
+              </a:fontRef>
+            </p:style>
+          </p:cxnSp>
+          <p:cxnSp>
+            <p:nvCxnSpPr>
+              <p:cNvPr id="14" name="Conector de Seta Reta 13"/>
+              <p:cNvCxnSpPr>
+                <a:cxnSpLocks/>
+              </p:cNvCxnSpPr>
+              <p:nvPr/>
+            </p:nvCxnSpPr>
+            <p:spPr>
+              <a:xfrm flipH="1" flipV="1">
+                <a:off x="6799697" y="3359291"/>
+                <a:ext cx="1091766" cy="69708"/>
+              </a:xfrm>
+              <a:prstGeom prst="straightConnector1">
+                <a:avLst/>
+              </a:prstGeom>
+              <a:ln>
+                <a:solidFill>
+                  <a:srgbClr val="FF0000"/>
+                </a:solidFill>
+                <a:tailEnd type="triangle"/>
+              </a:ln>
+            </p:spPr>
+            <p:style>
+              <a:lnRef idx="1">
+                <a:schemeClr val="accent1"/>
+              </a:lnRef>
+              <a:fillRef idx="0">
+                <a:schemeClr val="accent1"/>
+              </a:fillRef>
+              <a:effectRef idx="0">
+                <a:schemeClr val="accent1"/>
+              </a:effectRef>
+              <a:fontRef idx="minor">
+                <a:schemeClr val="tx1"/>
+              </a:fontRef>
+            </p:style>
+          </p:cxnSp>
+          <p:cxnSp>
+            <p:nvCxnSpPr>
+              <p:cNvPr id="16" name="Conector de Seta Reta 15"/>
+              <p:cNvCxnSpPr>
+                <a:cxnSpLocks/>
+              </p:cNvCxnSpPr>
+              <p:nvPr/>
+            </p:nvCxnSpPr>
+            <p:spPr>
+              <a:xfrm flipH="1">
+                <a:off x="6799697" y="3428999"/>
+                <a:ext cx="1091766" cy="466935"/>
+              </a:xfrm>
+              <a:prstGeom prst="straightConnector1">
+                <a:avLst/>
+              </a:prstGeom>
+              <a:ln>
+                <a:solidFill>
+                  <a:srgbClr val="FF0000"/>
+                </a:solidFill>
+                <a:tailEnd type="triangle"/>
+              </a:ln>
+            </p:spPr>
+            <p:style>
+              <a:lnRef idx="1">
+                <a:schemeClr val="accent1"/>
+              </a:lnRef>
+              <a:fillRef idx="0">
+                <a:schemeClr val="accent1"/>
+              </a:fillRef>
+              <a:effectRef idx="0">
+                <a:schemeClr val="accent1"/>
+              </a:effectRef>
+              <a:fontRef idx="minor">
+                <a:schemeClr val="tx1"/>
+              </a:fontRef>
+            </p:style>
+          </p:cxnSp>
+          <p:cxnSp>
+            <p:nvCxnSpPr>
+              <p:cNvPr id="18" name="Conector de Seta Reta 17"/>
+              <p:cNvCxnSpPr>
+                <a:cxnSpLocks/>
+              </p:cNvCxnSpPr>
+              <p:nvPr/>
+            </p:nvCxnSpPr>
+            <p:spPr>
+              <a:xfrm flipH="1">
+                <a:off x="6813985" y="3428999"/>
+                <a:ext cx="1077478" cy="624099"/>
+              </a:xfrm>
+              <a:prstGeom prst="straightConnector1">
+                <a:avLst/>
+              </a:prstGeom>
+              <a:ln>
+                <a:solidFill>
+                  <a:srgbClr val="FF0000"/>
+                </a:solidFill>
+                <a:tailEnd type="triangle"/>
+              </a:ln>
+            </p:spPr>
+            <p:style>
+              <a:lnRef idx="1">
+                <a:schemeClr val="accent1"/>
+              </a:lnRef>
+              <a:fillRef idx="0">
+                <a:schemeClr val="accent1"/>
+              </a:fillRef>
+              <a:effectRef idx="0">
+                <a:schemeClr val="accent1"/>
+              </a:effectRef>
+              <a:fontRef idx="minor">
+                <a:schemeClr val="tx1"/>
+              </a:fontRef>
+            </p:style>
+          </p:cxnSp>
+          <p:cxnSp>
+            <p:nvCxnSpPr>
+              <p:cNvPr id="20" name="Conector de Seta Reta 19"/>
+              <p:cNvCxnSpPr>
+                <a:cxnSpLocks/>
+              </p:cNvCxnSpPr>
+              <p:nvPr/>
+            </p:nvCxnSpPr>
+            <p:spPr>
+              <a:xfrm flipH="1">
+                <a:off x="6813985" y="3428999"/>
+                <a:ext cx="1077478" cy="811354"/>
+              </a:xfrm>
+              <a:prstGeom prst="straightConnector1">
+                <a:avLst/>
+              </a:prstGeom>
+              <a:ln>
+                <a:solidFill>
+                  <a:srgbClr val="FF0000"/>
+                </a:solidFill>
+                <a:tailEnd type="triangle"/>
+              </a:ln>
+            </p:spPr>
+            <p:style>
+              <a:lnRef idx="1">
+                <a:schemeClr val="accent1"/>
+              </a:lnRef>
+              <a:fillRef idx="0">
+                <a:schemeClr val="accent1"/>
+              </a:fillRef>
+              <a:effectRef idx="0">
+                <a:schemeClr val="accent1"/>
+              </a:effectRef>
+              <a:fontRef idx="minor">
+                <a:schemeClr val="tx1"/>
+              </a:fontRef>
+            </p:style>
+          </p:cxnSp>
+          <p:cxnSp>
+            <p:nvCxnSpPr>
+              <p:cNvPr id="22" name="Conector de Seta Reta 21"/>
+              <p:cNvCxnSpPr>
+                <a:cxnSpLocks/>
+              </p:cNvCxnSpPr>
+              <p:nvPr/>
+            </p:nvCxnSpPr>
+            <p:spPr>
+              <a:xfrm flipH="1">
+                <a:off x="6813985" y="3428999"/>
+                <a:ext cx="1077478" cy="958991"/>
+              </a:xfrm>
+              <a:prstGeom prst="straightConnector1">
+                <a:avLst/>
+              </a:prstGeom>
+              <a:ln>
+                <a:solidFill>
+                  <a:srgbClr val="FF0000"/>
+                </a:solidFill>
+                <a:tailEnd type="triangle"/>
+              </a:ln>
+            </p:spPr>
+            <p:style>
+              <a:lnRef idx="1">
+                <a:schemeClr val="accent1"/>
+              </a:lnRef>
+              <a:fillRef idx="0">
+                <a:schemeClr val="accent1"/>
+              </a:fillRef>
+              <a:effectRef idx="0">
+                <a:schemeClr val="accent1"/>
+              </a:effectRef>
+              <a:fontRef idx="minor">
+                <a:schemeClr val="tx1"/>
+              </a:fontRef>
+            </p:style>
+          </p:cxnSp>
+        </p:grpSp>
+        <p:sp>
+          <p:nvSpPr>
+            <p:cNvPr id="25" name="CaixaDeTexto 24"/>
+            <p:cNvSpPr txBox="1"/>
+            <p:nvPr/>
+          </p:nvSpPr>
+          <p:spPr>
+            <a:xfrm>
+              <a:off x="7891463" y="3209479"/>
+              <a:ext cx="3150852" cy="369332"/>
+            </a:xfrm>
+            <a:prstGeom prst="rect">
+              <a:avLst/>
+            </a:prstGeom>
+            <a:noFill/>
+          </p:spPr>
+          <p:txBody>
+            <a:bodyPr wrap="square" rtlCol="0">
+              <a:spAutoFit/>
+            </a:bodyPr>
+            <a:lstStyle/>
+            <a:p>
+              <a:r>
+                <a:rPr lang="pt-BR" dirty="0">
+                  <a:solidFill>
+                    <a:srgbClr val="FF0000"/>
+                  </a:solidFill>
+                </a:rPr>
+                <a:t>As 8 saídas paralelas do ADC</a:t>
+              </a:r>
+            </a:p>
+          </p:txBody>
+        </p:sp>
+      </p:grpSp>
     </p:spTree>
     <p:extLst>
       <p:ext uri="{BB962C8B-B14F-4D97-AF65-F5344CB8AC3E}">
@@ -17409,6 +17801,131 @@
     <p:extLst>
       <p:ext uri="{BB962C8B-B14F-4D97-AF65-F5344CB8AC3E}">
         <p14:creationId xmlns:p14="http://schemas.microsoft.com/office/powerpoint/2010/main" val="2652638896"/>
+      </p:ext>
+    </p:extLst>
+  </p:cSld>
+  <p:clrMapOvr>
+    <a:masterClrMapping/>
+  </p:clrMapOvr>
+</p:sld>
+</file>
+
+<file path=ppt/slides/slide20.xml><?xml version="1.0" encoding="utf-8"?>
+<p:sld xmlns:a="http://schemas.openxmlformats.org/drawingml/2006/main" xmlns:r="http://schemas.openxmlformats.org/officeDocument/2006/relationships" xmlns:p="http://schemas.openxmlformats.org/presentationml/2006/main">
+  <p:cSld>
+    <p:spTree>
+      <p:nvGrpSpPr>
+        <p:cNvPr id="1" name=""/>
+        <p:cNvGrpSpPr/>
+        <p:nvPr/>
+      </p:nvGrpSpPr>
+      <p:grpSpPr>
+        <a:xfrm>
+          <a:off x="0" y="0"/>
+          <a:ext cx="0" cy="0"/>
+          <a:chOff x="0" y="0"/>
+          <a:chExt cx="0" cy="0"/>
+        </a:xfrm>
+      </p:grpSpPr>
+      <p:sp>
+        <p:nvSpPr>
+          <p:cNvPr id="2" name="Título 1"/>
+          <p:cNvSpPr>
+            <a:spLocks noGrp="1"/>
+          </p:cNvSpPr>
+          <p:nvPr>
+            <p:ph type="title"/>
+          </p:nvPr>
+        </p:nvSpPr>
+        <p:spPr/>
+        <p:txBody>
+          <a:bodyPr/>
+          <a:lstStyle/>
+          <a:p>
+            <a:endParaRPr lang="pt-BR"/>
+          </a:p>
+        </p:txBody>
+      </p:sp>
+      <p:sp>
+        <p:nvSpPr>
+          <p:cNvPr id="3" name="Espaço Reservado para Texto 2"/>
+          <p:cNvSpPr>
+            <a:spLocks noGrp="1"/>
+          </p:cNvSpPr>
+          <p:nvPr>
+            <p:ph type="body" idx="1"/>
+          </p:nvPr>
+        </p:nvSpPr>
+        <p:spPr/>
+        <p:txBody>
+          <a:bodyPr/>
+          <a:lstStyle/>
+          <a:p>
+            <a:endParaRPr lang="pt-BR"/>
+          </a:p>
+        </p:txBody>
+      </p:sp>
+      <p:sp>
+        <p:nvSpPr>
+          <p:cNvPr id="4" name="Espaço Reservado para Conteúdo 3"/>
+          <p:cNvSpPr>
+            <a:spLocks noGrp="1"/>
+          </p:cNvSpPr>
+          <p:nvPr>
+            <p:ph sz="half" idx="2"/>
+          </p:nvPr>
+        </p:nvSpPr>
+        <p:spPr/>
+        <p:txBody>
+          <a:bodyPr/>
+          <a:lstStyle/>
+          <a:p>
+            <a:endParaRPr lang="pt-BR"/>
+          </a:p>
+        </p:txBody>
+      </p:sp>
+      <p:sp>
+        <p:nvSpPr>
+          <p:cNvPr id="5" name="Espaço Reservado para Texto 4"/>
+          <p:cNvSpPr>
+            <a:spLocks noGrp="1"/>
+          </p:cNvSpPr>
+          <p:nvPr>
+            <p:ph type="body" sz="quarter" idx="3"/>
+          </p:nvPr>
+        </p:nvSpPr>
+        <p:spPr/>
+        <p:txBody>
+          <a:bodyPr/>
+          <a:lstStyle/>
+          <a:p>
+            <a:endParaRPr lang="pt-BR"/>
+          </a:p>
+        </p:txBody>
+      </p:sp>
+      <p:sp>
+        <p:nvSpPr>
+          <p:cNvPr id="6" name="Espaço Reservado para Conteúdo 5"/>
+          <p:cNvSpPr>
+            <a:spLocks noGrp="1"/>
+          </p:cNvSpPr>
+          <p:nvPr>
+            <p:ph sz="quarter" idx="4"/>
+          </p:nvPr>
+        </p:nvSpPr>
+        <p:spPr/>
+        <p:txBody>
+          <a:bodyPr/>
+          <a:lstStyle/>
+          <a:p>
+            <a:endParaRPr lang="pt-BR"/>
+          </a:p>
+        </p:txBody>
+      </p:sp>
+    </p:spTree>
+    <p:extLst>
+      <p:ext uri="{BB962C8B-B14F-4D97-AF65-F5344CB8AC3E}">
+        <p14:creationId xmlns:p14="http://schemas.microsoft.com/office/powerpoint/2010/main" val="3389126622"/>
       </p:ext>
     </p:extLst>
   </p:cSld>

</xml_diff>

<commit_message>
Cheguei no flask :}
</commit_message>
<xml_diff>
--- a/Word/Figuras.pptx
+++ b/Word/Figuras.pptx
@@ -25,6 +25,7 @@
     <p:sldId id="273" r:id="rId19"/>
     <p:sldId id="274" r:id="rId20"/>
     <p:sldId id="275" r:id="rId21"/>
+    <p:sldId id="276" r:id="rId22"/>
   </p:sldIdLst>
   <p:sldSz cx="12192000" cy="6858000"/>
   <p:notesSz cx="6858000" cy="9144000"/>
@@ -9944,7 +9945,7 @@
           <a:p>
             <a:fld id="{54B95968-CED5-447B-ADA8-EFE194C8B328}" type="datetimeFigureOut">
               <a:rPr lang="pt-BR" smtClean="0"/>
-              <a:t>21/11/2016</a:t>
+              <a:t>28/11/2016</a:t>
             </a:fld>
             <a:endParaRPr lang="pt-BR"/>
           </a:p>
@@ -10112,7 +10113,7 @@
           <a:p>
             <a:fld id="{54B95968-CED5-447B-ADA8-EFE194C8B328}" type="datetimeFigureOut">
               <a:rPr lang="pt-BR" smtClean="0"/>
-              <a:t>21/11/2016</a:t>
+              <a:t>28/11/2016</a:t>
             </a:fld>
             <a:endParaRPr lang="pt-BR"/>
           </a:p>
@@ -10290,7 +10291,7 @@
           <a:p>
             <a:fld id="{54B95968-CED5-447B-ADA8-EFE194C8B328}" type="datetimeFigureOut">
               <a:rPr lang="pt-BR" smtClean="0"/>
-              <a:t>21/11/2016</a:t>
+              <a:t>28/11/2016</a:t>
             </a:fld>
             <a:endParaRPr lang="pt-BR"/>
           </a:p>
@@ -10458,7 +10459,7 @@
           <a:p>
             <a:fld id="{54B95968-CED5-447B-ADA8-EFE194C8B328}" type="datetimeFigureOut">
               <a:rPr lang="pt-BR" smtClean="0"/>
-              <a:t>21/11/2016</a:t>
+              <a:t>28/11/2016</a:t>
             </a:fld>
             <a:endParaRPr lang="pt-BR"/>
           </a:p>
@@ -10703,7 +10704,7 @@
           <a:p>
             <a:fld id="{54B95968-CED5-447B-ADA8-EFE194C8B328}" type="datetimeFigureOut">
               <a:rPr lang="pt-BR" smtClean="0"/>
-              <a:t>21/11/2016</a:t>
+              <a:t>28/11/2016</a:t>
             </a:fld>
             <a:endParaRPr lang="pt-BR"/>
           </a:p>
@@ -10932,7 +10933,7 @@
           <a:p>
             <a:fld id="{54B95968-CED5-447B-ADA8-EFE194C8B328}" type="datetimeFigureOut">
               <a:rPr lang="pt-BR" smtClean="0"/>
-              <a:t>21/11/2016</a:t>
+              <a:t>28/11/2016</a:t>
             </a:fld>
             <a:endParaRPr lang="pt-BR"/>
           </a:p>
@@ -11296,7 +11297,7 @@
           <a:p>
             <a:fld id="{54B95968-CED5-447B-ADA8-EFE194C8B328}" type="datetimeFigureOut">
               <a:rPr lang="pt-BR" smtClean="0"/>
-              <a:t>21/11/2016</a:t>
+              <a:t>28/11/2016</a:t>
             </a:fld>
             <a:endParaRPr lang="pt-BR"/>
           </a:p>
@@ -11413,7 +11414,7 @@
           <a:p>
             <a:fld id="{54B95968-CED5-447B-ADA8-EFE194C8B328}" type="datetimeFigureOut">
               <a:rPr lang="pt-BR" smtClean="0"/>
-              <a:t>21/11/2016</a:t>
+              <a:t>28/11/2016</a:t>
             </a:fld>
             <a:endParaRPr lang="pt-BR"/>
           </a:p>
@@ -11508,7 +11509,7 @@
           <a:p>
             <a:fld id="{54B95968-CED5-447B-ADA8-EFE194C8B328}" type="datetimeFigureOut">
               <a:rPr lang="pt-BR" smtClean="0"/>
-              <a:t>21/11/2016</a:t>
+              <a:t>28/11/2016</a:t>
             </a:fld>
             <a:endParaRPr lang="pt-BR"/>
           </a:p>
@@ -11783,7 +11784,7 @@
           <a:p>
             <a:fld id="{54B95968-CED5-447B-ADA8-EFE194C8B328}" type="datetimeFigureOut">
               <a:rPr lang="pt-BR" smtClean="0"/>
-              <a:t>21/11/2016</a:t>
+              <a:t>28/11/2016</a:t>
             </a:fld>
             <a:endParaRPr lang="pt-BR"/>
           </a:p>
@@ -12035,7 +12036,7 @@
           <a:p>
             <a:fld id="{54B95968-CED5-447B-ADA8-EFE194C8B328}" type="datetimeFigureOut">
               <a:rPr lang="pt-BR" smtClean="0"/>
-              <a:t>21/11/2016</a:t>
+              <a:t>28/11/2016</a:t>
             </a:fld>
             <a:endParaRPr lang="pt-BR"/>
           </a:p>
@@ -12246,7 +12247,7 @@
           <a:p>
             <a:fld id="{54B95968-CED5-447B-ADA8-EFE194C8B328}" type="datetimeFigureOut">
               <a:rPr lang="pt-BR" smtClean="0"/>
-              <a:t>21/11/2016</a:t>
+              <a:t>28/11/2016</a:t>
             </a:fld>
             <a:endParaRPr lang="pt-BR"/>
           </a:p>
@@ -17827,105 +17828,621 @@
           <a:chExt cx="0" cy="0"/>
         </a:xfrm>
       </p:grpSpPr>
-      <p:sp>
-        <p:nvSpPr>
-          <p:cNvPr id="2" name="Título 1"/>
-          <p:cNvSpPr>
-            <a:spLocks noGrp="1"/>
-          </p:cNvSpPr>
-          <p:nvPr>
-            <p:ph type="title"/>
-          </p:nvPr>
-        </p:nvSpPr>
-        <p:spPr/>
-        <p:txBody>
-          <a:bodyPr/>
-          <a:lstStyle/>
-          <a:p>
-            <a:endParaRPr lang="pt-BR"/>
-          </a:p>
-        </p:txBody>
-      </p:sp>
-      <p:sp>
-        <p:nvSpPr>
-          <p:cNvPr id="3" name="Espaço Reservado para Texto 2"/>
-          <p:cNvSpPr>
-            <a:spLocks noGrp="1"/>
-          </p:cNvSpPr>
-          <p:nvPr>
-            <p:ph type="body" idx="1"/>
-          </p:nvPr>
-        </p:nvSpPr>
-        <p:spPr/>
-        <p:txBody>
-          <a:bodyPr/>
-          <a:lstStyle/>
-          <a:p>
-            <a:endParaRPr lang="pt-BR"/>
-          </a:p>
-        </p:txBody>
-      </p:sp>
-      <p:sp>
-        <p:nvSpPr>
-          <p:cNvPr id="4" name="Espaço Reservado para Conteúdo 3"/>
-          <p:cNvSpPr>
-            <a:spLocks noGrp="1"/>
-          </p:cNvSpPr>
-          <p:nvPr>
-            <p:ph sz="half" idx="2"/>
-          </p:nvPr>
-        </p:nvSpPr>
-        <p:spPr/>
-        <p:txBody>
-          <a:bodyPr/>
-          <a:lstStyle/>
-          <a:p>
-            <a:endParaRPr lang="pt-BR"/>
-          </a:p>
-        </p:txBody>
-      </p:sp>
-      <p:sp>
-        <p:nvSpPr>
-          <p:cNvPr id="5" name="Espaço Reservado para Texto 4"/>
-          <p:cNvSpPr>
-            <a:spLocks noGrp="1"/>
-          </p:cNvSpPr>
-          <p:nvPr>
-            <p:ph type="body" sz="quarter" idx="3"/>
-          </p:nvPr>
-        </p:nvSpPr>
-        <p:spPr/>
-        <p:txBody>
-          <a:bodyPr/>
-          <a:lstStyle/>
-          <a:p>
-            <a:endParaRPr lang="pt-BR"/>
-          </a:p>
-        </p:txBody>
-      </p:sp>
-      <p:sp>
-        <p:nvSpPr>
-          <p:cNvPr id="6" name="Espaço Reservado para Conteúdo 5"/>
-          <p:cNvSpPr>
-            <a:spLocks noGrp="1"/>
-          </p:cNvSpPr>
-          <p:nvPr>
-            <p:ph sz="quarter" idx="4"/>
-          </p:nvPr>
-        </p:nvSpPr>
-        <p:spPr/>
-        <p:txBody>
-          <a:bodyPr/>
-          <a:lstStyle/>
-          <a:p>
-            <a:endParaRPr lang="pt-BR"/>
-          </a:p>
-        </p:txBody>
-      </p:sp>
+      <p:grpSp>
+        <p:nvGrpSpPr>
+          <p:cNvPr id="9" name="Agrupar 8"/>
+          <p:cNvGrpSpPr/>
+          <p:nvPr/>
+        </p:nvGrpSpPr>
+        <p:grpSpPr>
+          <a:xfrm>
+            <a:off x="4003357" y="1836107"/>
+            <a:ext cx="4703445" cy="3054980"/>
+            <a:chOff x="4003357" y="1836107"/>
+            <a:chExt cx="4703445" cy="3054980"/>
+          </a:xfrm>
+        </p:grpSpPr>
+        <p:pic>
+          <p:nvPicPr>
+            <p:cNvPr id="7" name="Imagem 6" descr="Campos do Cabeçalho TCP - Curso de Redes"/>
+            <p:cNvPicPr/>
+            <p:nvPr/>
+          </p:nvPicPr>
+          <p:blipFill>
+            <a:blip r:embed="rId2">
+              <a:extLst>
+                <a:ext uri="{28A0092B-C50C-407E-A947-70E740481C1C}">
+                  <a14:useLocalDpi xmlns:a14="http://schemas.microsoft.com/office/drawing/2010/main" val="0"/>
+                </a:ext>
+              </a:extLst>
+            </a:blip>
+            <a:srcRect/>
+            <a:stretch>
+              <a:fillRect/>
+            </a:stretch>
+          </p:blipFill>
+          <p:spPr bwMode="auto">
+            <a:xfrm>
+              <a:off x="4003357" y="1966912"/>
+              <a:ext cx="4185285" cy="2924175"/>
+            </a:xfrm>
+            <a:prstGeom prst="rect">
+              <a:avLst/>
+            </a:prstGeom>
+            <a:noFill/>
+            <a:ln>
+              <a:noFill/>
+            </a:ln>
+          </p:spPr>
+        </p:pic>
+        <p:sp>
+          <p:nvSpPr>
+            <p:cNvPr id="8" name="CaixaDeTexto 7"/>
+            <p:cNvSpPr txBox="1"/>
+            <p:nvPr/>
+          </p:nvSpPr>
+          <p:spPr>
+            <a:xfrm>
+              <a:off x="7670482" y="1836107"/>
+              <a:ext cx="1036320" cy="261610"/>
+            </a:xfrm>
+            <a:prstGeom prst="rect">
+              <a:avLst/>
+            </a:prstGeom>
+            <a:noFill/>
+          </p:spPr>
+          <p:txBody>
+            <a:bodyPr wrap="square" rtlCol="0">
+              <a:spAutoFit/>
+            </a:bodyPr>
+            <a:lstStyle/>
+            <a:p>
+              <a:r>
+                <a:rPr lang="pt-BR" sz="1050" dirty="0"/>
+                <a:t>bit</a:t>
+              </a:r>
+            </a:p>
+          </p:txBody>
+        </p:sp>
+      </p:grpSp>
+      <p:grpSp>
+        <p:nvGrpSpPr>
+          <p:cNvPr id="12" name="Agrupar 11"/>
+          <p:cNvGrpSpPr/>
+          <p:nvPr/>
+        </p:nvGrpSpPr>
+        <p:grpSpPr>
+          <a:xfrm>
+            <a:off x="8188642" y="2415544"/>
+            <a:ext cx="4703445" cy="1661720"/>
+            <a:chOff x="8188642" y="2415544"/>
+            <a:chExt cx="4703445" cy="1661720"/>
+          </a:xfrm>
+        </p:grpSpPr>
+        <p:pic>
+          <p:nvPicPr>
+            <p:cNvPr id="10" name="Imagem 9" descr="Formato do Cabeçalho UDP"/>
+            <p:cNvPicPr/>
+            <p:nvPr/>
+          </p:nvPicPr>
+          <p:blipFill>
+            <a:blip r:embed="rId3">
+              <a:extLst>
+                <a:ext uri="{28A0092B-C50C-407E-A947-70E740481C1C}">
+                  <a14:useLocalDpi xmlns:a14="http://schemas.microsoft.com/office/drawing/2010/main" val="0"/>
+                </a:ext>
+              </a:extLst>
+            </a:blip>
+            <a:srcRect/>
+            <a:stretch>
+              <a:fillRect/>
+            </a:stretch>
+          </p:blipFill>
+          <p:spPr bwMode="auto">
+            <a:xfrm>
+              <a:off x="8188642" y="2546349"/>
+              <a:ext cx="4098767" cy="1530915"/>
+            </a:xfrm>
+            <a:prstGeom prst="rect">
+              <a:avLst/>
+            </a:prstGeom>
+            <a:noFill/>
+            <a:ln>
+              <a:noFill/>
+            </a:ln>
+          </p:spPr>
+        </p:pic>
+        <p:sp>
+          <p:nvSpPr>
+            <p:cNvPr id="11" name="CaixaDeTexto 10"/>
+            <p:cNvSpPr txBox="1"/>
+            <p:nvPr/>
+          </p:nvSpPr>
+          <p:spPr>
+            <a:xfrm>
+              <a:off x="11855767" y="2415544"/>
+              <a:ext cx="1036320" cy="261610"/>
+            </a:xfrm>
+            <a:prstGeom prst="rect">
+              <a:avLst/>
+            </a:prstGeom>
+            <a:noFill/>
+          </p:spPr>
+          <p:txBody>
+            <a:bodyPr wrap="square" rtlCol="0">
+              <a:spAutoFit/>
+            </a:bodyPr>
+            <a:lstStyle/>
+            <a:p>
+              <a:r>
+                <a:rPr lang="pt-BR" sz="1050" dirty="0"/>
+                <a:t>bit</a:t>
+              </a:r>
+            </a:p>
+          </p:txBody>
+        </p:sp>
+      </p:grpSp>
     </p:spTree>
     <p:extLst>
       <p:ext uri="{BB962C8B-B14F-4D97-AF65-F5344CB8AC3E}">
         <p14:creationId xmlns:p14="http://schemas.microsoft.com/office/powerpoint/2010/main" val="3389126622"/>
+      </p:ext>
+    </p:extLst>
+  </p:cSld>
+  <p:clrMapOvr>
+    <a:masterClrMapping/>
+  </p:clrMapOvr>
+</p:sld>
+</file>
+
+<file path=ppt/slides/slide21.xml><?xml version="1.0" encoding="utf-8"?>
+<p:sld xmlns:a="http://schemas.openxmlformats.org/drawingml/2006/main" xmlns:r="http://schemas.openxmlformats.org/officeDocument/2006/relationships" xmlns:p="http://schemas.openxmlformats.org/presentationml/2006/main">
+  <p:cSld>
+    <p:spTree>
+      <p:nvGrpSpPr>
+        <p:cNvPr id="1" name=""/>
+        <p:cNvGrpSpPr/>
+        <p:nvPr/>
+      </p:nvGrpSpPr>
+      <p:grpSpPr>
+        <a:xfrm>
+          <a:off x="0" y="0"/>
+          <a:ext cx="0" cy="0"/>
+          <a:chOff x="0" y="0"/>
+          <a:chExt cx="0" cy="0"/>
+        </a:xfrm>
+      </p:grpSpPr>
+      <p:grpSp>
+        <p:nvGrpSpPr>
+          <p:cNvPr id="27" name="Agrupar 26"/>
+          <p:cNvGrpSpPr/>
+          <p:nvPr/>
+        </p:nvGrpSpPr>
+        <p:grpSpPr>
+          <a:xfrm>
+            <a:off x="2076450" y="690086"/>
+            <a:ext cx="7105650" cy="5444014"/>
+            <a:chOff x="2076450" y="690086"/>
+            <a:chExt cx="7105650" cy="5444014"/>
+          </a:xfrm>
+        </p:grpSpPr>
+        <p:cxnSp>
+          <p:nvCxnSpPr>
+            <p:cNvPr id="8" name="Conector reto 7"/>
+            <p:cNvCxnSpPr/>
+            <p:nvPr/>
+          </p:nvCxnSpPr>
+          <p:spPr>
+            <a:xfrm>
+              <a:off x="3657600" y="1428750"/>
+              <a:ext cx="0" cy="4705350"/>
+            </a:xfrm>
+            <a:prstGeom prst="line">
+              <a:avLst/>
+            </a:prstGeom>
+          </p:spPr>
+          <p:style>
+            <a:lnRef idx="3">
+              <a:schemeClr val="dk1"/>
+            </a:lnRef>
+            <a:fillRef idx="0">
+              <a:schemeClr val="dk1"/>
+            </a:fillRef>
+            <a:effectRef idx="2">
+              <a:schemeClr val="dk1"/>
+            </a:effectRef>
+            <a:fontRef idx="minor">
+              <a:schemeClr val="tx1"/>
+            </a:fontRef>
+          </p:style>
+        </p:cxnSp>
+        <p:cxnSp>
+          <p:nvCxnSpPr>
+            <p:cNvPr id="10" name="Conector reto 9"/>
+            <p:cNvCxnSpPr/>
+            <p:nvPr/>
+          </p:nvCxnSpPr>
+          <p:spPr>
+            <a:xfrm>
+              <a:off x="7353300" y="1428750"/>
+              <a:ext cx="0" cy="4705350"/>
+            </a:xfrm>
+            <a:prstGeom prst="line">
+              <a:avLst/>
+            </a:prstGeom>
+          </p:spPr>
+          <p:style>
+            <a:lnRef idx="3">
+              <a:schemeClr val="dk1"/>
+            </a:lnRef>
+            <a:fillRef idx="0">
+              <a:schemeClr val="dk1"/>
+            </a:fillRef>
+            <a:effectRef idx="2">
+              <a:schemeClr val="dk1"/>
+            </a:effectRef>
+            <a:fontRef idx="minor">
+              <a:schemeClr val="tx1"/>
+            </a:fontRef>
+          </p:style>
+        </p:cxnSp>
+        <p:cxnSp>
+          <p:nvCxnSpPr>
+            <p:cNvPr id="14" name="Conector de Seta Reta 13"/>
+            <p:cNvCxnSpPr/>
+            <p:nvPr/>
+          </p:nvCxnSpPr>
+          <p:spPr>
+            <a:xfrm>
+              <a:off x="3657600" y="1600200"/>
+              <a:ext cx="3695700" cy="1123950"/>
+            </a:xfrm>
+            <a:prstGeom prst="straightConnector1">
+              <a:avLst/>
+            </a:prstGeom>
+            <a:ln>
+              <a:solidFill>
+                <a:srgbClr val="FF0000"/>
+              </a:solidFill>
+              <a:tailEnd type="triangle"/>
+            </a:ln>
+          </p:spPr>
+          <p:style>
+            <a:lnRef idx="1">
+              <a:schemeClr val="accent1"/>
+            </a:lnRef>
+            <a:fillRef idx="0">
+              <a:schemeClr val="accent1"/>
+            </a:fillRef>
+            <a:effectRef idx="0">
+              <a:schemeClr val="accent1"/>
+            </a:effectRef>
+            <a:fontRef idx="minor">
+              <a:schemeClr val="tx1"/>
+            </a:fontRef>
+          </p:style>
+        </p:cxnSp>
+        <p:cxnSp>
+          <p:nvCxnSpPr>
+            <p:cNvPr id="16" name="Conector de Seta Reta 15"/>
+            <p:cNvCxnSpPr/>
+            <p:nvPr/>
+          </p:nvCxnSpPr>
+          <p:spPr>
+            <a:xfrm flipH="1">
+              <a:off x="3657600" y="2895600"/>
+              <a:ext cx="3695700" cy="1238250"/>
+            </a:xfrm>
+            <a:prstGeom prst="straightConnector1">
+              <a:avLst/>
+            </a:prstGeom>
+            <a:ln>
+              <a:solidFill>
+                <a:srgbClr val="FF0000"/>
+              </a:solidFill>
+              <a:tailEnd type="triangle"/>
+            </a:ln>
+          </p:spPr>
+          <p:style>
+            <a:lnRef idx="1">
+              <a:schemeClr val="accent1"/>
+            </a:lnRef>
+            <a:fillRef idx="0">
+              <a:schemeClr val="accent1"/>
+            </a:fillRef>
+            <a:effectRef idx="0">
+              <a:schemeClr val="accent1"/>
+            </a:effectRef>
+            <a:fontRef idx="minor">
+              <a:schemeClr val="tx1"/>
+            </a:fontRef>
+          </p:style>
+        </p:cxnSp>
+        <p:cxnSp>
+          <p:nvCxnSpPr>
+            <p:cNvPr id="17" name="Conector de Seta Reta 16"/>
+            <p:cNvCxnSpPr/>
+            <p:nvPr/>
+          </p:nvCxnSpPr>
+          <p:spPr>
+            <a:xfrm>
+              <a:off x="3657600" y="4305300"/>
+              <a:ext cx="3695700" cy="1123950"/>
+            </a:xfrm>
+            <a:prstGeom prst="straightConnector1">
+              <a:avLst/>
+            </a:prstGeom>
+            <a:ln>
+              <a:solidFill>
+                <a:srgbClr val="FF0000"/>
+              </a:solidFill>
+              <a:tailEnd type="triangle"/>
+            </a:ln>
+          </p:spPr>
+          <p:style>
+            <a:lnRef idx="1">
+              <a:schemeClr val="accent1"/>
+            </a:lnRef>
+            <a:fillRef idx="0">
+              <a:schemeClr val="accent1"/>
+            </a:fillRef>
+            <a:effectRef idx="0">
+              <a:schemeClr val="accent1"/>
+            </a:effectRef>
+            <a:fontRef idx="minor">
+              <a:schemeClr val="tx1"/>
+            </a:fontRef>
+          </p:style>
+        </p:cxnSp>
+        <p:sp>
+          <p:nvSpPr>
+            <p:cNvPr id="18" name="CaixaDeTexto 17"/>
+            <p:cNvSpPr txBox="1"/>
+            <p:nvPr/>
+          </p:nvSpPr>
+          <p:spPr>
+            <a:xfrm>
+              <a:off x="2076450" y="1059418"/>
+              <a:ext cx="1581150" cy="369332"/>
+            </a:xfrm>
+            <a:prstGeom prst="rect">
+              <a:avLst/>
+            </a:prstGeom>
+            <a:noFill/>
+          </p:spPr>
+          <p:txBody>
+            <a:bodyPr wrap="square" rtlCol="0">
+              <a:spAutoFit/>
+            </a:bodyPr>
+            <a:lstStyle/>
+            <a:p>
+              <a:r>
+                <a:rPr lang="pt-BR" dirty="0"/>
+                <a:t>Segmento 0</a:t>
+              </a:r>
+            </a:p>
+          </p:txBody>
+        </p:sp>
+        <p:sp>
+          <p:nvSpPr>
+            <p:cNvPr id="19" name="CaixaDeTexto 18"/>
+            <p:cNvSpPr txBox="1"/>
+            <p:nvPr/>
+          </p:nvSpPr>
+          <p:spPr>
+            <a:xfrm>
+              <a:off x="7353299" y="1059418"/>
+              <a:ext cx="1581150" cy="369332"/>
+            </a:xfrm>
+            <a:prstGeom prst="rect">
+              <a:avLst/>
+            </a:prstGeom>
+            <a:noFill/>
+          </p:spPr>
+          <p:txBody>
+            <a:bodyPr wrap="square" rtlCol="0">
+              <a:spAutoFit/>
+            </a:bodyPr>
+            <a:lstStyle/>
+            <a:p>
+              <a:r>
+                <a:rPr lang="pt-BR" dirty="0"/>
+                <a:t>Segmento 1</a:t>
+              </a:r>
+            </a:p>
+          </p:txBody>
+        </p:sp>
+        <p:sp>
+          <p:nvSpPr>
+            <p:cNvPr id="20" name="CaixaDeTexto 19"/>
+            <p:cNvSpPr txBox="1"/>
+            <p:nvPr/>
+          </p:nvSpPr>
+          <p:spPr>
+            <a:xfrm>
+              <a:off x="2076450" y="690086"/>
+              <a:ext cx="1771650" cy="369332"/>
+            </a:xfrm>
+            <a:prstGeom prst="rect">
+              <a:avLst/>
+            </a:prstGeom>
+            <a:noFill/>
+          </p:spPr>
+          <p:txBody>
+            <a:bodyPr wrap="square" rtlCol="0">
+              <a:spAutoFit/>
+            </a:bodyPr>
+            <a:lstStyle/>
+            <a:p>
+              <a:r>
+                <a:rPr lang="pt-BR" b="1" dirty="0"/>
+                <a:t>Computador</a:t>
+              </a:r>
+            </a:p>
+          </p:txBody>
+        </p:sp>
+        <p:sp>
+          <p:nvSpPr>
+            <p:cNvPr id="21" name="CaixaDeTexto 20"/>
+            <p:cNvSpPr txBox="1"/>
+            <p:nvPr/>
+          </p:nvSpPr>
+          <p:spPr>
+            <a:xfrm>
+              <a:off x="7410450" y="690086"/>
+              <a:ext cx="1771650" cy="369332"/>
+            </a:xfrm>
+            <a:prstGeom prst="rect">
+              <a:avLst/>
+            </a:prstGeom>
+            <a:noFill/>
+          </p:spPr>
+          <p:txBody>
+            <a:bodyPr wrap="square" rtlCol="0">
+              <a:spAutoFit/>
+            </a:bodyPr>
+            <a:lstStyle/>
+            <a:p>
+              <a:r>
+                <a:rPr lang="pt-BR" b="1" dirty="0"/>
+                <a:t>BBB</a:t>
+              </a:r>
+            </a:p>
+          </p:txBody>
+        </p:sp>
+        <p:sp>
+          <p:nvSpPr>
+            <p:cNvPr id="22" name="CaixaDeTexto 21"/>
+            <p:cNvSpPr txBox="1"/>
+            <p:nvPr/>
+          </p:nvSpPr>
+          <p:spPr>
+            <a:xfrm rot="900000">
+              <a:off x="5126277" y="1996606"/>
+              <a:ext cx="1728300" cy="369332"/>
+            </a:xfrm>
+            <a:prstGeom prst="rect">
+              <a:avLst/>
+            </a:prstGeom>
+            <a:noFill/>
+          </p:spPr>
+          <p:txBody>
+            <a:bodyPr wrap="square" rtlCol="0">
+              <a:spAutoFit/>
+            </a:bodyPr>
+            <a:lstStyle/>
+            <a:p>
+              <a:r>
+                <a:rPr lang="pt-BR" dirty="0"/>
+                <a:t>SYN (</a:t>
+              </a:r>
+              <a:r>
+                <a:rPr lang="pt-BR" dirty="0" err="1"/>
+                <a:t>Seq</a:t>
+              </a:r>
+              <a:r>
+                <a:rPr lang="pt-BR" dirty="0"/>
+                <a:t> = ISN)</a:t>
+              </a:r>
+            </a:p>
+          </p:txBody>
+        </p:sp>
+        <p:sp>
+          <p:nvSpPr>
+            <p:cNvPr id="23" name="CaixaDeTexto 22"/>
+            <p:cNvSpPr txBox="1"/>
+            <p:nvPr/>
+          </p:nvSpPr>
+          <p:spPr>
+            <a:xfrm rot="20456619">
+              <a:off x="3595410" y="3237853"/>
+              <a:ext cx="3606744" cy="369332"/>
+            </a:xfrm>
+            <a:prstGeom prst="rect">
+              <a:avLst/>
+            </a:prstGeom>
+            <a:noFill/>
+          </p:spPr>
+          <p:txBody>
+            <a:bodyPr wrap="square" rtlCol="0">
+              <a:spAutoFit/>
+            </a:bodyPr>
+            <a:lstStyle/>
+            <a:p>
+              <a:r>
+                <a:rPr lang="pt-BR" dirty="0"/>
+                <a:t>SYN, ACK, (</a:t>
+              </a:r>
+              <a:r>
+                <a:rPr lang="pt-BR" dirty="0" err="1"/>
+                <a:t>Seq</a:t>
+              </a:r>
+              <a:r>
+                <a:rPr lang="pt-BR" dirty="0"/>
+                <a:t> = ISN), (</a:t>
+              </a:r>
+              <a:r>
+                <a:rPr lang="pt-BR" dirty="0" err="1"/>
+                <a:t>Ack</a:t>
+              </a:r>
+              <a:r>
+                <a:rPr lang="pt-BR" dirty="0"/>
+                <a:t> = ISN + 1)</a:t>
+              </a:r>
+              <a:endParaRPr lang="pt-BR" dirty="0"/>
+            </a:p>
+          </p:txBody>
+        </p:sp>
+        <p:sp>
+          <p:nvSpPr>
+            <p:cNvPr id="25" name="CaixaDeTexto 24"/>
+            <p:cNvSpPr txBox="1"/>
+            <p:nvPr/>
+          </p:nvSpPr>
+          <p:spPr>
+            <a:xfrm rot="1034911">
+              <a:off x="3815859" y="4618575"/>
+              <a:ext cx="4094893" cy="369332"/>
+            </a:xfrm>
+            <a:prstGeom prst="rect">
+              <a:avLst/>
+            </a:prstGeom>
+            <a:noFill/>
+          </p:spPr>
+          <p:txBody>
+            <a:bodyPr wrap="square" rtlCol="0">
+              <a:spAutoFit/>
+            </a:bodyPr>
+            <a:lstStyle/>
+            <a:p>
+              <a:r>
+                <a:rPr lang="pt-BR" dirty="0"/>
+                <a:t>ACK, (</a:t>
+              </a:r>
+              <a:r>
+                <a:rPr lang="pt-BR" dirty="0" err="1"/>
+                <a:t>Seq</a:t>
+              </a:r>
+              <a:r>
+                <a:rPr lang="pt-BR" dirty="0"/>
+                <a:t> = ISN+1), (</a:t>
+              </a:r>
+              <a:r>
+                <a:rPr lang="pt-BR" dirty="0" err="1"/>
+                <a:t>Ack</a:t>
+              </a:r>
+              <a:r>
+                <a:rPr lang="pt-BR" dirty="0"/>
+                <a:t> = ISN + 1)</a:t>
+              </a:r>
+            </a:p>
+          </p:txBody>
+        </p:sp>
+      </p:grpSp>
+    </p:spTree>
+    <p:extLst>
+      <p:ext uri="{BB962C8B-B14F-4D97-AF65-F5344CB8AC3E}">
+        <p14:creationId xmlns:p14="http://schemas.microsoft.com/office/powerpoint/2010/main" val="2796669995"/>
       </p:ext>
     </p:extLst>
   </p:cSld>

</xml_diff>

<commit_message>
A bateria do meu note está acabando
</commit_message>
<xml_diff>
--- a/Word/Figuras.pptx
+++ b/Word/Figuras.pptx
@@ -26,6 +26,8 @@
     <p:sldId id="274" r:id="rId20"/>
     <p:sldId id="275" r:id="rId21"/>
     <p:sldId id="276" r:id="rId22"/>
+    <p:sldId id="277" r:id="rId23"/>
+    <p:sldId id="278" r:id="rId24"/>
   </p:sldIdLst>
   <p:sldSz cx="12192000" cy="6858000"/>
   <p:notesSz cx="6858000" cy="9144000"/>
@@ -9945,7 +9947,7 @@
           <a:p>
             <a:fld id="{54B95968-CED5-447B-ADA8-EFE194C8B328}" type="datetimeFigureOut">
               <a:rPr lang="pt-BR" smtClean="0"/>
-              <a:t>28/11/2016</a:t>
+              <a:t>29/11/2016</a:t>
             </a:fld>
             <a:endParaRPr lang="pt-BR"/>
           </a:p>
@@ -10113,7 +10115,7 @@
           <a:p>
             <a:fld id="{54B95968-CED5-447B-ADA8-EFE194C8B328}" type="datetimeFigureOut">
               <a:rPr lang="pt-BR" smtClean="0"/>
-              <a:t>28/11/2016</a:t>
+              <a:t>29/11/2016</a:t>
             </a:fld>
             <a:endParaRPr lang="pt-BR"/>
           </a:p>
@@ -10291,7 +10293,7 @@
           <a:p>
             <a:fld id="{54B95968-CED5-447B-ADA8-EFE194C8B328}" type="datetimeFigureOut">
               <a:rPr lang="pt-BR" smtClean="0"/>
-              <a:t>28/11/2016</a:t>
+              <a:t>29/11/2016</a:t>
             </a:fld>
             <a:endParaRPr lang="pt-BR"/>
           </a:p>
@@ -10459,7 +10461,7 @@
           <a:p>
             <a:fld id="{54B95968-CED5-447B-ADA8-EFE194C8B328}" type="datetimeFigureOut">
               <a:rPr lang="pt-BR" smtClean="0"/>
-              <a:t>28/11/2016</a:t>
+              <a:t>29/11/2016</a:t>
             </a:fld>
             <a:endParaRPr lang="pt-BR"/>
           </a:p>
@@ -10704,7 +10706,7 @@
           <a:p>
             <a:fld id="{54B95968-CED5-447B-ADA8-EFE194C8B328}" type="datetimeFigureOut">
               <a:rPr lang="pt-BR" smtClean="0"/>
-              <a:t>28/11/2016</a:t>
+              <a:t>29/11/2016</a:t>
             </a:fld>
             <a:endParaRPr lang="pt-BR"/>
           </a:p>
@@ -10933,7 +10935,7 @@
           <a:p>
             <a:fld id="{54B95968-CED5-447B-ADA8-EFE194C8B328}" type="datetimeFigureOut">
               <a:rPr lang="pt-BR" smtClean="0"/>
-              <a:t>28/11/2016</a:t>
+              <a:t>29/11/2016</a:t>
             </a:fld>
             <a:endParaRPr lang="pt-BR"/>
           </a:p>
@@ -11297,7 +11299,7 @@
           <a:p>
             <a:fld id="{54B95968-CED5-447B-ADA8-EFE194C8B328}" type="datetimeFigureOut">
               <a:rPr lang="pt-BR" smtClean="0"/>
-              <a:t>28/11/2016</a:t>
+              <a:t>29/11/2016</a:t>
             </a:fld>
             <a:endParaRPr lang="pt-BR"/>
           </a:p>
@@ -11414,7 +11416,7 @@
           <a:p>
             <a:fld id="{54B95968-CED5-447B-ADA8-EFE194C8B328}" type="datetimeFigureOut">
               <a:rPr lang="pt-BR" smtClean="0"/>
-              <a:t>28/11/2016</a:t>
+              <a:t>29/11/2016</a:t>
             </a:fld>
             <a:endParaRPr lang="pt-BR"/>
           </a:p>
@@ -11509,7 +11511,7 @@
           <a:p>
             <a:fld id="{54B95968-CED5-447B-ADA8-EFE194C8B328}" type="datetimeFigureOut">
               <a:rPr lang="pt-BR" smtClean="0"/>
-              <a:t>28/11/2016</a:t>
+              <a:t>29/11/2016</a:t>
             </a:fld>
             <a:endParaRPr lang="pt-BR"/>
           </a:p>
@@ -11784,7 +11786,7 @@
           <a:p>
             <a:fld id="{54B95968-CED5-447B-ADA8-EFE194C8B328}" type="datetimeFigureOut">
               <a:rPr lang="pt-BR" smtClean="0"/>
-              <a:t>28/11/2016</a:t>
+              <a:t>29/11/2016</a:t>
             </a:fld>
             <a:endParaRPr lang="pt-BR"/>
           </a:p>
@@ -12036,7 +12038,7 @@
           <a:p>
             <a:fld id="{54B95968-CED5-447B-ADA8-EFE194C8B328}" type="datetimeFigureOut">
               <a:rPr lang="pt-BR" smtClean="0"/>
-              <a:t>28/11/2016</a:t>
+              <a:t>29/11/2016</a:t>
             </a:fld>
             <a:endParaRPr lang="pt-BR"/>
           </a:p>
@@ -12247,7 +12249,7 @@
           <a:p>
             <a:fld id="{54B95968-CED5-447B-ADA8-EFE194C8B328}" type="datetimeFigureOut">
               <a:rPr lang="pt-BR" smtClean="0"/>
-              <a:t>28/11/2016</a:t>
+              <a:t>29/11/2016</a:t>
             </a:fld>
             <a:endParaRPr lang="pt-BR"/>
           </a:p>
@@ -18389,7 +18391,6 @@
                 <a:rPr lang="pt-BR" dirty="0"/>
                 <a:t> = ISN + 1)</a:t>
               </a:r>
-              <a:endParaRPr lang="pt-BR" dirty="0"/>
             </a:p>
           </p:txBody>
         </p:sp>
@@ -18443,6 +18444,758 @@
     <p:extLst>
       <p:ext uri="{BB962C8B-B14F-4D97-AF65-F5344CB8AC3E}">
         <p14:creationId xmlns:p14="http://schemas.microsoft.com/office/powerpoint/2010/main" val="2796669995"/>
+      </p:ext>
+    </p:extLst>
+  </p:cSld>
+  <p:clrMapOvr>
+    <a:masterClrMapping/>
+  </p:clrMapOvr>
+</p:sld>
+</file>
+
+<file path=ppt/slides/slide22.xml><?xml version="1.0" encoding="utf-8"?>
+<p:sld xmlns:a="http://schemas.openxmlformats.org/drawingml/2006/main" xmlns:r="http://schemas.openxmlformats.org/officeDocument/2006/relationships" xmlns:p="http://schemas.openxmlformats.org/presentationml/2006/main">
+  <p:cSld>
+    <p:spTree>
+      <p:nvGrpSpPr>
+        <p:cNvPr id="1" name=""/>
+        <p:cNvGrpSpPr/>
+        <p:nvPr/>
+      </p:nvGrpSpPr>
+      <p:grpSpPr>
+        <a:xfrm>
+          <a:off x="0" y="0"/>
+          <a:ext cx="0" cy="0"/>
+          <a:chOff x="0" y="0"/>
+          <a:chExt cx="0" cy="0"/>
+        </a:xfrm>
+      </p:grpSpPr>
+      <p:grpSp>
+        <p:nvGrpSpPr>
+          <p:cNvPr id="27" name="Agrupar 26"/>
+          <p:cNvGrpSpPr/>
+          <p:nvPr/>
+        </p:nvGrpSpPr>
+        <p:grpSpPr>
+          <a:xfrm>
+            <a:off x="2445327" y="3135868"/>
+            <a:ext cx="8721436" cy="2054846"/>
+            <a:chOff x="2445327" y="3135868"/>
+            <a:chExt cx="8721436" cy="2054846"/>
+          </a:xfrm>
+        </p:grpSpPr>
+        <p:sp>
+          <p:nvSpPr>
+            <p:cNvPr id="23" name="CaixaDeTexto 22"/>
+            <p:cNvSpPr txBox="1"/>
+            <p:nvPr/>
+          </p:nvSpPr>
+          <p:spPr>
+            <a:xfrm>
+              <a:off x="8326581" y="4821382"/>
+              <a:ext cx="2840182" cy="369332"/>
+            </a:xfrm>
+            <a:prstGeom prst="rect">
+              <a:avLst/>
+            </a:prstGeom>
+            <a:noFill/>
+          </p:spPr>
+          <p:txBody>
+            <a:bodyPr wrap="square" rtlCol="0">
+              <a:spAutoFit/>
+            </a:bodyPr>
+            <a:lstStyle/>
+            <a:p>
+              <a:r>
+                <a:rPr lang="pt-BR" dirty="0">
+                  <a:latin typeface="Arial" panose="020B0604020202020204" pitchFamily="34" charset="0"/>
+                  <a:cs typeface="Arial" panose="020B0604020202020204" pitchFamily="34" charset="0"/>
+                </a:rPr>
+                <a:t>Tempo</a:t>
+              </a:r>
+            </a:p>
+          </p:txBody>
+        </p:sp>
+        <p:grpSp>
+          <p:nvGrpSpPr>
+            <p:cNvPr id="24" name="Agrupar 23"/>
+            <p:cNvGrpSpPr/>
+            <p:nvPr/>
+          </p:nvGrpSpPr>
+          <p:grpSpPr>
+            <a:xfrm>
+              <a:off x="2445327" y="3135868"/>
+              <a:ext cx="6629400" cy="1685514"/>
+              <a:chOff x="2445327" y="3135868"/>
+              <a:chExt cx="6629400" cy="1685514"/>
+            </a:xfrm>
+          </p:grpSpPr>
+          <p:cxnSp>
+            <p:nvCxnSpPr>
+              <p:cNvPr id="15" name="Conector de Seta Reta 14"/>
+              <p:cNvCxnSpPr/>
+              <p:nvPr/>
+            </p:nvCxnSpPr>
+            <p:spPr>
+              <a:xfrm>
+                <a:off x="3228109" y="4821382"/>
+                <a:ext cx="5846618" cy="0"/>
+              </a:xfrm>
+              <a:prstGeom prst="straightConnector1">
+                <a:avLst/>
+              </a:prstGeom>
+              <a:ln>
+                <a:tailEnd type="triangle"/>
+              </a:ln>
+            </p:spPr>
+            <p:style>
+              <a:lnRef idx="1">
+                <a:schemeClr val="dk1"/>
+              </a:lnRef>
+              <a:fillRef idx="0">
+                <a:schemeClr val="dk1"/>
+              </a:fillRef>
+              <a:effectRef idx="0">
+                <a:schemeClr val="dk1"/>
+              </a:effectRef>
+              <a:fontRef idx="minor">
+                <a:schemeClr val="tx1"/>
+              </a:fontRef>
+            </p:style>
+          </p:cxnSp>
+          <p:cxnSp>
+            <p:nvCxnSpPr>
+              <p:cNvPr id="17" name="Conector reto 16"/>
+              <p:cNvCxnSpPr/>
+              <p:nvPr/>
+            </p:nvCxnSpPr>
+            <p:spPr>
+              <a:xfrm>
+                <a:off x="3865418" y="4350327"/>
+                <a:ext cx="1025237" cy="0"/>
+              </a:xfrm>
+              <a:prstGeom prst="line">
+                <a:avLst/>
+              </a:prstGeom>
+            </p:spPr>
+            <p:style>
+              <a:lnRef idx="1">
+                <a:schemeClr val="dk1"/>
+              </a:lnRef>
+              <a:fillRef idx="0">
+                <a:schemeClr val="dk1"/>
+              </a:fillRef>
+              <a:effectRef idx="0">
+                <a:schemeClr val="dk1"/>
+              </a:effectRef>
+              <a:fontRef idx="minor">
+                <a:schemeClr val="tx1"/>
+              </a:fontRef>
+            </p:style>
+          </p:cxnSp>
+          <p:cxnSp>
+            <p:nvCxnSpPr>
+              <p:cNvPr id="19" name="Conector reto 18"/>
+              <p:cNvCxnSpPr/>
+              <p:nvPr/>
+            </p:nvCxnSpPr>
+            <p:spPr>
+              <a:xfrm>
+                <a:off x="4890655" y="3505200"/>
+                <a:ext cx="1468581" cy="0"/>
+              </a:xfrm>
+              <a:prstGeom prst="line">
+                <a:avLst/>
+              </a:prstGeom>
+            </p:spPr>
+            <p:style>
+              <a:lnRef idx="1">
+                <a:schemeClr val="dk1"/>
+              </a:lnRef>
+              <a:fillRef idx="0">
+                <a:schemeClr val="dk1"/>
+              </a:fillRef>
+              <a:effectRef idx="0">
+                <a:schemeClr val="dk1"/>
+              </a:effectRef>
+              <a:fontRef idx="minor">
+                <a:schemeClr val="tx1"/>
+              </a:fontRef>
+            </p:style>
+          </p:cxnSp>
+          <p:cxnSp>
+            <p:nvCxnSpPr>
+              <p:cNvPr id="21" name="Conector reto 20"/>
+              <p:cNvCxnSpPr/>
+              <p:nvPr/>
+            </p:nvCxnSpPr>
+            <p:spPr>
+              <a:xfrm>
+                <a:off x="6456218" y="4350327"/>
+                <a:ext cx="1468582" cy="0"/>
+              </a:xfrm>
+              <a:prstGeom prst="line">
+                <a:avLst/>
+              </a:prstGeom>
+            </p:spPr>
+            <p:style>
+              <a:lnRef idx="1">
+                <a:schemeClr val="dk1"/>
+              </a:lnRef>
+              <a:fillRef idx="0">
+                <a:schemeClr val="dk1"/>
+              </a:fillRef>
+              <a:effectRef idx="0">
+                <a:schemeClr val="dk1"/>
+              </a:effectRef>
+              <a:fontRef idx="minor">
+                <a:schemeClr val="tx1"/>
+              </a:fontRef>
+            </p:style>
+          </p:cxnSp>
+          <p:sp>
+            <p:nvSpPr>
+              <p:cNvPr id="25" name="CaixaDeTexto 24"/>
+              <p:cNvSpPr txBox="1"/>
+              <p:nvPr/>
+            </p:nvSpPr>
+            <p:spPr>
+              <a:xfrm>
+                <a:off x="3519054" y="3135868"/>
+                <a:ext cx="2840182" cy="369332"/>
+              </a:xfrm>
+              <a:prstGeom prst="rect">
+                <a:avLst/>
+              </a:prstGeom>
+              <a:noFill/>
+            </p:spPr>
+            <p:txBody>
+              <a:bodyPr wrap="square" rtlCol="0">
+                <a:spAutoFit/>
+              </a:bodyPr>
+              <a:lstStyle/>
+              <a:p>
+                <a:r>
+                  <a:rPr lang="pt-BR" dirty="0">
+                    <a:latin typeface="Arial" panose="020B0604020202020204" pitchFamily="34" charset="0"/>
+                    <a:cs typeface="Arial" panose="020B0604020202020204" pitchFamily="34" charset="0"/>
+                  </a:rPr>
+                  <a:t>Thread 1</a:t>
+                </a:r>
+              </a:p>
+            </p:txBody>
+          </p:sp>
+          <p:sp>
+            <p:nvSpPr>
+              <p:cNvPr id="26" name="CaixaDeTexto 25"/>
+              <p:cNvSpPr txBox="1"/>
+              <p:nvPr/>
+            </p:nvSpPr>
+            <p:spPr>
+              <a:xfrm>
+                <a:off x="2445327" y="4082719"/>
+                <a:ext cx="2840182" cy="369332"/>
+              </a:xfrm>
+              <a:prstGeom prst="rect">
+                <a:avLst/>
+              </a:prstGeom>
+              <a:noFill/>
+            </p:spPr>
+            <p:txBody>
+              <a:bodyPr wrap="square" rtlCol="0">
+                <a:spAutoFit/>
+              </a:bodyPr>
+              <a:lstStyle/>
+              <a:p>
+                <a:r>
+                  <a:rPr lang="pt-BR" dirty="0">
+                    <a:latin typeface="Arial" panose="020B0604020202020204" pitchFamily="34" charset="0"/>
+                    <a:cs typeface="Arial" panose="020B0604020202020204" pitchFamily="34" charset="0"/>
+                  </a:rPr>
+                  <a:t>Thread 2</a:t>
+                </a:r>
+              </a:p>
+            </p:txBody>
+          </p:sp>
+        </p:grpSp>
+      </p:grpSp>
+    </p:spTree>
+    <p:extLst>
+      <p:ext uri="{BB962C8B-B14F-4D97-AF65-F5344CB8AC3E}">
+        <p14:creationId xmlns:p14="http://schemas.microsoft.com/office/powerpoint/2010/main" val="2992327576"/>
+      </p:ext>
+    </p:extLst>
+  </p:cSld>
+  <p:clrMapOvr>
+    <a:masterClrMapping/>
+  </p:clrMapOvr>
+</p:sld>
+</file>
+
+<file path=ppt/slides/slide23.xml><?xml version="1.0" encoding="utf-8"?>
+<p:sld xmlns:a="http://schemas.openxmlformats.org/drawingml/2006/main" xmlns:r="http://schemas.openxmlformats.org/officeDocument/2006/relationships" xmlns:p="http://schemas.openxmlformats.org/presentationml/2006/main">
+  <p:cSld>
+    <p:spTree>
+      <p:nvGrpSpPr>
+        <p:cNvPr id="1" name=""/>
+        <p:cNvGrpSpPr/>
+        <p:nvPr/>
+      </p:nvGrpSpPr>
+      <p:grpSpPr>
+        <a:xfrm>
+          <a:off x="0" y="0"/>
+          <a:ext cx="0" cy="0"/>
+          <a:chOff x="0" y="0"/>
+          <a:chExt cx="0" cy="0"/>
+        </a:xfrm>
+      </p:grpSpPr>
+      <p:grpSp>
+        <p:nvGrpSpPr>
+          <p:cNvPr id="24" name="Agrupar 23"/>
+          <p:cNvGrpSpPr/>
+          <p:nvPr/>
+        </p:nvGrpSpPr>
+        <p:grpSpPr>
+          <a:xfrm>
+            <a:off x="2022764" y="540326"/>
+            <a:ext cx="6852252" cy="4955369"/>
+            <a:chOff x="2022764" y="540326"/>
+            <a:chExt cx="6852252" cy="4955369"/>
+          </a:xfrm>
+        </p:grpSpPr>
+        <p:sp>
+          <p:nvSpPr>
+            <p:cNvPr id="22" name="Retângulo 21"/>
+            <p:cNvSpPr/>
+            <p:nvPr/>
+          </p:nvSpPr>
+          <p:spPr>
+            <a:xfrm>
+              <a:off x="2022764" y="909658"/>
+              <a:ext cx="6151419" cy="4258086"/>
+            </a:xfrm>
+            <a:prstGeom prst="rect">
+              <a:avLst/>
+            </a:prstGeom>
+            <a:ln>
+              <a:prstDash val="lgDash"/>
+            </a:ln>
+          </p:spPr>
+          <p:style>
+            <a:lnRef idx="2">
+              <a:schemeClr val="dk1"/>
+            </a:lnRef>
+            <a:fillRef idx="1">
+              <a:schemeClr val="lt1"/>
+            </a:fillRef>
+            <a:effectRef idx="0">
+              <a:schemeClr val="dk1"/>
+            </a:effectRef>
+            <a:fontRef idx="minor">
+              <a:schemeClr val="dk1"/>
+            </a:fontRef>
+          </p:style>
+          <p:txBody>
+            <a:bodyPr rtlCol="0" anchor="ctr"/>
+            <a:lstStyle/>
+            <a:p>
+              <a:pPr algn="ctr"/>
+              <a:endParaRPr lang="pt-BR" dirty="0"/>
+            </a:p>
+          </p:txBody>
+        </p:sp>
+        <p:grpSp>
+          <p:nvGrpSpPr>
+            <p:cNvPr id="21" name="Agrupar 20"/>
+            <p:cNvGrpSpPr/>
+            <p:nvPr/>
+          </p:nvGrpSpPr>
+          <p:grpSpPr>
+            <a:xfrm>
+              <a:off x="2022764" y="540326"/>
+              <a:ext cx="6852252" cy="4955369"/>
+              <a:chOff x="2022764" y="540326"/>
+              <a:chExt cx="6852252" cy="4955369"/>
+            </a:xfrm>
+          </p:grpSpPr>
+          <p:sp>
+            <p:nvSpPr>
+              <p:cNvPr id="8" name="Retângulo 7"/>
+              <p:cNvSpPr/>
+              <p:nvPr/>
+            </p:nvSpPr>
+            <p:spPr>
+              <a:xfrm>
+                <a:off x="5126181" y="1274616"/>
+                <a:ext cx="3048002" cy="817418"/>
+              </a:xfrm>
+              <a:prstGeom prst="rect">
+                <a:avLst/>
+              </a:prstGeom>
+            </p:spPr>
+            <p:style>
+              <a:lnRef idx="2">
+                <a:schemeClr val="dk1"/>
+              </a:lnRef>
+              <a:fillRef idx="1">
+                <a:schemeClr val="lt1"/>
+              </a:fillRef>
+              <a:effectRef idx="0">
+                <a:schemeClr val="dk1"/>
+              </a:effectRef>
+              <a:fontRef idx="minor">
+                <a:schemeClr val="dk1"/>
+              </a:fontRef>
+            </p:style>
+            <p:txBody>
+              <a:bodyPr rtlCol="0" anchor="ctr"/>
+              <a:lstStyle/>
+              <a:p>
+                <a:pPr algn="ctr"/>
+                <a:r>
+                  <a:rPr lang="pt-BR" dirty="0"/>
+                  <a:t>Thread 1 (Instância de </a:t>
+                </a:r>
+                <a:r>
+                  <a:rPr lang="pt-BR" dirty="0" err="1"/>
+                  <a:t>captureThread</a:t>
+                </a:r>
+                <a:r>
+                  <a:rPr lang="pt-BR" dirty="0"/>
+                  <a:t>)</a:t>
+                </a:r>
+              </a:p>
+            </p:txBody>
+          </p:sp>
+          <p:sp>
+            <p:nvSpPr>
+              <p:cNvPr id="9" name="Retângulo 8"/>
+              <p:cNvSpPr/>
+              <p:nvPr/>
+            </p:nvSpPr>
+            <p:spPr>
+              <a:xfrm>
+                <a:off x="5375563" y="2092034"/>
+                <a:ext cx="2798620" cy="817418"/>
+              </a:xfrm>
+              <a:prstGeom prst="rect">
+                <a:avLst/>
+              </a:prstGeom>
+            </p:spPr>
+            <p:style>
+              <a:lnRef idx="2">
+                <a:schemeClr val="dk1"/>
+              </a:lnRef>
+              <a:fillRef idx="1">
+                <a:schemeClr val="lt1"/>
+              </a:fillRef>
+              <a:effectRef idx="0">
+                <a:schemeClr val="dk1"/>
+              </a:effectRef>
+              <a:fontRef idx="minor">
+                <a:schemeClr val="dk1"/>
+              </a:fontRef>
+            </p:style>
+            <p:txBody>
+              <a:bodyPr rtlCol="0" anchor="ctr"/>
+              <a:lstStyle/>
+              <a:p>
+                <a:pPr algn="ctr"/>
+                <a:r>
+                  <a:rPr lang="pt-BR" dirty="0"/>
+                  <a:t>Thread 2 (Instância de </a:t>
+                </a:r>
+                <a:r>
+                  <a:rPr lang="pt-BR" dirty="0" err="1"/>
+                  <a:t>captureThread</a:t>
+                </a:r>
+                <a:r>
+                  <a:rPr lang="pt-BR" dirty="0"/>
+                  <a:t>)</a:t>
+                </a:r>
+              </a:p>
+            </p:txBody>
+          </p:sp>
+          <p:sp>
+            <p:nvSpPr>
+              <p:cNvPr id="11" name="Retângulo 10"/>
+              <p:cNvSpPr/>
+              <p:nvPr/>
+            </p:nvSpPr>
+            <p:spPr>
+              <a:xfrm>
+                <a:off x="2022764" y="4350326"/>
+                <a:ext cx="6151419" cy="817418"/>
+              </a:xfrm>
+              <a:prstGeom prst="rect">
+                <a:avLst/>
+              </a:prstGeom>
+            </p:spPr>
+            <p:style>
+              <a:lnRef idx="2">
+                <a:schemeClr val="dk1"/>
+              </a:lnRef>
+              <a:fillRef idx="1">
+                <a:schemeClr val="lt1"/>
+              </a:fillRef>
+              <a:effectRef idx="0">
+                <a:schemeClr val="dk1"/>
+              </a:effectRef>
+              <a:fontRef idx="minor">
+                <a:schemeClr val="dk1"/>
+              </a:fontRef>
+            </p:style>
+            <p:txBody>
+              <a:bodyPr rtlCol="0" anchor="ctr"/>
+              <a:lstStyle/>
+              <a:p>
+                <a:pPr algn="ctr"/>
+                <a:r>
+                  <a:rPr lang="pt-BR" dirty="0"/>
+                  <a:t>Programa principal (Inicializa as threads e envia os dados de cada thread para o computador)</a:t>
+                </a:r>
+              </a:p>
+            </p:txBody>
+          </p:sp>
+          <p:sp>
+            <p:nvSpPr>
+              <p:cNvPr id="12" name="Retângulo 11"/>
+              <p:cNvSpPr/>
+              <p:nvPr/>
+            </p:nvSpPr>
+            <p:spPr>
+              <a:xfrm>
+                <a:off x="6012873" y="3532908"/>
+                <a:ext cx="2161310" cy="817418"/>
+              </a:xfrm>
+              <a:prstGeom prst="rect">
+                <a:avLst/>
+              </a:prstGeom>
+            </p:spPr>
+            <p:style>
+              <a:lnRef idx="2">
+                <a:schemeClr val="dk1"/>
+              </a:lnRef>
+              <a:fillRef idx="1">
+                <a:schemeClr val="lt1"/>
+              </a:fillRef>
+              <a:effectRef idx="0">
+                <a:schemeClr val="dk1"/>
+              </a:effectRef>
+              <a:fontRef idx="minor">
+                <a:schemeClr val="dk1"/>
+              </a:fontRef>
+            </p:style>
+            <p:txBody>
+              <a:bodyPr rtlCol="0" anchor="ctr"/>
+              <a:lstStyle/>
+              <a:p>
+                <a:pPr algn="ctr"/>
+                <a:r>
+                  <a:rPr lang="pt-BR" dirty="0"/>
+                  <a:t>Thread N (Instância de </a:t>
+                </a:r>
+                <a:r>
+                  <a:rPr lang="pt-BR" dirty="0" err="1"/>
+                  <a:t>captureThread</a:t>
+                </a:r>
+                <a:r>
+                  <a:rPr lang="pt-BR" dirty="0"/>
+                  <a:t>)</a:t>
+                </a:r>
+              </a:p>
+            </p:txBody>
+          </p:sp>
+          <p:sp>
+            <p:nvSpPr>
+              <p:cNvPr id="13" name="CaixaDeTexto 12"/>
+              <p:cNvSpPr txBox="1"/>
+              <p:nvPr/>
+            </p:nvSpPr>
+            <p:spPr>
+              <a:xfrm>
+                <a:off x="6012873" y="3020291"/>
+                <a:ext cx="554182" cy="369332"/>
+              </a:xfrm>
+              <a:prstGeom prst="rect">
+                <a:avLst/>
+              </a:prstGeom>
+              <a:noFill/>
+            </p:spPr>
+            <p:txBody>
+              <a:bodyPr wrap="square" rtlCol="0">
+                <a:spAutoFit/>
+              </a:bodyPr>
+              <a:lstStyle/>
+              <a:p>
+                <a:r>
+                  <a:rPr lang="pt-BR" dirty="0"/>
+                  <a:t>...</a:t>
+                </a:r>
+              </a:p>
+            </p:txBody>
+          </p:sp>
+          <p:cxnSp>
+            <p:nvCxnSpPr>
+              <p:cNvPr id="15" name="Conector de Seta Reta 14"/>
+              <p:cNvCxnSpPr>
+                <a:cxnSpLocks/>
+              </p:cNvCxnSpPr>
+              <p:nvPr/>
+            </p:nvCxnSpPr>
+            <p:spPr>
+              <a:xfrm>
+                <a:off x="2022764" y="5167744"/>
+                <a:ext cx="6733309" cy="0"/>
+              </a:xfrm>
+              <a:prstGeom prst="straightConnector1">
+                <a:avLst/>
+              </a:prstGeom>
+              <a:ln>
+                <a:tailEnd type="triangle"/>
+              </a:ln>
+            </p:spPr>
+            <p:style>
+              <a:lnRef idx="1">
+                <a:schemeClr val="dk1"/>
+              </a:lnRef>
+              <a:fillRef idx="0">
+                <a:schemeClr val="dk1"/>
+              </a:fillRef>
+              <a:effectRef idx="0">
+                <a:schemeClr val="dk1"/>
+              </a:effectRef>
+              <a:fontRef idx="minor">
+                <a:schemeClr val="tx1"/>
+              </a:fontRef>
+            </p:style>
+          </p:cxnSp>
+          <p:cxnSp>
+            <p:nvCxnSpPr>
+              <p:cNvPr id="17" name="Conector de Seta Reta 16"/>
+              <p:cNvCxnSpPr/>
+              <p:nvPr/>
+            </p:nvCxnSpPr>
+            <p:spPr>
+              <a:xfrm flipV="1">
+                <a:off x="2022764" y="540327"/>
+                <a:ext cx="0" cy="4627417"/>
+              </a:xfrm>
+              <a:prstGeom prst="straightConnector1">
+                <a:avLst/>
+              </a:prstGeom>
+              <a:ln>
+                <a:tailEnd type="triangle"/>
+              </a:ln>
+            </p:spPr>
+            <p:style>
+              <a:lnRef idx="1">
+                <a:schemeClr val="dk1"/>
+              </a:lnRef>
+              <a:fillRef idx="0">
+                <a:schemeClr val="dk1"/>
+              </a:fillRef>
+              <a:effectRef idx="0">
+                <a:schemeClr val="dk1"/>
+              </a:effectRef>
+              <a:fontRef idx="minor">
+                <a:schemeClr val="tx1"/>
+              </a:fontRef>
+            </p:style>
+          </p:cxnSp>
+          <p:sp>
+            <p:nvSpPr>
+              <p:cNvPr id="18" name="Retângulo 17"/>
+              <p:cNvSpPr/>
+              <p:nvPr/>
+            </p:nvSpPr>
+            <p:spPr>
+              <a:xfrm>
+                <a:off x="2022764" y="540326"/>
+                <a:ext cx="933461" cy="369332"/>
+              </a:xfrm>
+              <a:prstGeom prst="rect">
+                <a:avLst/>
+              </a:prstGeom>
+            </p:spPr>
+            <p:txBody>
+              <a:bodyPr wrap="none">
+                <a:spAutoFit/>
+              </a:bodyPr>
+              <a:lstStyle/>
+              <a:p>
+                <a:r>
+                  <a:rPr lang="pt-BR" dirty="0"/>
+                  <a:t>Threads</a:t>
+                </a:r>
+                <a:endParaRPr lang="pt-BR" dirty="0"/>
+              </a:p>
+            </p:txBody>
+          </p:sp>
+          <p:sp>
+            <p:nvSpPr>
+              <p:cNvPr id="19" name="Retângulo 18"/>
+              <p:cNvSpPr/>
+              <p:nvPr/>
+            </p:nvSpPr>
+            <p:spPr>
+              <a:xfrm>
+                <a:off x="8055240" y="5126363"/>
+                <a:ext cx="819776" cy="369332"/>
+              </a:xfrm>
+              <a:prstGeom prst="rect">
+                <a:avLst/>
+              </a:prstGeom>
+            </p:spPr>
+            <p:txBody>
+              <a:bodyPr wrap="none">
+                <a:spAutoFit/>
+              </a:bodyPr>
+              <a:lstStyle/>
+              <a:p>
+                <a:r>
+                  <a:rPr lang="pt-BR" dirty="0"/>
+                  <a:t>Tempo</a:t>
+                </a:r>
+                <a:endParaRPr lang="pt-BR" dirty="0"/>
+              </a:p>
+            </p:txBody>
+          </p:sp>
+        </p:grpSp>
+        <p:sp>
+          <p:nvSpPr>
+            <p:cNvPr id="23" name="CaixaDeTexto 22"/>
+            <p:cNvSpPr txBox="1"/>
+            <p:nvPr/>
+          </p:nvSpPr>
+          <p:spPr>
+            <a:xfrm>
+              <a:off x="2230582" y="1828800"/>
+              <a:ext cx="1427018" cy="646331"/>
+            </a:xfrm>
+            <a:prstGeom prst="rect">
+              <a:avLst/>
+            </a:prstGeom>
+            <a:noFill/>
+          </p:spPr>
+          <p:txBody>
+            <a:bodyPr wrap="square" rtlCol="0">
+              <a:spAutoFit/>
+            </a:bodyPr>
+            <a:lstStyle/>
+            <a:p>
+              <a:r>
+                <a:rPr lang="pt-BR" dirty="0"/>
+                <a:t>Processo main.py</a:t>
+              </a:r>
+            </a:p>
+          </p:txBody>
+        </p:sp>
+      </p:grpSp>
+    </p:spTree>
+    <p:extLst>
+      <p:ext uri="{BB962C8B-B14F-4D97-AF65-F5344CB8AC3E}">
+        <p14:creationId xmlns:p14="http://schemas.microsoft.com/office/powerpoint/2010/main" val="237100617"/>
       </p:ext>
     </p:extLst>
   </p:cSld>

</xml_diff>

<commit_message>
adicionado os codigos e a monografia pronta
</commit_message>
<xml_diff>
--- a/Word/Figuras.pptx
+++ b/Word/Figuras.pptx
@@ -28,6 +28,10 @@
     <p:sldId id="276" r:id="rId22"/>
     <p:sldId id="277" r:id="rId23"/>
     <p:sldId id="278" r:id="rId24"/>
+    <p:sldId id="279" r:id="rId25"/>
+    <p:sldId id="280" r:id="rId26"/>
+    <p:sldId id="281" r:id="rId27"/>
+    <p:sldId id="282" r:id="rId28"/>
   </p:sldIdLst>
   <p:sldSz cx="12192000" cy="6858000"/>
   <p:notesSz cx="6858000" cy="9144000"/>
@@ -19128,7 +19132,6 @@
                   <a:rPr lang="pt-BR" dirty="0"/>
                   <a:t>Threads</a:t>
                 </a:r>
-                <a:endParaRPr lang="pt-BR" dirty="0"/>
               </a:p>
             </p:txBody>
           </p:sp>
@@ -19157,7 +19160,6 @@
                   <a:rPr lang="pt-BR" dirty="0"/>
                   <a:t>Tempo</a:t>
                 </a:r>
-                <a:endParaRPr lang="pt-BR" dirty="0"/>
               </a:p>
             </p:txBody>
           </p:sp>
@@ -19196,6 +19198,809 @@
     <p:extLst>
       <p:ext uri="{BB962C8B-B14F-4D97-AF65-F5344CB8AC3E}">
         <p14:creationId xmlns:p14="http://schemas.microsoft.com/office/powerpoint/2010/main" val="237100617"/>
+      </p:ext>
+    </p:extLst>
+  </p:cSld>
+  <p:clrMapOvr>
+    <a:masterClrMapping/>
+  </p:clrMapOvr>
+</p:sld>
+</file>
+
+<file path=ppt/slides/slide24.xml><?xml version="1.0" encoding="utf-8"?>
+<p:sld xmlns:a="http://schemas.openxmlformats.org/drawingml/2006/main" xmlns:r="http://schemas.openxmlformats.org/officeDocument/2006/relationships" xmlns:p="http://schemas.openxmlformats.org/presentationml/2006/main">
+  <p:cSld>
+    <p:spTree>
+      <p:nvGrpSpPr>
+        <p:cNvPr id="1" name=""/>
+        <p:cNvGrpSpPr/>
+        <p:nvPr/>
+      </p:nvGrpSpPr>
+      <p:grpSpPr>
+        <a:xfrm>
+          <a:off x="0" y="0"/>
+          <a:ext cx="0" cy="0"/>
+          <a:chOff x="0" y="0"/>
+          <a:chExt cx="0" cy="0"/>
+        </a:xfrm>
+      </p:grpSpPr>
+      <p:grpSp>
+        <p:nvGrpSpPr>
+          <p:cNvPr id="12" name="Agrupar 11"/>
+          <p:cNvGrpSpPr/>
+          <p:nvPr/>
+        </p:nvGrpSpPr>
+        <p:grpSpPr>
+          <a:xfrm>
+            <a:off x="2152357" y="548640"/>
+            <a:ext cx="6333392" cy="4487594"/>
+            <a:chOff x="2152357" y="548640"/>
+            <a:chExt cx="6333392" cy="4487594"/>
+          </a:xfrm>
+        </p:grpSpPr>
+        <p:pic>
+          <p:nvPicPr>
+            <p:cNvPr id="7" name="Imagem 6"/>
+            <p:cNvPicPr>
+              <a:picLocks noChangeAspect="1"/>
+            </p:cNvPicPr>
+            <p:nvPr/>
+          </p:nvPicPr>
+          <p:blipFill rotWithShape="1">
+            <a:blip r:embed="rId2">
+              <a:extLst>
+                <a:ext uri="{28A0092B-C50C-407E-A947-70E740481C1C}">
+                  <a14:useLocalDpi xmlns:a14="http://schemas.microsoft.com/office/drawing/2010/main" val="0"/>
+                </a:ext>
+              </a:extLst>
+            </a:blip>
+            <a:srcRect l="17654" t="7979" r="19000" b="12187"/>
+            <a:stretch/>
+          </p:blipFill>
+          <p:spPr>
+            <a:xfrm>
+              <a:off x="2152357" y="548640"/>
+              <a:ext cx="6333392" cy="4487594"/>
+            </a:xfrm>
+            <a:prstGeom prst="rect">
+              <a:avLst/>
+            </a:prstGeom>
+          </p:spPr>
+        </p:pic>
+        <p:cxnSp>
+          <p:nvCxnSpPr>
+            <p:cNvPr id="10" name="Conector de Seta Reta 9"/>
+            <p:cNvCxnSpPr>
+              <a:cxnSpLocks/>
+            </p:cNvCxnSpPr>
+            <p:nvPr/>
+          </p:nvCxnSpPr>
+          <p:spPr>
+            <a:xfrm flipH="1" flipV="1">
+              <a:off x="3245333" y="2686311"/>
+              <a:ext cx="1087004" cy="531673"/>
+            </a:xfrm>
+            <a:prstGeom prst="straightConnector1">
+              <a:avLst/>
+            </a:prstGeom>
+            <a:ln>
+              <a:solidFill>
+                <a:srgbClr val="FF0000"/>
+              </a:solidFill>
+              <a:tailEnd type="triangle"/>
+            </a:ln>
+          </p:spPr>
+          <p:style>
+            <a:lnRef idx="1">
+              <a:schemeClr val="accent1"/>
+            </a:lnRef>
+            <a:fillRef idx="0">
+              <a:schemeClr val="accent1"/>
+            </a:fillRef>
+            <a:effectRef idx="0">
+              <a:schemeClr val="accent1"/>
+            </a:effectRef>
+            <a:fontRef idx="minor">
+              <a:schemeClr val="tx1"/>
+            </a:fontRef>
+          </p:style>
+        </p:cxnSp>
+        <p:sp>
+          <p:nvSpPr>
+            <p:cNvPr id="11" name="CaixaDeTexto 10"/>
+            <p:cNvSpPr txBox="1"/>
+            <p:nvPr/>
+          </p:nvSpPr>
+          <p:spPr>
+            <a:xfrm>
+              <a:off x="4149457" y="3217984"/>
+              <a:ext cx="886777" cy="369332"/>
+            </a:xfrm>
+            <a:prstGeom prst="rect">
+              <a:avLst/>
+            </a:prstGeom>
+            <a:noFill/>
+          </p:spPr>
+          <p:txBody>
+            <a:bodyPr wrap="square" rtlCol="0">
+              <a:spAutoFit/>
+            </a:bodyPr>
+            <a:lstStyle/>
+            <a:p>
+              <a:r>
+                <a:rPr lang="pt-BR" dirty="0" err="1">
+                  <a:solidFill>
+                    <a:srgbClr val="FF0000"/>
+                  </a:solidFill>
+                </a:rPr>
+                <a:t>Flot</a:t>
+              </a:r>
+              <a:endParaRPr lang="pt-BR" dirty="0">
+                <a:solidFill>
+                  <a:srgbClr val="FF0000"/>
+                </a:solidFill>
+              </a:endParaRPr>
+            </a:p>
+          </p:txBody>
+        </p:sp>
+      </p:grpSp>
+    </p:spTree>
+    <p:extLst>
+      <p:ext uri="{BB962C8B-B14F-4D97-AF65-F5344CB8AC3E}">
+        <p14:creationId xmlns:p14="http://schemas.microsoft.com/office/powerpoint/2010/main" val="2128510319"/>
+      </p:ext>
+    </p:extLst>
+  </p:cSld>
+  <p:clrMapOvr>
+    <a:masterClrMapping/>
+  </p:clrMapOvr>
+</p:sld>
+</file>
+
+<file path=ppt/slides/slide25.xml><?xml version="1.0" encoding="utf-8"?>
+<p:sld xmlns:a="http://schemas.openxmlformats.org/drawingml/2006/main" xmlns:r="http://schemas.openxmlformats.org/officeDocument/2006/relationships" xmlns:p="http://schemas.openxmlformats.org/presentationml/2006/main">
+  <p:cSld>
+    <p:spTree>
+      <p:nvGrpSpPr>
+        <p:cNvPr id="1" name=""/>
+        <p:cNvGrpSpPr/>
+        <p:nvPr/>
+      </p:nvGrpSpPr>
+      <p:grpSpPr>
+        <a:xfrm>
+          <a:off x="0" y="0"/>
+          <a:ext cx="0" cy="0"/>
+          <a:chOff x="0" y="0"/>
+          <a:chExt cx="0" cy="0"/>
+        </a:xfrm>
+      </p:grpSpPr>
+      <p:pic>
+        <p:nvPicPr>
+          <p:cNvPr id="7" name="Imagem 6" descr="C:\Users\lucas\AppData\Local\Microsoft\Windows\INetCacheContent.Word\Seinodal 10k.png"/>
+          <p:cNvPicPr/>
+          <p:nvPr/>
+        </p:nvPicPr>
+        <p:blipFill rotWithShape="1">
+          <a:blip r:embed="rId2">
+            <a:extLst>
+              <a:ext uri="{28A0092B-C50C-407E-A947-70E740481C1C}">
+                <a14:useLocalDpi xmlns:a14="http://schemas.microsoft.com/office/drawing/2010/main" val="0"/>
+              </a:ext>
+            </a:extLst>
+          </a:blip>
+          <a:srcRect l="19199" t="9247" r="20354" b="35042"/>
+          <a:stretch/>
+        </p:blipFill>
+        <p:spPr bwMode="auto">
+          <a:xfrm>
+            <a:off x="290286" y="812800"/>
+            <a:ext cx="6096004" cy="3157874"/>
+          </a:xfrm>
+          <a:prstGeom prst="rect">
+            <a:avLst/>
+          </a:prstGeom>
+          <a:noFill/>
+          <a:ln>
+            <a:noFill/>
+          </a:ln>
+          <a:extLst>
+            <a:ext uri="{53640926-AAD7-44D8-BBD7-CCE9431645EC}">
+              <a14:shadowObscured xmlns:a14="http://schemas.microsoft.com/office/drawing/2010/main"/>
+            </a:ext>
+          </a:extLst>
+        </p:spPr>
+      </p:pic>
+      <p:pic>
+        <p:nvPicPr>
+          <p:cNvPr id="8" name="Imagem 7" descr="C:\Users\lucas\AppData\Local\Microsoft\Windows\INetCacheContent.Word\Seinodal 20k.png"/>
+          <p:cNvPicPr/>
+          <p:nvPr/>
+        </p:nvPicPr>
+        <p:blipFill rotWithShape="1">
+          <a:blip r:embed="rId3">
+            <a:extLst>
+              <a:ext uri="{28A0092B-C50C-407E-A947-70E740481C1C}">
+                <a14:useLocalDpi xmlns:a14="http://schemas.microsoft.com/office/drawing/2010/main" val="0"/>
+              </a:ext>
+            </a:extLst>
+          </a:blip>
+          <a:srcRect l="18934" t="9067" r="19165" b="34203"/>
+          <a:stretch/>
+        </p:blipFill>
+        <p:spPr bwMode="auto">
+          <a:xfrm>
+            <a:off x="6386290" y="812800"/>
+            <a:ext cx="6241143" cy="3157874"/>
+          </a:xfrm>
+          <a:prstGeom prst="rect">
+            <a:avLst/>
+          </a:prstGeom>
+          <a:noFill/>
+          <a:ln>
+            <a:noFill/>
+          </a:ln>
+          <a:extLst>
+            <a:ext uri="{53640926-AAD7-44D8-BBD7-CCE9431645EC}">
+              <a14:shadowObscured xmlns:a14="http://schemas.microsoft.com/office/drawing/2010/main"/>
+            </a:ext>
+          </a:extLst>
+        </p:spPr>
+      </p:pic>
+    </p:spTree>
+    <p:extLst>
+      <p:ext uri="{BB962C8B-B14F-4D97-AF65-F5344CB8AC3E}">
+        <p14:creationId xmlns:p14="http://schemas.microsoft.com/office/powerpoint/2010/main" val="1324840690"/>
+      </p:ext>
+    </p:extLst>
+  </p:cSld>
+  <p:clrMapOvr>
+    <a:masterClrMapping/>
+  </p:clrMapOvr>
+</p:sld>
+</file>
+
+<file path=ppt/slides/slide26.xml><?xml version="1.0" encoding="utf-8"?>
+<p:sld xmlns:a="http://schemas.openxmlformats.org/drawingml/2006/main" xmlns:r="http://schemas.openxmlformats.org/officeDocument/2006/relationships" xmlns:p="http://schemas.openxmlformats.org/presentationml/2006/main">
+  <p:cSld>
+    <p:spTree>
+      <p:nvGrpSpPr>
+        <p:cNvPr id="1" name=""/>
+        <p:cNvGrpSpPr/>
+        <p:nvPr/>
+      </p:nvGrpSpPr>
+      <p:grpSpPr>
+        <a:xfrm>
+          <a:off x="0" y="0"/>
+          <a:ext cx="0" cy="0"/>
+          <a:chOff x="0" y="0"/>
+          <a:chExt cx="0" cy="0"/>
+        </a:xfrm>
+      </p:grpSpPr>
+      <p:pic>
+        <p:nvPicPr>
+          <p:cNvPr id="1026" name="Picture 2" descr="http://elinux.org/images/9/91/4.5_serial_UARTs.PNG"/>
+          <p:cNvPicPr>
+            <a:picLocks noChangeAspect="1" noChangeArrowheads="1"/>
+          </p:cNvPicPr>
+          <p:nvPr/>
+        </p:nvPicPr>
+        <p:blipFill rotWithShape="1">
+          <a:blip r:embed="rId2">
+            <a:extLst>
+              <a:ext uri="{28A0092B-C50C-407E-A947-70E740481C1C}">
+                <a14:useLocalDpi xmlns:a14="http://schemas.microsoft.com/office/drawing/2010/main" val="0"/>
+              </a:ext>
+            </a:extLst>
+          </a:blip>
+          <a:srcRect t="11679" b="9420"/>
+          <a:stretch/>
+        </p:blipFill>
+        <p:spPr bwMode="auto">
+          <a:xfrm>
+            <a:off x="2747963" y="1582057"/>
+            <a:ext cx="6696075" cy="3802743"/>
+          </a:xfrm>
+          <a:prstGeom prst="rect">
+            <a:avLst/>
+          </a:prstGeom>
+          <a:noFill/>
+          <a:extLst>
+            <a:ext uri="{909E8E84-426E-40DD-AFC4-6F175D3DCCD1}">
+              <a14:hiddenFill xmlns:a14="http://schemas.microsoft.com/office/drawing/2010/main">
+                <a:solidFill>
+                  <a:srgbClr val="FFFFFF"/>
+                </a:solidFill>
+              </a14:hiddenFill>
+            </a:ext>
+          </a:extLst>
+        </p:spPr>
+      </p:pic>
+    </p:spTree>
+    <p:extLst>
+      <p:ext uri="{BB962C8B-B14F-4D97-AF65-F5344CB8AC3E}">
+        <p14:creationId xmlns:p14="http://schemas.microsoft.com/office/powerpoint/2010/main" val="3041638022"/>
+      </p:ext>
+    </p:extLst>
+  </p:cSld>
+  <p:clrMapOvr>
+    <a:masterClrMapping/>
+  </p:clrMapOvr>
+</p:sld>
+</file>
+
+<file path=ppt/slides/slide27.xml><?xml version="1.0" encoding="utf-8"?>
+<p:sld xmlns:a="http://schemas.openxmlformats.org/drawingml/2006/main" xmlns:r="http://schemas.openxmlformats.org/officeDocument/2006/relationships" xmlns:p="http://schemas.openxmlformats.org/presentationml/2006/main">
+  <p:cSld>
+    <p:spTree>
+      <p:nvGrpSpPr>
+        <p:cNvPr id="1" name=""/>
+        <p:cNvGrpSpPr/>
+        <p:nvPr/>
+      </p:nvGrpSpPr>
+      <p:grpSpPr>
+        <a:xfrm>
+          <a:off x="0" y="0"/>
+          <a:ext cx="0" cy="0"/>
+          <a:chOff x="0" y="0"/>
+          <a:chExt cx="0" cy="0"/>
+        </a:xfrm>
+      </p:grpSpPr>
+      <p:grpSp>
+        <p:nvGrpSpPr>
+          <p:cNvPr id="20" name="Agrupar 19"/>
+          <p:cNvGrpSpPr/>
+          <p:nvPr/>
+        </p:nvGrpSpPr>
+        <p:grpSpPr>
+          <a:xfrm>
+            <a:off x="333829" y="848442"/>
+            <a:ext cx="11226799" cy="1140015"/>
+            <a:chOff x="333829" y="848442"/>
+            <a:chExt cx="11226799" cy="1140015"/>
+          </a:xfrm>
+        </p:grpSpPr>
+        <p:sp>
+          <p:nvSpPr>
+            <p:cNvPr id="7" name="Retângulo 6"/>
+            <p:cNvSpPr/>
+            <p:nvPr/>
+          </p:nvSpPr>
+          <p:spPr>
+            <a:xfrm>
+              <a:off x="333829" y="1204686"/>
+              <a:ext cx="1335314" cy="783771"/>
+            </a:xfrm>
+            <a:prstGeom prst="rect">
+              <a:avLst/>
+            </a:prstGeom>
+          </p:spPr>
+          <p:style>
+            <a:lnRef idx="2">
+              <a:schemeClr val="accent1">
+                <a:shade val="50000"/>
+              </a:schemeClr>
+            </a:lnRef>
+            <a:fillRef idx="1">
+              <a:schemeClr val="accent1"/>
+            </a:fillRef>
+            <a:effectRef idx="0">
+              <a:schemeClr val="accent1"/>
+            </a:effectRef>
+            <a:fontRef idx="minor">
+              <a:schemeClr val="lt1"/>
+            </a:fontRef>
+          </p:style>
+          <p:txBody>
+            <a:bodyPr rtlCol="0" anchor="ctr"/>
+            <a:lstStyle/>
+            <a:p>
+              <a:pPr algn="ctr"/>
+              <a:r>
+                <a:rPr lang="pt-BR" dirty="0"/>
+                <a:t>Inicio</a:t>
+              </a:r>
+              <a:endParaRPr lang="pt-BR" dirty="0"/>
+            </a:p>
+          </p:txBody>
+        </p:sp>
+        <p:sp>
+          <p:nvSpPr>
+            <p:cNvPr id="8" name="Retângulo 7"/>
+            <p:cNvSpPr/>
+            <p:nvPr/>
+          </p:nvSpPr>
+          <p:spPr>
+            <a:xfrm>
+              <a:off x="1669143" y="1204686"/>
+              <a:ext cx="2162628" cy="783771"/>
+            </a:xfrm>
+            <a:prstGeom prst="rect">
+              <a:avLst/>
+            </a:prstGeom>
+          </p:spPr>
+          <p:style>
+            <a:lnRef idx="2">
+              <a:schemeClr val="accent2">
+                <a:shade val="50000"/>
+              </a:schemeClr>
+            </a:lnRef>
+            <a:fillRef idx="1">
+              <a:schemeClr val="accent2"/>
+            </a:fillRef>
+            <a:effectRef idx="0">
+              <a:schemeClr val="accent2"/>
+            </a:effectRef>
+            <a:fontRef idx="minor">
+              <a:schemeClr val="lt1"/>
+            </a:fontRef>
+          </p:style>
+          <p:txBody>
+            <a:bodyPr rtlCol="0" anchor="ctr"/>
+            <a:lstStyle/>
+            <a:p>
+              <a:pPr algn="ctr"/>
+              <a:r>
+                <a:rPr lang="pt-BR" dirty="0"/>
+                <a:t>Freq. de amostragem</a:t>
+              </a:r>
+              <a:endParaRPr lang="pt-BR" dirty="0"/>
+            </a:p>
+          </p:txBody>
+        </p:sp>
+        <p:sp>
+          <p:nvSpPr>
+            <p:cNvPr id="9" name="CaixaDeTexto 8"/>
+            <p:cNvSpPr txBox="1"/>
+            <p:nvPr/>
+          </p:nvSpPr>
+          <p:spPr>
+            <a:xfrm>
+              <a:off x="2387600" y="848445"/>
+              <a:ext cx="1233714" cy="369332"/>
+            </a:xfrm>
+            <a:prstGeom prst="rect">
+              <a:avLst/>
+            </a:prstGeom>
+            <a:noFill/>
+          </p:spPr>
+          <p:txBody>
+            <a:bodyPr wrap="square" rtlCol="0">
+              <a:spAutoFit/>
+            </a:bodyPr>
+            <a:lstStyle/>
+            <a:p>
+              <a:r>
+                <a:rPr lang="pt-BR" dirty="0"/>
+                <a:t>1 byte</a:t>
+              </a:r>
+            </a:p>
+          </p:txBody>
+        </p:sp>
+        <p:sp>
+          <p:nvSpPr>
+            <p:cNvPr id="10" name="CaixaDeTexto 9"/>
+            <p:cNvSpPr txBox="1"/>
+            <p:nvPr/>
+          </p:nvSpPr>
+          <p:spPr>
+            <a:xfrm>
+              <a:off x="10326914" y="848442"/>
+              <a:ext cx="1233714" cy="369332"/>
+            </a:xfrm>
+            <a:prstGeom prst="rect">
+              <a:avLst/>
+            </a:prstGeom>
+            <a:noFill/>
+          </p:spPr>
+          <p:txBody>
+            <a:bodyPr wrap="square" rtlCol="0">
+              <a:spAutoFit/>
+            </a:bodyPr>
+            <a:lstStyle/>
+            <a:p>
+              <a:r>
+                <a:rPr lang="pt-BR" dirty="0"/>
+                <a:t>1 byte</a:t>
+              </a:r>
+            </a:p>
+          </p:txBody>
+        </p:sp>
+        <p:sp>
+          <p:nvSpPr>
+            <p:cNvPr id="11" name="Retângulo 10"/>
+            <p:cNvSpPr/>
+            <p:nvPr/>
+          </p:nvSpPr>
+          <p:spPr>
+            <a:xfrm>
+              <a:off x="7249885" y="1204683"/>
+              <a:ext cx="2859315" cy="783771"/>
+            </a:xfrm>
+            <a:prstGeom prst="rect">
+              <a:avLst/>
+            </a:prstGeom>
+          </p:spPr>
+          <p:style>
+            <a:lnRef idx="2">
+              <a:schemeClr val="accent6">
+                <a:shade val="50000"/>
+              </a:schemeClr>
+            </a:lnRef>
+            <a:fillRef idx="1">
+              <a:schemeClr val="accent6"/>
+            </a:fillRef>
+            <a:effectRef idx="0">
+              <a:schemeClr val="accent6"/>
+            </a:effectRef>
+            <a:fontRef idx="minor">
+              <a:schemeClr val="lt1"/>
+            </a:fontRef>
+          </p:style>
+          <p:txBody>
+            <a:bodyPr rtlCol="0" anchor="ctr"/>
+            <a:lstStyle/>
+            <a:p>
+              <a:pPr algn="ctr"/>
+              <a:r>
+                <a:rPr lang="pt-BR" dirty="0"/>
+                <a:t>Dados</a:t>
+              </a:r>
+            </a:p>
+          </p:txBody>
+        </p:sp>
+        <p:sp>
+          <p:nvSpPr>
+            <p:cNvPr id="12" name="CaixaDeTexto 11"/>
+            <p:cNvSpPr txBox="1"/>
+            <p:nvPr/>
+          </p:nvSpPr>
+          <p:spPr>
+            <a:xfrm>
+              <a:off x="7619999" y="848442"/>
+              <a:ext cx="2119086" cy="369332"/>
+            </a:xfrm>
+            <a:prstGeom prst="rect">
+              <a:avLst/>
+            </a:prstGeom>
+            <a:noFill/>
+          </p:spPr>
+          <p:txBody>
+            <a:bodyPr wrap="square" rtlCol="0">
+              <a:spAutoFit/>
+            </a:bodyPr>
+            <a:lstStyle/>
+            <a:p>
+              <a:r>
+                <a:rPr lang="pt-BR" dirty="0"/>
+                <a:t>2 bytes por amostra</a:t>
+              </a:r>
+            </a:p>
+          </p:txBody>
+        </p:sp>
+        <p:sp>
+          <p:nvSpPr>
+            <p:cNvPr id="13" name="Retângulo 12"/>
+            <p:cNvSpPr/>
+            <p:nvPr/>
+          </p:nvSpPr>
+          <p:spPr>
+            <a:xfrm>
+              <a:off x="3791857" y="1204685"/>
+              <a:ext cx="2162628" cy="783771"/>
+            </a:xfrm>
+            <a:prstGeom prst="rect">
+              <a:avLst/>
+            </a:prstGeom>
+          </p:spPr>
+          <p:style>
+            <a:lnRef idx="2">
+              <a:schemeClr val="accent4">
+                <a:shade val="50000"/>
+              </a:schemeClr>
+            </a:lnRef>
+            <a:fillRef idx="1">
+              <a:schemeClr val="accent4"/>
+            </a:fillRef>
+            <a:effectRef idx="0">
+              <a:schemeClr val="accent4"/>
+            </a:effectRef>
+            <a:fontRef idx="minor">
+              <a:schemeClr val="lt1"/>
+            </a:fontRef>
+          </p:style>
+          <p:txBody>
+            <a:bodyPr rtlCol="0" anchor="ctr"/>
+            <a:lstStyle/>
+            <a:p>
+              <a:pPr algn="ctr"/>
+              <a:r>
+                <a:rPr lang="pt-BR" dirty="0"/>
+                <a:t>No. de amostras</a:t>
+              </a:r>
+              <a:endParaRPr lang="pt-BR" dirty="0"/>
+            </a:p>
+          </p:txBody>
+        </p:sp>
+        <p:sp>
+          <p:nvSpPr>
+            <p:cNvPr id="14" name="CaixaDeTexto 13"/>
+            <p:cNvSpPr txBox="1"/>
+            <p:nvPr/>
+          </p:nvSpPr>
+          <p:spPr>
+            <a:xfrm>
+              <a:off x="4256314" y="848444"/>
+              <a:ext cx="1233714" cy="369332"/>
+            </a:xfrm>
+            <a:prstGeom prst="rect">
+              <a:avLst/>
+            </a:prstGeom>
+            <a:noFill/>
+          </p:spPr>
+          <p:txBody>
+            <a:bodyPr wrap="square" rtlCol="0">
+              <a:spAutoFit/>
+            </a:bodyPr>
+            <a:lstStyle/>
+            <a:p>
+              <a:r>
+                <a:rPr lang="pt-BR" dirty="0"/>
+                <a:t>2 bytes</a:t>
+              </a:r>
+            </a:p>
+          </p:txBody>
+        </p:sp>
+        <p:sp>
+          <p:nvSpPr>
+            <p:cNvPr id="15" name="Retângulo 14"/>
+            <p:cNvSpPr/>
+            <p:nvPr/>
+          </p:nvSpPr>
+          <p:spPr>
+            <a:xfrm>
+              <a:off x="10109199" y="1204682"/>
+              <a:ext cx="1335314" cy="783771"/>
+            </a:xfrm>
+            <a:prstGeom prst="rect">
+              <a:avLst/>
+            </a:prstGeom>
+          </p:spPr>
+          <p:style>
+            <a:lnRef idx="2">
+              <a:schemeClr val="accent3">
+                <a:shade val="50000"/>
+              </a:schemeClr>
+            </a:lnRef>
+            <a:fillRef idx="1">
+              <a:schemeClr val="accent3"/>
+            </a:fillRef>
+            <a:effectRef idx="0">
+              <a:schemeClr val="accent3"/>
+            </a:effectRef>
+            <a:fontRef idx="minor">
+              <a:schemeClr val="lt1"/>
+            </a:fontRef>
+          </p:style>
+          <p:txBody>
+            <a:bodyPr rtlCol="0" anchor="ctr"/>
+            <a:lstStyle/>
+            <a:p>
+              <a:pPr algn="ctr"/>
+              <a:r>
+                <a:rPr lang="pt-BR" dirty="0"/>
+                <a:t>Fim</a:t>
+              </a:r>
+              <a:endParaRPr lang="pt-BR" dirty="0"/>
+            </a:p>
+          </p:txBody>
+        </p:sp>
+        <p:sp>
+          <p:nvSpPr>
+            <p:cNvPr id="16" name="CaixaDeTexto 15"/>
+            <p:cNvSpPr txBox="1"/>
+            <p:nvPr/>
+          </p:nvSpPr>
+          <p:spPr>
+            <a:xfrm>
+              <a:off x="540658" y="848445"/>
+              <a:ext cx="1233714" cy="369332"/>
+            </a:xfrm>
+            <a:prstGeom prst="rect">
+              <a:avLst/>
+            </a:prstGeom>
+            <a:noFill/>
+          </p:spPr>
+          <p:txBody>
+            <a:bodyPr wrap="square" rtlCol="0">
+              <a:spAutoFit/>
+            </a:bodyPr>
+            <a:lstStyle/>
+            <a:p>
+              <a:r>
+                <a:rPr lang="pt-BR" dirty="0"/>
+                <a:t>1 byte</a:t>
+              </a:r>
+            </a:p>
+          </p:txBody>
+        </p:sp>
+        <p:sp>
+          <p:nvSpPr>
+            <p:cNvPr id="18" name="Retângulo 17"/>
+            <p:cNvSpPr/>
+            <p:nvPr/>
+          </p:nvSpPr>
+          <p:spPr>
+            <a:xfrm>
+              <a:off x="5914571" y="1204684"/>
+              <a:ext cx="1335314" cy="783771"/>
+            </a:xfrm>
+            <a:prstGeom prst="rect">
+              <a:avLst/>
+            </a:prstGeom>
+          </p:spPr>
+          <p:style>
+            <a:lnRef idx="2">
+              <a:schemeClr val="dk1">
+                <a:shade val="50000"/>
+              </a:schemeClr>
+            </a:lnRef>
+            <a:fillRef idx="1">
+              <a:schemeClr val="dk1"/>
+            </a:fillRef>
+            <a:effectRef idx="0">
+              <a:schemeClr val="dk1"/>
+            </a:effectRef>
+            <a:fontRef idx="minor">
+              <a:schemeClr val="lt1"/>
+            </a:fontRef>
+          </p:style>
+          <p:txBody>
+            <a:bodyPr rtlCol="0" anchor="ctr"/>
+            <a:lstStyle/>
+            <a:p>
+              <a:pPr algn="ctr"/>
+              <a:r>
+                <a:rPr lang="pt-BR" dirty="0"/>
+                <a:t>Fim cabeçalho</a:t>
+              </a:r>
+              <a:endParaRPr lang="pt-BR" dirty="0"/>
+            </a:p>
+          </p:txBody>
+        </p:sp>
+        <p:sp>
+          <p:nvSpPr>
+            <p:cNvPr id="19" name="CaixaDeTexto 18"/>
+            <p:cNvSpPr txBox="1"/>
+            <p:nvPr/>
+          </p:nvSpPr>
+          <p:spPr>
+            <a:xfrm>
+              <a:off x="6056085" y="852462"/>
+              <a:ext cx="1233714" cy="369332"/>
+            </a:xfrm>
+            <a:prstGeom prst="rect">
+              <a:avLst/>
+            </a:prstGeom>
+            <a:noFill/>
+          </p:spPr>
+          <p:txBody>
+            <a:bodyPr wrap="square" rtlCol="0">
+              <a:spAutoFit/>
+            </a:bodyPr>
+            <a:lstStyle/>
+            <a:p>
+              <a:r>
+                <a:rPr lang="pt-BR" dirty="0"/>
+                <a:t>1 byte</a:t>
+              </a:r>
+            </a:p>
+          </p:txBody>
+        </p:sp>
+      </p:grpSp>
+    </p:spTree>
+    <p:extLst>
+      <p:ext uri="{BB962C8B-B14F-4D97-AF65-F5344CB8AC3E}">
+        <p14:creationId xmlns:p14="http://schemas.microsoft.com/office/powerpoint/2010/main" val="3607974182"/>
       </p:ext>
     </p:extLst>
   </p:cSld>

</xml_diff>

<commit_message>
Removido um slide adicionado novas coisas em outro slides e melhoria de design
</commit_message>
<xml_diff>
--- a/Word/Figuras.pptx
+++ b/Word/Figuras.pptx
@@ -39,6 +39,7 @@
     <p:sldId id="287" r:id="rId33"/>
     <p:sldId id="288" r:id="rId34"/>
     <p:sldId id="289" r:id="rId35"/>
+    <p:sldId id="290" r:id="rId36"/>
   </p:sldIdLst>
   <p:sldSz cx="12192000" cy="6858000"/>
   <p:notesSz cx="6858000" cy="9144000"/>
@@ -13178,7 +13179,7 @@
           <a:p>
             <a:fld id="{54B95968-CED5-447B-ADA8-EFE194C8B328}" type="datetimeFigureOut">
               <a:rPr lang="pt-BR" smtClean="0"/>
-              <a:t>01/12/2016</a:t>
+              <a:t>03/12/2016</a:t>
             </a:fld>
             <a:endParaRPr lang="pt-BR"/>
           </a:p>
@@ -13346,7 +13347,7 @@
           <a:p>
             <a:fld id="{54B95968-CED5-447B-ADA8-EFE194C8B328}" type="datetimeFigureOut">
               <a:rPr lang="pt-BR" smtClean="0"/>
-              <a:t>01/12/2016</a:t>
+              <a:t>03/12/2016</a:t>
             </a:fld>
             <a:endParaRPr lang="pt-BR"/>
           </a:p>
@@ -13524,7 +13525,7 @@
           <a:p>
             <a:fld id="{54B95968-CED5-447B-ADA8-EFE194C8B328}" type="datetimeFigureOut">
               <a:rPr lang="pt-BR" smtClean="0"/>
-              <a:t>01/12/2016</a:t>
+              <a:t>03/12/2016</a:t>
             </a:fld>
             <a:endParaRPr lang="pt-BR"/>
           </a:p>
@@ -13692,7 +13693,7 @@
           <a:p>
             <a:fld id="{54B95968-CED5-447B-ADA8-EFE194C8B328}" type="datetimeFigureOut">
               <a:rPr lang="pt-BR" smtClean="0"/>
-              <a:t>01/12/2016</a:t>
+              <a:t>03/12/2016</a:t>
             </a:fld>
             <a:endParaRPr lang="pt-BR"/>
           </a:p>
@@ -13937,7 +13938,7 @@
           <a:p>
             <a:fld id="{54B95968-CED5-447B-ADA8-EFE194C8B328}" type="datetimeFigureOut">
               <a:rPr lang="pt-BR" smtClean="0"/>
-              <a:t>01/12/2016</a:t>
+              <a:t>03/12/2016</a:t>
             </a:fld>
             <a:endParaRPr lang="pt-BR"/>
           </a:p>
@@ -14166,7 +14167,7 @@
           <a:p>
             <a:fld id="{54B95968-CED5-447B-ADA8-EFE194C8B328}" type="datetimeFigureOut">
               <a:rPr lang="pt-BR" smtClean="0"/>
-              <a:t>01/12/2016</a:t>
+              <a:t>03/12/2016</a:t>
             </a:fld>
             <a:endParaRPr lang="pt-BR"/>
           </a:p>
@@ -14530,7 +14531,7 @@
           <a:p>
             <a:fld id="{54B95968-CED5-447B-ADA8-EFE194C8B328}" type="datetimeFigureOut">
               <a:rPr lang="pt-BR" smtClean="0"/>
-              <a:t>01/12/2016</a:t>
+              <a:t>03/12/2016</a:t>
             </a:fld>
             <a:endParaRPr lang="pt-BR"/>
           </a:p>
@@ -14647,7 +14648,7 @@
           <a:p>
             <a:fld id="{54B95968-CED5-447B-ADA8-EFE194C8B328}" type="datetimeFigureOut">
               <a:rPr lang="pt-BR" smtClean="0"/>
-              <a:t>01/12/2016</a:t>
+              <a:t>03/12/2016</a:t>
             </a:fld>
             <a:endParaRPr lang="pt-BR"/>
           </a:p>
@@ -14742,7 +14743,7 @@
           <a:p>
             <a:fld id="{54B95968-CED5-447B-ADA8-EFE194C8B328}" type="datetimeFigureOut">
               <a:rPr lang="pt-BR" smtClean="0"/>
-              <a:t>01/12/2016</a:t>
+              <a:t>03/12/2016</a:t>
             </a:fld>
             <a:endParaRPr lang="pt-BR"/>
           </a:p>
@@ -15017,7 +15018,7 @@
           <a:p>
             <a:fld id="{54B95968-CED5-447B-ADA8-EFE194C8B328}" type="datetimeFigureOut">
               <a:rPr lang="pt-BR" smtClean="0"/>
-              <a:t>01/12/2016</a:t>
+              <a:t>03/12/2016</a:t>
             </a:fld>
             <a:endParaRPr lang="pt-BR"/>
           </a:p>
@@ -15269,7 +15270,7 @@
           <a:p>
             <a:fld id="{54B95968-CED5-447B-ADA8-EFE194C8B328}" type="datetimeFigureOut">
               <a:rPr lang="pt-BR" smtClean="0"/>
-              <a:t>01/12/2016</a:t>
+              <a:t>03/12/2016</a:t>
             </a:fld>
             <a:endParaRPr lang="pt-BR"/>
           </a:p>
@@ -15480,7 +15481,7 @@
           <a:p>
             <a:fld id="{54B95968-CED5-447B-ADA8-EFE194C8B328}" type="datetimeFigureOut">
               <a:rPr lang="pt-BR" smtClean="0"/>
-              <a:t>01/12/2016</a:t>
+              <a:t>03/12/2016</a:t>
             </a:fld>
             <a:endParaRPr lang="pt-BR"/>
           </a:p>
@@ -24307,8 +24308,8 @@
             </a:fontRef>
           </p:style>
         </p:cxnSp>
-        <mc:AlternateContent xmlns:mc="http://schemas.openxmlformats.org/markup-compatibility/2006">
-          <mc:Choice xmlns:a14="http://schemas.microsoft.com/office/drawing/2010/main" Requires="a14">
+        <mc:AlternateContent xmlns:mc="http://schemas.openxmlformats.org/markup-compatibility/2006" xmlns:a14="http://schemas.microsoft.com/office/drawing/2010/main">
+          <mc:Choice Requires="a14">
             <p:sp>
               <p:nvSpPr>
                 <p:cNvPr id="37" name="CaixaDeTexto 36"/>
@@ -24335,6 +24336,7 @@
                 </a:bodyPr>
                 <a:lstStyle/>
                 <a:p>
+                  <a:pPr/>
                   <a14:m>
                     <m:oMathPara xmlns:m="http://schemas.openxmlformats.org/officeDocument/2006/math">
                       <m:oMathParaPr>
@@ -24355,7 +24357,7 @@
               </p:txBody>
             </p:sp>
           </mc:Choice>
-          <mc:Fallback>
+          <mc:Fallback xmlns="">
             <p:sp>
               <p:nvSpPr>
                 <p:cNvPr id="37" name="CaixaDeTexto 36"/>
@@ -25031,7 +25033,6 @@
               <a:rPr lang="pt-BR" dirty="0"/>
               <a:t>8x</a:t>
             </a:r>
-            <a:endParaRPr lang="pt-BR" dirty="0"/>
           </a:p>
         </p:txBody>
       </p:sp>
@@ -25060,7 +25061,6 @@
               <a:rPr lang="pt-BR" dirty="0"/>
               <a:t>8x</a:t>
             </a:r>
-            <a:endParaRPr lang="pt-BR" dirty="0"/>
           </a:p>
         </p:txBody>
       </p:sp>
@@ -25093,11 +25093,6 @@
               </a:rPr>
               <a:t>ADC08200</a:t>
             </a:r>
-            <a:endParaRPr lang="pt-BR" dirty="0">
-              <a:solidFill>
-                <a:schemeClr val="bg1"/>
-              </a:solidFill>
-            </a:endParaRPr>
           </a:p>
         </p:txBody>
       </p:sp>
@@ -25194,7 +25189,6 @@
               <a:rPr lang="pt-BR" dirty="0"/>
               <a:t>Buffer 1x</a:t>
             </a:r>
-            <a:endParaRPr lang="pt-BR" dirty="0"/>
           </a:p>
         </p:txBody>
       </p:sp>
@@ -25281,11 +25275,6 @@
                 </a:rPr>
                 <a:t>MC74VHC1GT50</a:t>
               </a:r>
-              <a:endParaRPr lang="pt-BR" dirty="0">
-                <a:solidFill>
-                  <a:schemeClr val="bg1"/>
-                </a:solidFill>
-              </a:endParaRPr>
             </a:p>
           </p:txBody>
         </p:sp>
@@ -27076,7 +27065,6 @@
                 <a:rPr lang="pt-BR" dirty="0"/>
                 <a:t>SAR 10 BITS</a:t>
               </a:r>
-              <a:endParaRPr lang="pt-BR" dirty="0"/>
             </a:p>
           </p:txBody>
         </p:sp>
@@ -28978,7 +28966,6 @@
                   <a:rPr lang="pt-BR" dirty="0"/>
                   <a:t>SAR 10 BITS</a:t>
                 </a:r>
-                <a:endParaRPr lang="pt-BR" dirty="0"/>
               </a:p>
             </p:txBody>
           </p:sp>
@@ -30773,7 +30760,6 @@
                     <a:rPr lang="pt-BR" dirty="0"/>
                     <a:t>12 bits</a:t>
                   </a:r>
-                  <a:endParaRPr lang="pt-BR" dirty="0"/>
                 </a:p>
               </p:txBody>
             </p:sp>
@@ -31577,325 +31563,503 @@
           <a:chExt cx="0" cy="0"/>
         </a:xfrm>
       </p:grpSpPr>
-      <p:sp>
-        <p:nvSpPr>
-          <p:cNvPr id="7" name="Retângulo 6"/>
-          <p:cNvSpPr/>
+      <p:grpSp>
+        <p:nvGrpSpPr>
+          <p:cNvPr id="33" name="Agrupar 32"/>
+          <p:cNvGrpSpPr/>
           <p:nvPr/>
-        </p:nvSpPr>
-        <p:spPr>
+        </p:nvGrpSpPr>
+        <p:grpSpPr>
           <a:xfrm>
-            <a:off x="6444343" y="2844800"/>
-            <a:ext cx="1741714" cy="464457"/>
+            <a:off x="5776686" y="1607127"/>
+            <a:ext cx="3062514" cy="2327564"/>
+            <a:chOff x="5776686" y="1607127"/>
+            <a:chExt cx="3062514" cy="2327564"/>
           </a:xfrm>
-          <a:prstGeom prst="rect">
-            <a:avLst/>
-          </a:prstGeom>
-        </p:spPr>
-        <p:style>
-          <a:lnRef idx="2">
-            <a:schemeClr val="accent1">
-              <a:shade val="50000"/>
-            </a:schemeClr>
-          </a:lnRef>
-          <a:fillRef idx="1">
-            <a:schemeClr val="accent1"/>
-          </a:fillRef>
-          <a:effectRef idx="0">
-            <a:schemeClr val="accent1"/>
-          </a:effectRef>
-          <a:fontRef idx="minor">
-            <a:schemeClr val="lt1"/>
-          </a:fontRef>
-        </p:style>
-        <p:txBody>
-          <a:bodyPr rtlCol="0" anchor="ctr"/>
-          <a:lstStyle/>
-          <a:p>
-            <a:pPr algn="ctr"/>
-            <a:r>
-              <a:rPr lang="pt-BR" dirty="0"/>
-              <a:t>HUB USB</a:t>
-            </a:r>
-          </a:p>
-        </p:txBody>
-      </p:sp>
-      <p:sp>
-        <p:nvSpPr>
-          <p:cNvPr id="8" name="Retângulo 7"/>
-          <p:cNvSpPr/>
-          <p:nvPr/>
-        </p:nvSpPr>
-        <p:spPr>
-          <a:xfrm>
-            <a:off x="6444343" y="2264230"/>
-            <a:ext cx="1741713" cy="406400"/>
-          </a:xfrm>
-          <a:prstGeom prst="rect">
-            <a:avLst/>
-          </a:prstGeom>
-        </p:spPr>
-        <p:style>
-          <a:lnRef idx="2">
-            <a:schemeClr val="accent1">
-              <a:shade val="50000"/>
-            </a:schemeClr>
-          </a:lnRef>
-          <a:fillRef idx="1">
-            <a:schemeClr val="accent1"/>
-          </a:fillRef>
-          <a:effectRef idx="0">
-            <a:schemeClr val="accent1"/>
-          </a:effectRef>
-          <a:fontRef idx="minor">
-            <a:schemeClr val="lt1"/>
-          </a:fontRef>
-        </p:style>
-        <p:txBody>
-          <a:bodyPr rtlCol="0" anchor="ctr"/>
-          <a:lstStyle/>
-          <a:p>
-            <a:pPr algn="ctr"/>
-            <a:r>
-              <a:rPr lang="pt-BR" dirty="0"/>
-              <a:t>PC</a:t>
-            </a:r>
-          </a:p>
-        </p:txBody>
-      </p:sp>
-      <p:sp>
-        <p:nvSpPr>
-          <p:cNvPr id="9" name="Retângulo 8"/>
-          <p:cNvSpPr/>
-          <p:nvPr/>
-        </p:nvSpPr>
-        <p:spPr>
-          <a:xfrm>
-            <a:off x="5979885" y="3483427"/>
-            <a:ext cx="1219201" cy="348342"/>
-          </a:xfrm>
-          <a:prstGeom prst="rect">
-            <a:avLst/>
-          </a:prstGeom>
-        </p:spPr>
-        <p:style>
-          <a:lnRef idx="2">
-            <a:schemeClr val="accent1">
-              <a:shade val="50000"/>
-            </a:schemeClr>
-          </a:lnRef>
-          <a:fillRef idx="1">
-            <a:schemeClr val="accent1"/>
-          </a:fillRef>
-          <a:effectRef idx="0">
-            <a:schemeClr val="accent1"/>
-          </a:effectRef>
-          <a:fontRef idx="minor">
-            <a:schemeClr val="lt1"/>
-          </a:fontRef>
-        </p:style>
-        <p:txBody>
-          <a:bodyPr rtlCol="0" anchor="ctr"/>
-          <a:lstStyle/>
-          <a:p>
-            <a:pPr algn="ctr"/>
-            <a:r>
-              <a:rPr lang="pt-BR" dirty="0"/>
-              <a:t>BBB1</a:t>
-            </a:r>
-          </a:p>
-        </p:txBody>
-      </p:sp>
-      <p:sp>
-        <p:nvSpPr>
-          <p:cNvPr id="10" name="Retângulo 9"/>
-          <p:cNvSpPr/>
-          <p:nvPr/>
-        </p:nvSpPr>
-        <p:spPr>
-          <a:xfrm>
-            <a:off x="7424057" y="3483427"/>
-            <a:ext cx="1219201" cy="348342"/>
-          </a:xfrm>
-          <a:prstGeom prst="rect">
-            <a:avLst/>
-          </a:prstGeom>
-        </p:spPr>
-        <p:style>
-          <a:lnRef idx="2">
-            <a:schemeClr val="accent1">
-              <a:shade val="50000"/>
-            </a:schemeClr>
-          </a:lnRef>
-          <a:fillRef idx="1">
-            <a:schemeClr val="accent1"/>
-          </a:fillRef>
-          <a:effectRef idx="0">
-            <a:schemeClr val="accent1"/>
-          </a:effectRef>
-          <a:fontRef idx="minor">
-            <a:schemeClr val="lt1"/>
-          </a:fontRef>
-        </p:style>
-        <p:txBody>
-          <a:bodyPr rtlCol="0" anchor="ctr"/>
-          <a:lstStyle/>
-          <a:p>
-            <a:pPr algn="ctr"/>
-            <a:r>
-              <a:rPr lang="pt-BR" dirty="0"/>
-              <a:t>BBB2</a:t>
-            </a:r>
-          </a:p>
-        </p:txBody>
-      </p:sp>
-      <p:cxnSp>
-        <p:nvCxnSpPr>
-          <p:cNvPr id="15" name="Conector de Seta Reta 14"/>
-          <p:cNvCxnSpPr>
-            <a:stCxn id="9" idx="0"/>
-          </p:cNvCxnSpPr>
-          <p:nvPr/>
-        </p:nvCxnSpPr>
-        <p:spPr>
-          <a:xfrm flipH="1" flipV="1">
-            <a:off x="6589485" y="3309257"/>
-            <a:ext cx="1" cy="174170"/>
-          </a:xfrm>
-          <a:prstGeom prst="straightConnector1">
-            <a:avLst/>
-          </a:prstGeom>
-          <a:ln>
-            <a:tailEnd type="triangle"/>
-          </a:ln>
-        </p:spPr>
-        <p:style>
-          <a:lnRef idx="1">
-            <a:schemeClr val="accent1"/>
-          </a:lnRef>
-          <a:fillRef idx="0">
-            <a:schemeClr val="accent1"/>
-          </a:fillRef>
-          <a:effectRef idx="0">
-            <a:schemeClr val="accent1"/>
-          </a:effectRef>
-          <a:fontRef idx="minor">
-            <a:schemeClr val="tx1"/>
-          </a:fontRef>
-        </p:style>
-      </p:cxnSp>
-      <p:cxnSp>
-        <p:nvCxnSpPr>
-          <p:cNvPr id="17" name="Conector de Seta Reta 16"/>
-          <p:cNvCxnSpPr>
-            <a:stCxn id="10" idx="0"/>
-          </p:cNvCxnSpPr>
-          <p:nvPr/>
-        </p:nvCxnSpPr>
-        <p:spPr>
-          <a:xfrm flipH="1" flipV="1">
-            <a:off x="8033657" y="3309257"/>
-            <a:ext cx="1" cy="174170"/>
-          </a:xfrm>
-          <a:prstGeom prst="straightConnector1">
-            <a:avLst/>
-          </a:prstGeom>
-          <a:ln>
-            <a:tailEnd type="triangle"/>
-          </a:ln>
-        </p:spPr>
-        <p:style>
-          <a:lnRef idx="1">
-            <a:schemeClr val="accent1"/>
-          </a:lnRef>
-          <a:fillRef idx="0">
-            <a:schemeClr val="accent1"/>
-          </a:fillRef>
-          <a:effectRef idx="0">
-            <a:schemeClr val="accent1"/>
-          </a:effectRef>
-          <a:fontRef idx="minor">
-            <a:schemeClr val="tx1"/>
-          </a:fontRef>
-        </p:style>
-      </p:cxnSp>
-      <p:cxnSp>
-        <p:nvCxnSpPr>
-          <p:cNvPr id="19" name="Conector de Seta Reta 18"/>
-          <p:cNvCxnSpPr>
-            <a:stCxn id="7" idx="0"/>
-            <a:endCxn id="8" idx="2"/>
-          </p:cNvCxnSpPr>
-          <p:nvPr/>
-        </p:nvCxnSpPr>
-        <p:spPr>
-          <a:xfrm flipV="1">
-            <a:off x="7315200" y="2670630"/>
-            <a:ext cx="0" cy="174170"/>
-          </a:xfrm>
-          <a:prstGeom prst="straightConnector1">
-            <a:avLst/>
-          </a:prstGeom>
-          <a:ln>
-            <a:tailEnd type="triangle"/>
-          </a:ln>
-        </p:spPr>
-        <p:style>
-          <a:lnRef idx="1">
-            <a:schemeClr val="accent1"/>
-          </a:lnRef>
-          <a:fillRef idx="0">
-            <a:schemeClr val="accent1"/>
-          </a:fillRef>
-          <a:effectRef idx="0">
-            <a:schemeClr val="accent1"/>
-          </a:effectRef>
-          <a:fontRef idx="minor">
-            <a:schemeClr val="tx1"/>
-          </a:fontRef>
-        </p:style>
-      </p:cxnSp>
-      <p:sp>
-        <p:nvSpPr>
-          <p:cNvPr id="20" name="Retângulo 19"/>
-          <p:cNvSpPr/>
-          <p:nvPr/>
-        </p:nvSpPr>
-        <p:spPr>
-          <a:xfrm>
-            <a:off x="5776686" y="2075542"/>
-            <a:ext cx="3062514" cy="2177143"/>
-          </a:xfrm>
-          <a:prstGeom prst="rect">
-            <a:avLst/>
-          </a:prstGeom>
-          <a:noFill/>
-        </p:spPr>
-        <p:style>
-          <a:lnRef idx="2">
-            <a:schemeClr val="accent1">
-              <a:shade val="50000"/>
-            </a:schemeClr>
-          </a:lnRef>
-          <a:fillRef idx="1">
-            <a:schemeClr val="accent1"/>
-          </a:fillRef>
-          <a:effectRef idx="0">
-            <a:schemeClr val="accent1"/>
-          </a:effectRef>
-          <a:fontRef idx="minor">
-            <a:schemeClr val="lt1"/>
-          </a:fontRef>
-        </p:style>
-        <p:txBody>
-          <a:bodyPr rtlCol="0" anchor="ctr"/>
-          <a:lstStyle/>
-          <a:p>
-            <a:pPr algn="ctr"/>
-            <a:endParaRPr lang="pt-BR"/>
-          </a:p>
-        </p:txBody>
-      </p:sp>
+        </p:grpSpPr>
+        <p:sp>
+          <p:nvSpPr>
+            <p:cNvPr id="7" name="Retângulo 6"/>
+            <p:cNvSpPr/>
+            <p:nvPr/>
+          </p:nvSpPr>
+          <p:spPr>
+            <a:xfrm>
+              <a:off x="6961576" y="2366487"/>
+              <a:ext cx="692729" cy="464457"/>
+            </a:xfrm>
+            <a:prstGeom prst="rect">
+              <a:avLst/>
+            </a:prstGeom>
+          </p:spPr>
+          <p:style>
+            <a:lnRef idx="2">
+              <a:schemeClr val="accent1">
+                <a:shade val="50000"/>
+              </a:schemeClr>
+            </a:lnRef>
+            <a:fillRef idx="1">
+              <a:schemeClr val="accent1"/>
+            </a:fillRef>
+            <a:effectRef idx="0">
+              <a:schemeClr val="accent1"/>
+            </a:effectRef>
+            <a:fontRef idx="minor">
+              <a:schemeClr val="lt1"/>
+            </a:fontRef>
+          </p:style>
+          <p:txBody>
+            <a:bodyPr rtlCol="0" anchor="ctr"/>
+            <a:lstStyle/>
+            <a:p>
+              <a:pPr algn="ctr"/>
+              <a:r>
+                <a:rPr lang="pt-BR" dirty="0"/>
+                <a:t>HUB</a:t>
+              </a:r>
+            </a:p>
+          </p:txBody>
+        </p:sp>
+        <p:sp>
+          <p:nvSpPr>
+            <p:cNvPr id="8" name="Retângulo 7"/>
+            <p:cNvSpPr/>
+            <p:nvPr/>
+          </p:nvSpPr>
+          <p:spPr>
+            <a:xfrm>
+              <a:off x="6731328" y="1785917"/>
+              <a:ext cx="1153227" cy="406400"/>
+            </a:xfrm>
+            <a:prstGeom prst="rect">
+              <a:avLst/>
+            </a:prstGeom>
+          </p:spPr>
+          <p:style>
+            <a:lnRef idx="2">
+              <a:schemeClr val="accent1">
+                <a:shade val="50000"/>
+              </a:schemeClr>
+            </a:lnRef>
+            <a:fillRef idx="1">
+              <a:schemeClr val="accent1"/>
+            </a:fillRef>
+            <a:effectRef idx="0">
+              <a:schemeClr val="accent1"/>
+            </a:effectRef>
+            <a:fontRef idx="minor">
+              <a:schemeClr val="lt1"/>
+            </a:fontRef>
+          </p:style>
+          <p:txBody>
+            <a:bodyPr rtlCol="0" anchor="ctr"/>
+            <a:lstStyle/>
+            <a:p>
+              <a:pPr algn="ctr"/>
+              <a:r>
+                <a:rPr lang="pt-BR" dirty="0"/>
+                <a:t>MATLAB</a:t>
+              </a:r>
+            </a:p>
+          </p:txBody>
+        </p:sp>
+        <p:sp>
+          <p:nvSpPr>
+            <p:cNvPr id="9" name="Retângulo 8"/>
+            <p:cNvSpPr/>
+            <p:nvPr/>
+          </p:nvSpPr>
+          <p:spPr>
+            <a:xfrm>
+              <a:off x="5976917" y="3454729"/>
+              <a:ext cx="1219201" cy="348342"/>
+            </a:xfrm>
+            <a:prstGeom prst="rect">
+              <a:avLst/>
+            </a:prstGeom>
+          </p:spPr>
+          <p:style>
+            <a:lnRef idx="2">
+              <a:schemeClr val="accent1">
+                <a:shade val="50000"/>
+              </a:schemeClr>
+            </a:lnRef>
+            <a:fillRef idx="1">
+              <a:schemeClr val="accent1"/>
+            </a:fillRef>
+            <a:effectRef idx="0">
+              <a:schemeClr val="accent1"/>
+            </a:effectRef>
+            <a:fontRef idx="minor">
+              <a:schemeClr val="lt1"/>
+            </a:fontRef>
+          </p:style>
+          <p:txBody>
+            <a:bodyPr rtlCol="0" anchor="ctr"/>
+            <a:lstStyle/>
+            <a:p>
+              <a:pPr algn="ctr"/>
+              <a:r>
+                <a:rPr lang="pt-BR" dirty="0"/>
+                <a:t>BBB1</a:t>
+              </a:r>
+            </a:p>
+          </p:txBody>
+        </p:sp>
+        <p:sp>
+          <p:nvSpPr>
+            <p:cNvPr id="10" name="Retângulo 9"/>
+            <p:cNvSpPr/>
+            <p:nvPr/>
+          </p:nvSpPr>
+          <p:spPr>
+            <a:xfrm>
+              <a:off x="7410203" y="3454729"/>
+              <a:ext cx="1219201" cy="348342"/>
+            </a:xfrm>
+            <a:prstGeom prst="rect">
+              <a:avLst/>
+            </a:prstGeom>
+          </p:spPr>
+          <p:style>
+            <a:lnRef idx="2">
+              <a:schemeClr val="accent1">
+                <a:shade val="50000"/>
+              </a:schemeClr>
+            </a:lnRef>
+            <a:fillRef idx="1">
+              <a:schemeClr val="accent1"/>
+            </a:fillRef>
+            <a:effectRef idx="0">
+              <a:schemeClr val="accent1"/>
+            </a:effectRef>
+            <a:fontRef idx="minor">
+              <a:schemeClr val="lt1"/>
+            </a:fontRef>
+          </p:style>
+          <p:txBody>
+            <a:bodyPr rtlCol="0" anchor="ctr"/>
+            <a:lstStyle/>
+            <a:p>
+              <a:pPr algn="ctr"/>
+              <a:r>
+                <a:rPr lang="pt-BR" dirty="0"/>
+                <a:t>BBB2</a:t>
+              </a:r>
+            </a:p>
+          </p:txBody>
+        </p:sp>
+        <p:cxnSp>
+          <p:nvCxnSpPr>
+            <p:cNvPr id="15" name="Conector de Seta Reta 14"/>
+            <p:cNvCxnSpPr>
+              <a:cxnSpLocks/>
+              <a:stCxn id="9" idx="0"/>
+              <a:endCxn id="11" idx="2"/>
+            </p:cNvCxnSpPr>
+            <p:nvPr/>
+          </p:nvCxnSpPr>
+          <p:spPr>
+            <a:xfrm flipV="1">
+              <a:off x="6586518" y="3280559"/>
+              <a:ext cx="989" cy="174170"/>
+            </a:xfrm>
+            <a:prstGeom prst="straightConnector1">
+              <a:avLst/>
+            </a:prstGeom>
+            <a:ln>
+              <a:tailEnd type="triangle"/>
+            </a:ln>
+          </p:spPr>
+          <p:style>
+            <a:lnRef idx="1">
+              <a:schemeClr val="accent1"/>
+            </a:lnRef>
+            <a:fillRef idx="0">
+              <a:schemeClr val="accent1"/>
+            </a:fillRef>
+            <a:effectRef idx="0">
+              <a:schemeClr val="accent1"/>
+            </a:effectRef>
+            <a:fontRef idx="minor">
+              <a:schemeClr val="tx1"/>
+            </a:fontRef>
+          </p:style>
+        </p:cxnSp>
+        <p:cxnSp>
+          <p:nvCxnSpPr>
+            <p:cNvPr id="17" name="Conector de Seta Reta 16"/>
+            <p:cNvCxnSpPr>
+              <a:cxnSpLocks/>
+              <a:stCxn id="10" idx="0"/>
+              <a:endCxn id="12" idx="2"/>
+            </p:cNvCxnSpPr>
+            <p:nvPr/>
+          </p:nvCxnSpPr>
+          <p:spPr>
+            <a:xfrm flipH="1" flipV="1">
+              <a:off x="8011227" y="3280559"/>
+              <a:ext cx="8577" cy="174170"/>
+            </a:xfrm>
+            <a:prstGeom prst="straightConnector1">
+              <a:avLst/>
+            </a:prstGeom>
+            <a:ln>
+              <a:tailEnd type="triangle"/>
+            </a:ln>
+          </p:spPr>
+          <p:style>
+            <a:lnRef idx="1">
+              <a:schemeClr val="accent1"/>
+            </a:lnRef>
+            <a:fillRef idx="0">
+              <a:schemeClr val="accent1"/>
+            </a:fillRef>
+            <a:effectRef idx="0">
+              <a:schemeClr val="accent1"/>
+            </a:effectRef>
+            <a:fontRef idx="minor">
+              <a:schemeClr val="tx1"/>
+            </a:fontRef>
+          </p:style>
+        </p:cxnSp>
+        <p:cxnSp>
+          <p:nvCxnSpPr>
+            <p:cNvPr id="19" name="Conector de Seta Reta 18"/>
+            <p:cNvCxnSpPr>
+              <a:cxnSpLocks/>
+              <a:stCxn id="7" idx="0"/>
+              <a:endCxn id="8" idx="2"/>
+            </p:cNvCxnSpPr>
+            <p:nvPr/>
+          </p:nvCxnSpPr>
+          <p:spPr>
+            <a:xfrm flipV="1">
+              <a:off x="7307941" y="2192317"/>
+              <a:ext cx="1" cy="174170"/>
+            </a:xfrm>
+            <a:prstGeom prst="straightConnector1">
+              <a:avLst/>
+            </a:prstGeom>
+            <a:ln>
+              <a:tailEnd type="triangle"/>
+            </a:ln>
+          </p:spPr>
+          <p:style>
+            <a:lnRef idx="1">
+              <a:schemeClr val="accent1"/>
+            </a:lnRef>
+            <a:fillRef idx="0">
+              <a:schemeClr val="accent1"/>
+            </a:fillRef>
+            <a:effectRef idx="0">
+              <a:schemeClr val="accent1"/>
+            </a:effectRef>
+            <a:fontRef idx="minor">
+              <a:schemeClr val="tx1"/>
+            </a:fontRef>
+          </p:style>
+        </p:cxnSp>
+        <p:sp>
+          <p:nvSpPr>
+            <p:cNvPr id="20" name="Retângulo 19"/>
+            <p:cNvSpPr/>
+            <p:nvPr/>
+          </p:nvSpPr>
+          <p:spPr>
+            <a:xfrm>
+              <a:off x="5776686" y="1607127"/>
+              <a:ext cx="3062514" cy="2327564"/>
+            </a:xfrm>
+            <a:prstGeom prst="rect">
+              <a:avLst/>
+            </a:prstGeom>
+            <a:noFill/>
+          </p:spPr>
+          <p:style>
+            <a:lnRef idx="2">
+              <a:schemeClr val="accent1">
+                <a:shade val="50000"/>
+              </a:schemeClr>
+            </a:lnRef>
+            <a:fillRef idx="1">
+              <a:schemeClr val="accent1"/>
+            </a:fillRef>
+            <a:effectRef idx="0">
+              <a:schemeClr val="accent1"/>
+            </a:effectRef>
+            <a:fontRef idx="minor">
+              <a:schemeClr val="lt1"/>
+            </a:fontRef>
+          </p:style>
+          <p:txBody>
+            <a:bodyPr rtlCol="0" anchor="ctr"/>
+            <a:lstStyle/>
+            <a:p>
+              <a:pPr algn="ctr"/>
+              <a:endParaRPr lang="pt-BR"/>
+            </a:p>
+          </p:txBody>
+        </p:sp>
+        <p:sp>
+          <p:nvSpPr>
+            <p:cNvPr id="11" name="Retângulo 10"/>
+            <p:cNvSpPr/>
+            <p:nvPr/>
+          </p:nvSpPr>
+          <p:spPr>
+            <a:xfrm>
+              <a:off x="5977906" y="2932217"/>
+              <a:ext cx="1219201" cy="348342"/>
+            </a:xfrm>
+            <a:prstGeom prst="rect">
+              <a:avLst/>
+            </a:prstGeom>
+          </p:spPr>
+          <p:style>
+            <a:lnRef idx="2">
+              <a:schemeClr val="accent1">
+                <a:shade val="50000"/>
+              </a:schemeClr>
+            </a:lnRef>
+            <a:fillRef idx="1">
+              <a:schemeClr val="accent1"/>
+            </a:fillRef>
+            <a:effectRef idx="0">
+              <a:schemeClr val="accent1"/>
+            </a:effectRef>
+            <a:fontRef idx="minor">
+              <a:schemeClr val="lt1"/>
+            </a:fontRef>
+          </p:style>
+          <p:txBody>
+            <a:bodyPr rtlCol="0" anchor="ctr"/>
+            <a:lstStyle/>
+            <a:p>
+              <a:pPr algn="ctr"/>
+              <a:r>
+                <a:rPr lang="pt-BR" dirty="0"/>
+                <a:t>TLL/USB</a:t>
+              </a:r>
+            </a:p>
+          </p:txBody>
+        </p:sp>
+        <p:sp>
+          <p:nvSpPr>
+            <p:cNvPr id="12" name="Retângulo 11"/>
+            <p:cNvSpPr/>
+            <p:nvPr/>
+          </p:nvSpPr>
+          <p:spPr>
+            <a:xfrm>
+              <a:off x="7401626" y="2932217"/>
+              <a:ext cx="1219201" cy="348342"/>
+            </a:xfrm>
+            <a:prstGeom prst="rect">
+              <a:avLst/>
+            </a:prstGeom>
+          </p:spPr>
+          <p:style>
+            <a:lnRef idx="2">
+              <a:schemeClr val="accent1">
+                <a:shade val="50000"/>
+              </a:schemeClr>
+            </a:lnRef>
+            <a:fillRef idx="1">
+              <a:schemeClr val="accent1"/>
+            </a:fillRef>
+            <a:effectRef idx="0">
+              <a:schemeClr val="accent1"/>
+            </a:effectRef>
+            <a:fontRef idx="minor">
+              <a:schemeClr val="lt1"/>
+            </a:fontRef>
+          </p:style>
+          <p:txBody>
+            <a:bodyPr rtlCol="0" anchor="ctr"/>
+            <a:lstStyle/>
+            <a:p>
+              <a:pPr algn="ctr"/>
+              <a:r>
+                <a:rPr lang="pt-BR" dirty="0"/>
+                <a:t>TLL/USB</a:t>
+              </a:r>
+            </a:p>
+          </p:txBody>
+        </p:sp>
+        <p:cxnSp>
+          <p:nvCxnSpPr>
+            <p:cNvPr id="28" name="Conector: Angulado 27"/>
+            <p:cNvCxnSpPr>
+              <a:stCxn id="11" idx="0"/>
+              <a:endCxn id="7" idx="1"/>
+            </p:cNvCxnSpPr>
+            <p:nvPr/>
+          </p:nvCxnSpPr>
+          <p:spPr>
+            <a:xfrm rot="5400000" flipH="1" flipV="1">
+              <a:off x="6607791" y="2578433"/>
+              <a:ext cx="333501" cy="374069"/>
+            </a:xfrm>
+            <a:prstGeom prst="bentConnector2">
+              <a:avLst/>
+            </a:prstGeom>
+            <a:ln>
+              <a:tailEnd type="triangle"/>
+            </a:ln>
+          </p:spPr>
+          <p:style>
+            <a:lnRef idx="1">
+              <a:schemeClr val="accent1"/>
+            </a:lnRef>
+            <a:fillRef idx="0">
+              <a:schemeClr val="accent1"/>
+            </a:fillRef>
+            <a:effectRef idx="0">
+              <a:schemeClr val="accent1"/>
+            </a:effectRef>
+            <a:fontRef idx="minor">
+              <a:schemeClr val="tx1"/>
+            </a:fontRef>
+          </p:style>
+        </p:cxnSp>
+        <p:cxnSp>
+          <p:nvCxnSpPr>
+            <p:cNvPr id="30" name="Conector: Angulado 29"/>
+            <p:cNvCxnSpPr>
+              <a:stCxn id="12" idx="0"/>
+              <a:endCxn id="7" idx="3"/>
+            </p:cNvCxnSpPr>
+            <p:nvPr/>
+          </p:nvCxnSpPr>
+          <p:spPr>
+            <a:xfrm rot="16200000" flipV="1">
+              <a:off x="7666016" y="2587006"/>
+              <a:ext cx="333501" cy="356922"/>
+            </a:xfrm>
+            <a:prstGeom prst="bentConnector2">
+              <a:avLst/>
+            </a:prstGeom>
+            <a:ln>
+              <a:tailEnd type="triangle"/>
+            </a:ln>
+          </p:spPr>
+          <p:style>
+            <a:lnRef idx="1">
+              <a:schemeClr val="accent1"/>
+            </a:lnRef>
+            <a:fillRef idx="0">
+              <a:schemeClr val="accent1"/>
+            </a:fillRef>
+            <a:effectRef idx="0">
+              <a:schemeClr val="accent1"/>
+            </a:effectRef>
+            <a:fontRef idx="minor">
+              <a:schemeClr val="tx1"/>
+            </a:fontRef>
+          </p:style>
+        </p:cxnSp>
+      </p:grpSp>
     </p:spTree>
     <p:extLst>
       <p:ext uri="{BB962C8B-B14F-4D97-AF65-F5344CB8AC3E}">
@@ -32998,8 +33162,8 @@
             </a:fontRef>
           </p:style>
         </p:cxnSp>
-        <mc:AlternateContent xmlns:mc="http://schemas.openxmlformats.org/markup-compatibility/2006">
-          <mc:Choice xmlns:a14="http://schemas.microsoft.com/office/drawing/2010/main" Requires="a14">
+        <mc:AlternateContent xmlns:mc="http://schemas.openxmlformats.org/markup-compatibility/2006" xmlns:a14="http://schemas.microsoft.com/office/drawing/2010/main">
+          <mc:Choice Requires="a14">
             <p:sp>
               <p:nvSpPr>
                 <p:cNvPr id="68" name="CaixaDeTexto 67"/>
@@ -33022,6 +33186,7 @@
                 </a:bodyPr>
                 <a:lstStyle/>
                 <a:p>
+                  <a:pPr/>
                   <a14:m>
                     <m:oMathPara xmlns:m="http://schemas.openxmlformats.org/officeDocument/2006/math">
                       <m:oMathParaPr>
@@ -33061,7 +33226,7 @@
               </p:txBody>
             </p:sp>
           </mc:Choice>
-          <mc:Fallback>
+          <mc:Fallback xmlns="">
             <p:sp>
               <p:nvSpPr>
                 <p:cNvPr id="68" name="CaixaDeTexto 67"/>
@@ -33100,8 +33265,8 @@
             </p:sp>
           </mc:Fallback>
         </mc:AlternateContent>
-        <mc:AlternateContent xmlns:mc="http://schemas.openxmlformats.org/markup-compatibility/2006">
-          <mc:Choice xmlns:a14="http://schemas.microsoft.com/office/drawing/2010/main" Requires="a14">
+        <mc:AlternateContent xmlns:mc="http://schemas.openxmlformats.org/markup-compatibility/2006" xmlns:a14="http://schemas.microsoft.com/office/drawing/2010/main">
+          <mc:Choice Requires="a14">
             <p:sp>
               <p:nvSpPr>
                 <p:cNvPr id="69" name="CaixaDeTexto 68"/>
@@ -33124,6 +33289,7 @@
                 </a:bodyPr>
                 <a:lstStyle/>
                 <a:p>
+                  <a:pPr/>
                   <a14:m>
                     <m:oMathPara xmlns:m="http://schemas.openxmlformats.org/officeDocument/2006/math">
                       <m:oMathParaPr>
@@ -33163,7 +33329,7 @@
               </p:txBody>
             </p:sp>
           </mc:Choice>
-          <mc:Fallback>
+          <mc:Fallback xmlns="">
             <p:sp>
               <p:nvSpPr>
                 <p:cNvPr id="69" name="CaixaDeTexto 68"/>
@@ -33202,8 +33368,8 @@
             </p:sp>
           </mc:Fallback>
         </mc:AlternateContent>
-        <mc:AlternateContent xmlns:mc="http://schemas.openxmlformats.org/markup-compatibility/2006">
-          <mc:Choice xmlns:a14="http://schemas.microsoft.com/office/drawing/2010/main" Requires="a14">
+        <mc:AlternateContent xmlns:mc="http://schemas.openxmlformats.org/markup-compatibility/2006" xmlns:a14="http://schemas.microsoft.com/office/drawing/2010/main">
+          <mc:Choice Requires="a14">
             <p:sp>
               <p:nvSpPr>
                 <p:cNvPr id="70" name="CaixaDeTexto 69"/>
@@ -33226,6 +33392,7 @@
                 </a:bodyPr>
                 <a:lstStyle/>
                 <a:p>
+                  <a:pPr/>
                   <a14:m>
                     <m:oMathPara xmlns:m="http://schemas.openxmlformats.org/officeDocument/2006/math">
                       <m:oMathParaPr>
@@ -33265,7 +33432,7 @@
               </p:txBody>
             </p:sp>
           </mc:Choice>
-          <mc:Fallback>
+          <mc:Fallback xmlns="">
             <p:sp>
               <p:nvSpPr>
                 <p:cNvPr id="70" name="CaixaDeTexto 69"/>
@@ -33382,8 +33549,8 @@
             </a:p>
           </p:txBody>
         </p:sp>
-        <mc:AlternateContent xmlns:mc="http://schemas.openxmlformats.org/markup-compatibility/2006">
-          <mc:Choice xmlns:a14="http://schemas.microsoft.com/office/drawing/2010/main" Requires="a14">
+        <mc:AlternateContent xmlns:mc="http://schemas.openxmlformats.org/markup-compatibility/2006" xmlns:a14="http://schemas.microsoft.com/office/drawing/2010/main">
+          <mc:Choice Requires="a14">
             <p:sp>
               <p:nvSpPr>
                 <p:cNvPr id="74" name="CaixaDeTexto 73"/>
@@ -33406,6 +33573,7 @@
                 </a:bodyPr>
                 <a:lstStyle/>
                 <a:p>
+                  <a:pPr/>
                   <a14:m>
                     <m:oMathPara xmlns:m="http://schemas.openxmlformats.org/officeDocument/2006/math">
                       <m:oMathParaPr>
@@ -33433,7 +33601,7 @@
               </p:txBody>
             </p:sp>
           </mc:Choice>
-          <mc:Fallback>
+          <mc:Fallback xmlns="">
             <p:sp>
               <p:nvSpPr>
                 <p:cNvPr id="74" name="CaixaDeTexto 73"/>
@@ -33472,8 +33640,8 @@
             </p:sp>
           </mc:Fallback>
         </mc:AlternateContent>
-        <mc:AlternateContent xmlns:mc="http://schemas.openxmlformats.org/markup-compatibility/2006">
-          <mc:Choice xmlns:a14="http://schemas.microsoft.com/office/drawing/2010/main" Requires="a14">
+        <mc:AlternateContent xmlns:mc="http://schemas.openxmlformats.org/markup-compatibility/2006" xmlns:a14="http://schemas.microsoft.com/office/drawing/2010/main">
+          <mc:Choice Requires="a14">
             <p:sp>
               <p:nvSpPr>
                 <p:cNvPr id="75" name="CaixaDeTexto 74"/>
@@ -33496,6 +33664,7 @@
                 </a:bodyPr>
                 <a:lstStyle/>
                 <a:p>
+                  <a:pPr/>
                   <a14:m>
                     <m:oMathPara xmlns:m="http://schemas.openxmlformats.org/officeDocument/2006/math">
                       <m:oMathParaPr>
@@ -33523,7 +33692,7 @@
               </p:txBody>
             </p:sp>
           </mc:Choice>
-          <mc:Fallback>
+          <mc:Fallback xmlns="">
             <p:sp>
               <p:nvSpPr>
                 <p:cNvPr id="75" name="CaixaDeTexto 74"/>
@@ -33562,8 +33731,8 @@
             </p:sp>
           </mc:Fallback>
         </mc:AlternateContent>
-        <mc:AlternateContent xmlns:mc="http://schemas.openxmlformats.org/markup-compatibility/2006">
-          <mc:Choice xmlns:a14="http://schemas.microsoft.com/office/drawing/2010/main" Requires="a14">
+        <mc:AlternateContent xmlns:mc="http://schemas.openxmlformats.org/markup-compatibility/2006" xmlns:a14="http://schemas.microsoft.com/office/drawing/2010/main">
+          <mc:Choice Requires="a14">
             <p:sp>
               <p:nvSpPr>
                 <p:cNvPr id="76" name="CaixaDeTexto 75"/>
@@ -33586,6 +33755,7 @@
                 </a:bodyPr>
                 <a:lstStyle/>
                 <a:p>
+                  <a:pPr/>
                   <a14:m>
                     <m:oMathPara xmlns:m="http://schemas.openxmlformats.org/officeDocument/2006/math">
                       <m:oMathParaPr>
@@ -33613,7 +33783,7 @@
               </p:txBody>
             </p:sp>
           </mc:Choice>
-          <mc:Fallback>
+          <mc:Fallback xmlns="">
             <p:sp>
               <p:nvSpPr>
                 <p:cNvPr id="76" name="CaixaDeTexto 75"/>
@@ -33652,8 +33822,8 @@
             </p:sp>
           </mc:Fallback>
         </mc:AlternateContent>
-        <mc:AlternateContent xmlns:mc="http://schemas.openxmlformats.org/markup-compatibility/2006">
-          <mc:Choice xmlns:a14="http://schemas.microsoft.com/office/drawing/2010/main" Requires="a14">
+        <mc:AlternateContent xmlns:mc="http://schemas.openxmlformats.org/markup-compatibility/2006" xmlns:a14="http://schemas.microsoft.com/office/drawing/2010/main">
+          <mc:Choice Requires="a14">
             <p:sp>
               <p:nvSpPr>
                 <p:cNvPr id="77" name="CaixaDeTexto 76"/>
@@ -33676,6 +33846,7 @@
                 </a:bodyPr>
                 <a:lstStyle/>
                 <a:p>
+                  <a:pPr/>
                   <a14:m>
                     <m:oMathPara xmlns:m="http://schemas.openxmlformats.org/officeDocument/2006/math">
                       <m:oMathParaPr>
@@ -33715,7 +33886,7 @@
               </p:txBody>
             </p:sp>
           </mc:Choice>
-          <mc:Fallback>
+          <mc:Fallback xmlns="">
             <p:sp>
               <p:nvSpPr>
                 <p:cNvPr id="77" name="CaixaDeTexto 76"/>
@@ -33870,8 +34041,8 @@
             </a:fontRef>
           </p:style>
         </p:cxnSp>
-        <mc:AlternateContent xmlns:mc="http://schemas.openxmlformats.org/markup-compatibility/2006">
-          <mc:Choice xmlns:a14="http://schemas.microsoft.com/office/drawing/2010/main" Requires="a14">
+        <mc:AlternateContent xmlns:mc="http://schemas.openxmlformats.org/markup-compatibility/2006" xmlns:a14="http://schemas.microsoft.com/office/drawing/2010/main">
+          <mc:Choice Requires="a14">
             <p:sp>
               <p:nvSpPr>
                 <p:cNvPr id="91" name="CaixaDeTexto 90"/>
@@ -33894,6 +34065,7 @@
                 </a:bodyPr>
                 <a:lstStyle/>
                 <a:p>
+                  <a:pPr/>
                   <a14:m>
                     <m:oMathPara xmlns:m="http://schemas.openxmlformats.org/officeDocument/2006/math">
                       <m:oMathParaPr>
@@ -33933,7 +34105,7 @@
               </p:txBody>
             </p:sp>
           </mc:Choice>
-          <mc:Fallback>
+          <mc:Fallback xmlns="">
             <p:sp>
               <p:nvSpPr>
                 <p:cNvPr id="91" name="CaixaDeTexto 90"/>
@@ -34212,6 +34384,823 @@
     <p:extLst>
       <p:ext uri="{BB962C8B-B14F-4D97-AF65-F5344CB8AC3E}">
         <p14:creationId xmlns:p14="http://schemas.microsoft.com/office/powerpoint/2010/main" val="3891602190"/>
+      </p:ext>
+    </p:extLst>
+  </p:cSld>
+  <p:clrMapOvr>
+    <a:masterClrMapping/>
+  </p:clrMapOvr>
+</p:sld>
+</file>
+
+<file path=ppt/slides/slide35.xml><?xml version="1.0" encoding="utf-8"?>
+<p:sld xmlns:a="http://schemas.openxmlformats.org/drawingml/2006/main" xmlns:r="http://schemas.openxmlformats.org/officeDocument/2006/relationships" xmlns:p="http://schemas.openxmlformats.org/presentationml/2006/main">
+  <p:cSld>
+    <p:spTree>
+      <p:nvGrpSpPr>
+        <p:cNvPr id="1" name=""/>
+        <p:cNvGrpSpPr/>
+        <p:nvPr/>
+      </p:nvGrpSpPr>
+      <p:grpSpPr>
+        <a:xfrm>
+          <a:off x="0" y="0"/>
+          <a:ext cx="0" cy="0"/>
+          <a:chOff x="0" y="0"/>
+          <a:chExt cx="0" cy="0"/>
+        </a:xfrm>
+      </p:grpSpPr>
+      <p:grpSp>
+        <p:nvGrpSpPr>
+          <p:cNvPr id="48" name="Agrupar 47"/>
+          <p:cNvGrpSpPr/>
+          <p:nvPr/>
+        </p:nvGrpSpPr>
+        <p:grpSpPr>
+          <a:xfrm>
+            <a:off x="734291" y="1517073"/>
+            <a:ext cx="7065818" cy="2590792"/>
+            <a:chOff x="734291" y="1517073"/>
+            <a:chExt cx="7065818" cy="2590792"/>
+          </a:xfrm>
+        </p:grpSpPr>
+        <p:sp>
+          <p:nvSpPr>
+            <p:cNvPr id="7" name="Retângulo 6"/>
+            <p:cNvSpPr/>
+            <p:nvPr/>
+          </p:nvSpPr>
+          <p:spPr>
+            <a:xfrm>
+              <a:off x="914400" y="2867891"/>
+              <a:ext cx="1080655" cy="595745"/>
+            </a:xfrm>
+            <a:prstGeom prst="rect">
+              <a:avLst/>
+            </a:prstGeom>
+          </p:spPr>
+          <p:style>
+            <a:lnRef idx="2">
+              <a:schemeClr val="accent1">
+                <a:shade val="50000"/>
+              </a:schemeClr>
+            </a:lnRef>
+            <a:fillRef idx="1">
+              <a:schemeClr val="accent1"/>
+            </a:fillRef>
+            <a:effectRef idx="0">
+              <a:schemeClr val="accent1"/>
+            </a:effectRef>
+            <a:fontRef idx="minor">
+              <a:schemeClr val="lt1"/>
+            </a:fontRef>
+          </p:style>
+          <p:txBody>
+            <a:bodyPr rtlCol="0" anchor="ctr"/>
+            <a:lstStyle/>
+            <a:p>
+              <a:pPr algn="ctr"/>
+              <a:r>
+                <a:rPr lang="pt-BR" dirty="0"/>
+                <a:t>Thread #1</a:t>
+              </a:r>
+            </a:p>
+          </p:txBody>
+        </p:sp>
+        <p:sp>
+          <p:nvSpPr>
+            <p:cNvPr id="8" name="Retângulo 7"/>
+            <p:cNvSpPr/>
+            <p:nvPr/>
+          </p:nvSpPr>
+          <p:spPr>
+            <a:xfrm>
+              <a:off x="5555672" y="2362197"/>
+              <a:ext cx="2244437" cy="526473"/>
+            </a:xfrm>
+            <a:prstGeom prst="rect">
+              <a:avLst/>
+            </a:prstGeom>
+          </p:spPr>
+          <p:style>
+            <a:lnRef idx="2">
+              <a:schemeClr val="accent1">
+                <a:shade val="50000"/>
+              </a:schemeClr>
+            </a:lnRef>
+            <a:fillRef idx="1">
+              <a:schemeClr val="accent1"/>
+            </a:fillRef>
+            <a:effectRef idx="0">
+              <a:schemeClr val="accent1"/>
+            </a:effectRef>
+            <a:fontRef idx="minor">
+              <a:schemeClr val="lt1"/>
+            </a:fontRef>
+          </p:style>
+          <p:txBody>
+            <a:bodyPr rtlCol="0" anchor="ctr"/>
+            <a:lstStyle/>
+            <a:p>
+              <a:pPr algn="ctr"/>
+              <a:r>
+                <a:rPr lang="pt-BR" dirty="0" err="1"/>
+                <a:t>Flot</a:t>
+              </a:r>
+              <a:endParaRPr lang="pt-BR" dirty="0"/>
+            </a:p>
+          </p:txBody>
+        </p:sp>
+        <p:sp>
+          <p:nvSpPr>
+            <p:cNvPr id="9" name="Retângulo 8"/>
+            <p:cNvSpPr/>
+            <p:nvPr/>
+          </p:nvSpPr>
+          <p:spPr>
+            <a:xfrm>
+              <a:off x="3636818" y="1884215"/>
+              <a:ext cx="1343892" cy="415635"/>
+            </a:xfrm>
+            <a:prstGeom prst="rect">
+              <a:avLst/>
+            </a:prstGeom>
+          </p:spPr>
+          <p:style>
+            <a:lnRef idx="2">
+              <a:schemeClr val="accent1">
+                <a:shade val="50000"/>
+              </a:schemeClr>
+            </a:lnRef>
+            <a:fillRef idx="1">
+              <a:schemeClr val="accent1"/>
+            </a:fillRef>
+            <a:effectRef idx="0">
+              <a:schemeClr val="accent1"/>
+            </a:effectRef>
+            <a:fontRef idx="minor">
+              <a:schemeClr val="lt1"/>
+            </a:fontRef>
+          </p:style>
+          <p:txBody>
+            <a:bodyPr rtlCol="0" anchor="ctr"/>
+            <a:lstStyle/>
+            <a:p>
+              <a:pPr algn="ctr"/>
+              <a:r>
+                <a:rPr lang="pt-BR" dirty="0"/>
+                <a:t>JSON</a:t>
+              </a:r>
+            </a:p>
+          </p:txBody>
+        </p:sp>
+        <p:sp>
+          <p:nvSpPr>
+            <p:cNvPr id="10" name="Retângulo 9"/>
+            <p:cNvSpPr/>
+            <p:nvPr/>
+          </p:nvSpPr>
+          <p:spPr>
+            <a:xfrm>
+              <a:off x="734291" y="1517073"/>
+              <a:ext cx="4405745" cy="2590792"/>
+            </a:xfrm>
+            <a:prstGeom prst="rect">
+              <a:avLst/>
+            </a:prstGeom>
+            <a:noFill/>
+          </p:spPr>
+          <p:style>
+            <a:lnRef idx="2">
+              <a:schemeClr val="accent1">
+                <a:shade val="50000"/>
+              </a:schemeClr>
+            </a:lnRef>
+            <a:fillRef idx="1">
+              <a:schemeClr val="accent1"/>
+            </a:fillRef>
+            <a:effectRef idx="0">
+              <a:schemeClr val="accent1"/>
+            </a:effectRef>
+            <a:fontRef idx="minor">
+              <a:schemeClr val="lt1"/>
+            </a:fontRef>
+          </p:style>
+          <p:txBody>
+            <a:bodyPr rtlCol="0" anchor="ctr"/>
+            <a:lstStyle/>
+            <a:p>
+              <a:pPr algn="ctr"/>
+              <a:endParaRPr lang="pt-BR"/>
+            </a:p>
+          </p:txBody>
+        </p:sp>
+        <p:sp>
+          <p:nvSpPr>
+            <p:cNvPr id="11" name="Retângulo 10"/>
+            <p:cNvSpPr/>
+            <p:nvPr/>
+          </p:nvSpPr>
+          <p:spPr>
+            <a:xfrm>
+              <a:off x="914400" y="1835724"/>
+              <a:ext cx="2452254" cy="526473"/>
+            </a:xfrm>
+            <a:prstGeom prst="rect">
+              <a:avLst/>
+            </a:prstGeom>
+          </p:spPr>
+          <p:style>
+            <a:lnRef idx="2">
+              <a:schemeClr val="accent1">
+                <a:shade val="50000"/>
+              </a:schemeClr>
+            </a:lnRef>
+            <a:fillRef idx="1">
+              <a:schemeClr val="accent1"/>
+            </a:fillRef>
+            <a:effectRef idx="0">
+              <a:schemeClr val="accent1"/>
+            </a:effectRef>
+            <a:fontRef idx="minor">
+              <a:schemeClr val="lt1"/>
+            </a:fontRef>
+          </p:style>
+          <p:txBody>
+            <a:bodyPr rtlCol="0" anchor="ctr"/>
+            <a:lstStyle/>
+            <a:p>
+              <a:pPr algn="ctr"/>
+              <a:r>
+                <a:rPr lang="pt-BR" dirty="0" err="1"/>
+                <a:t>Flask</a:t>
+              </a:r>
+              <a:r>
+                <a:rPr lang="pt-BR" dirty="0"/>
+                <a:t> (AJAX)</a:t>
+              </a:r>
+            </a:p>
+          </p:txBody>
+        </p:sp>
+        <p:sp>
+          <p:nvSpPr>
+            <p:cNvPr id="12" name="Retângulo 11"/>
+            <p:cNvSpPr/>
+            <p:nvPr/>
+          </p:nvSpPr>
+          <p:spPr>
+            <a:xfrm>
+              <a:off x="5555673" y="3235030"/>
+              <a:ext cx="2244436" cy="872835"/>
+            </a:xfrm>
+            <a:prstGeom prst="rect">
+              <a:avLst/>
+            </a:prstGeom>
+          </p:spPr>
+          <p:style>
+            <a:lnRef idx="2">
+              <a:schemeClr val="accent1">
+                <a:shade val="50000"/>
+              </a:schemeClr>
+            </a:lnRef>
+            <a:fillRef idx="1">
+              <a:schemeClr val="accent1"/>
+            </a:fillRef>
+            <a:effectRef idx="0">
+              <a:schemeClr val="accent1"/>
+            </a:effectRef>
+            <a:fontRef idx="minor">
+              <a:schemeClr val="lt1"/>
+            </a:fontRef>
+          </p:style>
+          <p:txBody>
+            <a:bodyPr rtlCol="0" anchor="ctr"/>
+            <a:lstStyle/>
+            <a:p>
+              <a:pPr algn="ctr"/>
+              <a:r>
+                <a:rPr lang="pt-BR" dirty="0"/>
+                <a:t>Navegador (AJAX – </a:t>
+              </a:r>
+              <a:r>
+                <a:rPr lang="pt-BR" dirty="0" err="1"/>
+                <a:t>JavaScript</a:t>
+              </a:r>
+              <a:r>
+                <a:rPr lang="pt-BR" dirty="0"/>
+                <a:t>/</a:t>
+              </a:r>
+              <a:r>
+                <a:rPr lang="pt-BR" dirty="0" err="1"/>
+                <a:t>Jquery</a:t>
+              </a:r>
+              <a:r>
+                <a:rPr lang="pt-BR" dirty="0"/>
+                <a:t>)</a:t>
+              </a:r>
+            </a:p>
+          </p:txBody>
+        </p:sp>
+        <p:sp>
+          <p:nvSpPr>
+            <p:cNvPr id="16" name="Retângulo 15"/>
+            <p:cNvSpPr/>
+            <p:nvPr/>
+          </p:nvSpPr>
+          <p:spPr>
+            <a:xfrm>
+              <a:off x="3706092" y="3380510"/>
+              <a:ext cx="1191489" cy="512618"/>
+            </a:xfrm>
+            <a:prstGeom prst="rect">
+              <a:avLst/>
+            </a:prstGeom>
+          </p:spPr>
+          <p:style>
+            <a:lnRef idx="2">
+              <a:schemeClr val="accent1">
+                <a:shade val="50000"/>
+              </a:schemeClr>
+            </a:lnRef>
+            <a:fillRef idx="1">
+              <a:schemeClr val="accent1"/>
+            </a:fillRef>
+            <a:effectRef idx="0">
+              <a:schemeClr val="accent1"/>
+            </a:effectRef>
+            <a:fontRef idx="minor">
+              <a:schemeClr val="lt1"/>
+            </a:fontRef>
+          </p:style>
+          <p:txBody>
+            <a:bodyPr rtlCol="0" anchor="ctr"/>
+            <a:lstStyle/>
+            <a:p>
+              <a:pPr algn="ctr"/>
+              <a:r>
+                <a:rPr lang="pt-BR" dirty="0" err="1"/>
+                <a:t>Eth</a:t>
+              </a:r>
+              <a:r>
+                <a:rPr lang="pt-BR" dirty="0"/>
+                <a:t>-USB</a:t>
+              </a:r>
+            </a:p>
+          </p:txBody>
+        </p:sp>
+        <p:cxnSp>
+          <p:nvCxnSpPr>
+            <p:cNvPr id="25" name="Conector de Seta Reta 24"/>
+            <p:cNvCxnSpPr>
+              <a:cxnSpLocks/>
+              <a:stCxn id="7" idx="0"/>
+            </p:cNvCxnSpPr>
+            <p:nvPr/>
+          </p:nvCxnSpPr>
+          <p:spPr>
+            <a:xfrm flipH="1" flipV="1">
+              <a:off x="1454727" y="2362197"/>
+              <a:ext cx="1" cy="505694"/>
+            </a:xfrm>
+            <a:prstGeom prst="straightConnector1">
+              <a:avLst/>
+            </a:prstGeom>
+            <a:ln>
+              <a:tailEnd type="triangle"/>
+            </a:ln>
+          </p:spPr>
+          <p:style>
+            <a:lnRef idx="1">
+              <a:schemeClr val="accent1"/>
+            </a:lnRef>
+            <a:fillRef idx="0">
+              <a:schemeClr val="accent1"/>
+            </a:fillRef>
+            <a:effectRef idx="0">
+              <a:schemeClr val="accent1"/>
+            </a:effectRef>
+            <a:fontRef idx="minor">
+              <a:schemeClr val="tx1"/>
+            </a:fontRef>
+          </p:style>
+        </p:cxnSp>
+        <p:sp>
+          <p:nvSpPr>
+            <p:cNvPr id="26" name="CaixaDeTexto 25"/>
+            <p:cNvSpPr txBox="1"/>
+            <p:nvPr/>
+          </p:nvSpPr>
+          <p:spPr>
+            <a:xfrm>
+              <a:off x="3636818" y="1517073"/>
+              <a:ext cx="1330038" cy="367142"/>
+            </a:xfrm>
+            <a:prstGeom prst="rect">
+              <a:avLst/>
+            </a:prstGeom>
+            <a:noFill/>
+          </p:spPr>
+          <p:txBody>
+            <a:bodyPr wrap="square" rtlCol="0">
+              <a:spAutoFit/>
+            </a:bodyPr>
+            <a:lstStyle/>
+            <a:p>
+              <a:pPr algn="ctr"/>
+              <a:r>
+                <a:rPr lang="pt-BR" dirty="0"/>
+                <a:t>JSONIFY</a:t>
+              </a:r>
+            </a:p>
+          </p:txBody>
+        </p:sp>
+        <p:sp>
+          <p:nvSpPr>
+            <p:cNvPr id="27" name="Retângulo 26"/>
+            <p:cNvSpPr/>
+            <p:nvPr/>
+          </p:nvSpPr>
+          <p:spPr>
+            <a:xfrm>
+              <a:off x="3842906" y="2646206"/>
+              <a:ext cx="931716" cy="415635"/>
+            </a:xfrm>
+            <a:prstGeom prst="rect">
+              <a:avLst/>
+            </a:prstGeom>
+          </p:spPr>
+          <p:style>
+            <a:lnRef idx="2">
+              <a:schemeClr val="accent1">
+                <a:shade val="50000"/>
+              </a:schemeClr>
+            </a:lnRef>
+            <a:fillRef idx="1">
+              <a:schemeClr val="accent1"/>
+            </a:fillRef>
+            <a:effectRef idx="0">
+              <a:schemeClr val="accent1"/>
+            </a:effectRef>
+            <a:fontRef idx="minor">
+              <a:schemeClr val="lt1"/>
+            </a:fontRef>
+          </p:style>
+          <p:txBody>
+            <a:bodyPr rtlCol="0" anchor="ctr"/>
+            <a:lstStyle/>
+            <a:p>
+              <a:pPr algn="ctr"/>
+              <a:r>
+                <a:rPr lang="pt-BR" dirty="0"/>
+                <a:t>HTTP</a:t>
+              </a:r>
+            </a:p>
+          </p:txBody>
+        </p:sp>
+        <p:cxnSp>
+          <p:nvCxnSpPr>
+            <p:cNvPr id="29" name="Conector de Seta Reta 28"/>
+            <p:cNvCxnSpPr>
+              <a:cxnSpLocks/>
+              <a:stCxn id="11" idx="3"/>
+              <a:endCxn id="9" idx="1"/>
+            </p:cNvCxnSpPr>
+            <p:nvPr/>
+          </p:nvCxnSpPr>
+          <p:spPr>
+            <a:xfrm flipV="1">
+              <a:off x="3366654" y="2092033"/>
+              <a:ext cx="270164" cy="6928"/>
+            </a:xfrm>
+            <a:prstGeom prst="straightConnector1">
+              <a:avLst/>
+            </a:prstGeom>
+            <a:ln>
+              <a:tailEnd type="triangle"/>
+            </a:ln>
+          </p:spPr>
+          <p:style>
+            <a:lnRef idx="1">
+              <a:schemeClr val="accent1"/>
+            </a:lnRef>
+            <a:fillRef idx="0">
+              <a:schemeClr val="accent1"/>
+            </a:fillRef>
+            <a:effectRef idx="0">
+              <a:schemeClr val="accent1"/>
+            </a:effectRef>
+            <a:fontRef idx="minor">
+              <a:schemeClr val="tx1"/>
+            </a:fontRef>
+          </p:style>
+        </p:cxnSp>
+        <p:cxnSp>
+          <p:nvCxnSpPr>
+            <p:cNvPr id="31" name="Conector de Seta Reta 30"/>
+            <p:cNvCxnSpPr>
+              <a:stCxn id="9" idx="2"/>
+              <a:endCxn id="27" idx="0"/>
+            </p:cNvCxnSpPr>
+            <p:nvPr/>
+          </p:nvCxnSpPr>
+          <p:spPr>
+            <a:xfrm>
+              <a:off x="4308764" y="2299850"/>
+              <a:ext cx="0" cy="346356"/>
+            </a:xfrm>
+            <a:prstGeom prst="straightConnector1">
+              <a:avLst/>
+            </a:prstGeom>
+            <a:ln>
+              <a:tailEnd type="triangle"/>
+            </a:ln>
+          </p:spPr>
+          <p:style>
+            <a:lnRef idx="1">
+              <a:schemeClr val="accent1"/>
+            </a:lnRef>
+            <a:fillRef idx="0">
+              <a:schemeClr val="accent1"/>
+            </a:fillRef>
+            <a:effectRef idx="0">
+              <a:schemeClr val="accent1"/>
+            </a:effectRef>
+            <a:fontRef idx="minor">
+              <a:schemeClr val="tx1"/>
+            </a:fontRef>
+          </p:style>
+        </p:cxnSp>
+        <p:cxnSp>
+          <p:nvCxnSpPr>
+            <p:cNvPr id="33" name="Conector de Seta Reta 32"/>
+            <p:cNvCxnSpPr>
+              <a:stCxn id="27" idx="2"/>
+              <a:endCxn id="16" idx="0"/>
+            </p:cNvCxnSpPr>
+            <p:nvPr/>
+          </p:nvCxnSpPr>
+          <p:spPr>
+            <a:xfrm flipH="1">
+              <a:off x="4301837" y="3061841"/>
+              <a:ext cx="6927" cy="318669"/>
+            </a:xfrm>
+            <a:prstGeom prst="straightConnector1">
+              <a:avLst/>
+            </a:prstGeom>
+            <a:ln>
+              <a:tailEnd type="triangle"/>
+            </a:ln>
+          </p:spPr>
+          <p:style>
+            <a:lnRef idx="1">
+              <a:schemeClr val="accent1"/>
+            </a:lnRef>
+            <a:fillRef idx="0">
+              <a:schemeClr val="accent1"/>
+            </a:fillRef>
+            <a:effectRef idx="0">
+              <a:schemeClr val="accent1"/>
+            </a:effectRef>
+            <a:fontRef idx="minor">
+              <a:schemeClr val="tx1"/>
+            </a:fontRef>
+          </p:style>
+        </p:cxnSp>
+        <p:cxnSp>
+          <p:nvCxnSpPr>
+            <p:cNvPr id="36" name="Conector de Seta Reta 35"/>
+            <p:cNvCxnSpPr>
+              <a:cxnSpLocks/>
+              <a:stCxn id="16" idx="3"/>
+            </p:cNvCxnSpPr>
+            <p:nvPr/>
+          </p:nvCxnSpPr>
+          <p:spPr>
+            <a:xfrm>
+              <a:off x="4897581" y="3636819"/>
+              <a:ext cx="658092" cy="0"/>
+            </a:xfrm>
+            <a:prstGeom prst="straightConnector1">
+              <a:avLst/>
+            </a:prstGeom>
+            <a:ln>
+              <a:tailEnd type="triangle"/>
+            </a:ln>
+          </p:spPr>
+          <p:style>
+            <a:lnRef idx="1">
+              <a:schemeClr val="accent1"/>
+            </a:lnRef>
+            <a:fillRef idx="0">
+              <a:schemeClr val="accent1"/>
+            </a:fillRef>
+            <a:effectRef idx="0">
+              <a:schemeClr val="accent1"/>
+            </a:effectRef>
+            <a:fontRef idx="minor">
+              <a:schemeClr val="tx1"/>
+            </a:fontRef>
+          </p:style>
+        </p:cxnSp>
+        <p:sp>
+          <p:nvSpPr>
+            <p:cNvPr id="40" name="Retângulo 39"/>
+            <p:cNvSpPr/>
+            <p:nvPr/>
+          </p:nvSpPr>
+          <p:spPr>
+            <a:xfrm>
+              <a:off x="2244436" y="2867891"/>
+              <a:ext cx="1080655" cy="595745"/>
+            </a:xfrm>
+            <a:prstGeom prst="rect">
+              <a:avLst/>
+            </a:prstGeom>
+          </p:spPr>
+          <p:style>
+            <a:lnRef idx="2">
+              <a:schemeClr val="accent1">
+                <a:shade val="50000"/>
+              </a:schemeClr>
+            </a:lnRef>
+            <a:fillRef idx="1">
+              <a:schemeClr val="accent1"/>
+            </a:fillRef>
+            <a:effectRef idx="0">
+              <a:schemeClr val="accent1"/>
+            </a:effectRef>
+            <a:fontRef idx="minor">
+              <a:schemeClr val="lt1"/>
+            </a:fontRef>
+          </p:style>
+          <p:txBody>
+            <a:bodyPr rtlCol="0" anchor="ctr"/>
+            <a:lstStyle/>
+            <a:p>
+              <a:pPr algn="ctr"/>
+              <a:r>
+                <a:rPr lang="pt-BR" dirty="0"/>
+                <a:t>Thread #2</a:t>
+              </a:r>
+            </a:p>
+          </p:txBody>
+        </p:sp>
+        <p:cxnSp>
+          <p:nvCxnSpPr>
+            <p:cNvPr id="41" name="Conector de Seta Reta 40"/>
+            <p:cNvCxnSpPr>
+              <a:cxnSpLocks/>
+              <a:stCxn id="40" idx="0"/>
+            </p:cNvCxnSpPr>
+            <p:nvPr/>
+          </p:nvCxnSpPr>
+          <p:spPr>
+            <a:xfrm flipH="1" flipV="1">
+              <a:off x="2784763" y="2362197"/>
+              <a:ext cx="1" cy="505694"/>
+            </a:xfrm>
+            <a:prstGeom prst="straightConnector1">
+              <a:avLst/>
+            </a:prstGeom>
+            <a:ln>
+              <a:tailEnd type="triangle"/>
+            </a:ln>
+          </p:spPr>
+          <p:style>
+            <a:lnRef idx="1">
+              <a:schemeClr val="accent1"/>
+            </a:lnRef>
+            <a:fillRef idx="0">
+              <a:schemeClr val="accent1"/>
+            </a:fillRef>
+            <a:effectRef idx="0">
+              <a:schemeClr val="accent1"/>
+            </a:effectRef>
+            <a:fontRef idx="minor">
+              <a:schemeClr val="tx1"/>
+            </a:fontRef>
+          </p:style>
+        </p:cxnSp>
+        <p:sp>
+          <p:nvSpPr>
+            <p:cNvPr id="43" name="Retângulo 42"/>
+            <p:cNvSpPr/>
+            <p:nvPr/>
+          </p:nvSpPr>
+          <p:spPr>
+            <a:xfrm>
+              <a:off x="5555673" y="1517073"/>
+              <a:ext cx="2244436" cy="581887"/>
+            </a:xfrm>
+            <a:prstGeom prst="rect">
+              <a:avLst/>
+            </a:prstGeom>
+          </p:spPr>
+          <p:style>
+            <a:lnRef idx="2">
+              <a:schemeClr val="accent1">
+                <a:shade val="50000"/>
+              </a:schemeClr>
+            </a:lnRef>
+            <a:fillRef idx="1">
+              <a:schemeClr val="accent1"/>
+            </a:fillRef>
+            <a:effectRef idx="0">
+              <a:schemeClr val="accent1"/>
+            </a:effectRef>
+            <a:fontRef idx="minor">
+              <a:schemeClr val="lt1"/>
+            </a:fontRef>
+          </p:style>
+          <p:txBody>
+            <a:bodyPr rtlCol="0" anchor="ctr"/>
+            <a:lstStyle/>
+            <a:p>
+              <a:pPr algn="ctr"/>
+              <a:r>
+                <a:rPr lang="pt-BR" dirty="0"/>
+                <a:t>Atualiza gráfico</a:t>
+              </a:r>
+            </a:p>
+          </p:txBody>
+        </p:sp>
+        <p:cxnSp>
+          <p:nvCxnSpPr>
+            <p:cNvPr id="45" name="Conector de Seta Reta 44"/>
+            <p:cNvCxnSpPr>
+              <a:stCxn id="12" idx="0"/>
+              <a:endCxn id="8" idx="2"/>
+            </p:cNvCxnSpPr>
+            <p:nvPr/>
+          </p:nvCxnSpPr>
+          <p:spPr>
+            <a:xfrm flipV="1">
+              <a:off x="6677891" y="2888670"/>
+              <a:ext cx="0" cy="346360"/>
+            </a:xfrm>
+            <a:prstGeom prst="straightConnector1">
+              <a:avLst/>
+            </a:prstGeom>
+            <a:ln>
+              <a:tailEnd type="triangle"/>
+            </a:ln>
+          </p:spPr>
+          <p:style>
+            <a:lnRef idx="1">
+              <a:schemeClr val="accent1"/>
+            </a:lnRef>
+            <a:fillRef idx="0">
+              <a:schemeClr val="accent1"/>
+            </a:fillRef>
+            <a:effectRef idx="0">
+              <a:schemeClr val="accent1"/>
+            </a:effectRef>
+            <a:fontRef idx="minor">
+              <a:schemeClr val="tx1"/>
+            </a:fontRef>
+          </p:style>
+        </p:cxnSp>
+        <p:cxnSp>
+          <p:nvCxnSpPr>
+            <p:cNvPr id="47" name="Conector de Seta Reta 46"/>
+            <p:cNvCxnSpPr>
+              <a:stCxn id="8" idx="0"/>
+              <a:endCxn id="43" idx="2"/>
+            </p:cNvCxnSpPr>
+            <p:nvPr/>
+          </p:nvCxnSpPr>
+          <p:spPr>
+            <a:xfrm flipV="1">
+              <a:off x="6677891" y="2098960"/>
+              <a:ext cx="0" cy="263237"/>
+            </a:xfrm>
+            <a:prstGeom prst="straightConnector1">
+              <a:avLst/>
+            </a:prstGeom>
+            <a:ln>
+              <a:tailEnd type="triangle"/>
+            </a:ln>
+          </p:spPr>
+          <p:style>
+            <a:lnRef idx="1">
+              <a:schemeClr val="accent1"/>
+            </a:lnRef>
+            <a:fillRef idx="0">
+              <a:schemeClr val="accent1"/>
+            </a:fillRef>
+            <a:effectRef idx="0">
+              <a:schemeClr val="accent1"/>
+            </a:effectRef>
+            <a:fontRef idx="minor">
+              <a:schemeClr val="tx1"/>
+            </a:fontRef>
+          </p:style>
+        </p:cxnSp>
+      </p:grpSp>
+    </p:spTree>
+    <p:extLst>
+      <p:ext uri="{BB962C8B-B14F-4D97-AF65-F5344CB8AC3E}">
+        <p14:creationId xmlns:p14="http://schemas.microsoft.com/office/powerpoint/2010/main" val="1894817828"/>
       </p:ext>
     </p:extLst>
   </p:cSld>

</xml_diff>